<commit_message>
Working on the paper
</commit_message>
<xml_diff>
--- a/nesh/graphics.pptx
+++ b/nesh/graphics.pptx
@@ -5437,53 +5437,141 @@
           <a:chExt cx="0" cy="0"/>
         </a:xfrm>
       </p:grpSpPr>
-      <p:pic>
-        <p:nvPicPr>
-          <p:cNvPr id="5122" name="Picture 2">
-            <a:extLst>
-              <a:ext uri="{FF2B5EF4-FFF2-40B4-BE49-F238E27FC236}">
-                <a16:creationId xmlns:a16="http://schemas.microsoft.com/office/drawing/2014/main" id="{A00B725C-DBD3-A1AC-2464-1BA7FA94488C}"/>
-              </a:ext>
-            </a:extLst>
-          </p:cNvPr>
-          <p:cNvPicPr>
-            <a:picLocks noChangeAspect="1" noChangeArrowheads="1"/>
-          </p:cNvPicPr>
+      <p:sp>
+        <p:nvSpPr>
+          <p:cNvPr id="4" name="Oval 3">
+            <a:extLst>
+              <a:ext uri="{FF2B5EF4-FFF2-40B4-BE49-F238E27FC236}">
+                <a16:creationId xmlns:a16="http://schemas.microsoft.com/office/drawing/2014/main" id="{EC11F563-09B3-A2BA-78F3-8E456A853322}"/>
+              </a:ext>
+            </a:extLst>
+          </p:cNvPr>
+          <p:cNvSpPr/>
           <p:nvPr/>
-        </p:nvPicPr>
-        <p:blipFill>
-          <a:blip r:embed="rId2">
-            <a:extLst>
-              <a:ext uri="{28A0092B-C50C-407E-A947-70E740481C1C}">
-                <a14:useLocalDpi xmlns:a14="http://schemas.microsoft.com/office/drawing/2010/main" val="0"/>
-              </a:ext>
-            </a:extLst>
-          </a:blip>
-          <a:srcRect/>
-          <a:stretch>
-            <a:fillRect/>
-          </a:stretch>
-        </p:blipFill>
-        <p:spPr bwMode="auto">
+        </p:nvSpPr>
+        <p:spPr>
           <a:xfrm>
-            <a:off x="1525588" y="3324112"/>
-            <a:ext cx="4710213" cy="3533887"/>
+            <a:off x="2753958" y="2538805"/>
+            <a:ext cx="2463501" cy="2205317"/>
+          </a:xfrm>
+          <a:prstGeom prst="ellipse">
+            <a:avLst/>
+          </a:prstGeom>
+          <a:blipFill>
+            <a:blip r:embed="rId2"/>
+            <a:tile tx="0" ty="0" sx="100000" sy="100000" flip="none" algn="tl"/>
+          </a:blipFill>
+        </p:spPr>
+        <p:style>
+          <a:lnRef idx="2">
+            <a:schemeClr val="accent1">
+              <a:shade val="15000"/>
+            </a:schemeClr>
+          </a:lnRef>
+          <a:fillRef idx="1">
+            <a:schemeClr val="accent1"/>
+          </a:fillRef>
+          <a:effectRef idx="0">
+            <a:schemeClr val="accent1"/>
+          </a:effectRef>
+          <a:fontRef idx="minor">
+            <a:schemeClr val="lt1"/>
+          </a:fontRef>
+        </p:style>
+        <p:txBody>
+          <a:bodyPr rtlCol="0" anchor="ctr"/>
+          <a:lstStyle/>
+          <a:p>
+            <a:pPr algn="ctr"/>
+            <a:endParaRPr lang="en-US"/>
+          </a:p>
+        </p:txBody>
+      </p:sp>
+      <p:sp>
+        <p:nvSpPr>
+          <p:cNvPr id="5" name="Oval 4">
+            <a:extLst>
+              <a:ext uri="{FF2B5EF4-FFF2-40B4-BE49-F238E27FC236}">
+                <a16:creationId xmlns:a16="http://schemas.microsoft.com/office/drawing/2014/main" id="{D977A3F4-E43E-EF76-B406-82D6CBE2CFDA}"/>
+              </a:ext>
+            </a:extLst>
+          </p:cNvPr>
+          <p:cNvSpPr/>
+          <p:nvPr/>
+        </p:nvSpPr>
+        <p:spPr>
+          <a:xfrm>
+            <a:off x="6096000" y="2538805"/>
+            <a:ext cx="2463501" cy="2205317"/>
+          </a:xfrm>
+          <a:prstGeom prst="ellipse">
+            <a:avLst/>
+          </a:prstGeom>
+          <a:blipFill>
+            <a:blip r:embed="rId3"/>
+            <a:tile tx="0" ty="0" sx="100000" sy="100000" flip="none" algn="tl"/>
+          </a:blipFill>
+        </p:spPr>
+        <p:style>
+          <a:lnRef idx="2">
+            <a:schemeClr val="accent1">
+              <a:shade val="15000"/>
+            </a:schemeClr>
+          </a:lnRef>
+          <a:fillRef idx="1">
+            <a:schemeClr val="accent1"/>
+          </a:fillRef>
+          <a:effectRef idx="0">
+            <a:schemeClr val="accent1"/>
+          </a:effectRef>
+          <a:fontRef idx="minor">
+            <a:schemeClr val="lt1"/>
+          </a:fontRef>
+        </p:style>
+        <p:txBody>
+          <a:bodyPr rtlCol="0" anchor="ctr"/>
+          <a:lstStyle/>
+          <a:p>
+            <a:pPr algn="ctr"/>
+            <a:endParaRPr lang="en-US"/>
+          </a:p>
+        </p:txBody>
+      </p:sp>
+      <p:sp>
+        <p:nvSpPr>
+          <p:cNvPr id="6" name="TextBox 5">
+            <a:extLst>
+              <a:ext uri="{FF2B5EF4-FFF2-40B4-BE49-F238E27FC236}">
+                <a16:creationId xmlns:a16="http://schemas.microsoft.com/office/drawing/2014/main" id="{C83978E0-73E1-CFD7-C28A-1DCD8702D823}"/>
+              </a:ext>
+            </a:extLst>
+          </p:cNvPr>
+          <p:cNvSpPr txBox="1"/>
+          <p:nvPr/>
+        </p:nvSpPr>
+        <p:spPr>
+          <a:xfrm>
+            <a:off x="4604273" y="3098202"/>
+            <a:ext cx="2463501" cy="1015663"/>
           </a:xfrm>
           <a:prstGeom prst="rect">
             <a:avLst/>
           </a:prstGeom>
           <a:noFill/>
-          <a:extLst>
-            <a:ext uri="{909E8E84-426E-40DD-AFC4-6F175D3DCCD1}">
-              <a14:hiddenFill xmlns:a14="http://schemas.microsoft.com/office/drawing/2010/main">
-                <a:solidFill>
-                  <a:srgbClr val="FFFFFF"/>
-                </a:solidFill>
-              </a14:hiddenFill>
-            </a:ext>
-          </a:extLst>
         </p:spPr>
-      </p:pic>
+        <p:txBody>
+          <a:bodyPr wrap="square" rtlCol="0">
+            <a:spAutoFit/>
+          </a:bodyPr>
+          <a:lstStyle/>
+          <a:p>
+            <a:r>
+              <a:rPr lang="en-US" sz="3000" dirty="0"/>
+              <a:t>Need a real image here</a:t>
+            </a:r>
+          </a:p>
+        </p:txBody>
+      </p:sp>
     </p:spTree>
     <p:extLst>
       <p:ext uri="{BB962C8B-B14F-4D97-AF65-F5344CB8AC3E}">

</xml_diff>

<commit_message>
updates to the draft
</commit_message>
<xml_diff>
--- a/nesh/graphics.pptx
+++ b/nesh/graphics.pptx
@@ -265,7 +265,7 @@
           <a:p>
             <a:fld id="{21FCD2E4-10FD-024D-A6CE-709BDBB9CDF1}" type="datetimeFigureOut">
               <a:rPr lang="en-US" smtClean="0"/>
-              <a:t>1/12/24</a:t>
+              <a:t>1/15/24</a:t>
             </a:fld>
             <a:endParaRPr lang="en-US"/>
           </a:p>
@@ -463,7 +463,7 @@
           <a:p>
             <a:fld id="{21FCD2E4-10FD-024D-A6CE-709BDBB9CDF1}" type="datetimeFigureOut">
               <a:rPr lang="en-US" smtClean="0"/>
-              <a:t>1/12/24</a:t>
+              <a:t>1/15/24</a:t>
             </a:fld>
             <a:endParaRPr lang="en-US"/>
           </a:p>
@@ -671,7 +671,7 @@
           <a:p>
             <a:fld id="{21FCD2E4-10FD-024D-A6CE-709BDBB9CDF1}" type="datetimeFigureOut">
               <a:rPr lang="en-US" smtClean="0"/>
-              <a:t>1/12/24</a:t>
+              <a:t>1/15/24</a:t>
             </a:fld>
             <a:endParaRPr lang="en-US"/>
           </a:p>
@@ -869,7 +869,7 @@
           <a:p>
             <a:fld id="{21FCD2E4-10FD-024D-A6CE-709BDBB9CDF1}" type="datetimeFigureOut">
               <a:rPr lang="en-US" smtClean="0"/>
-              <a:t>1/12/24</a:t>
+              <a:t>1/15/24</a:t>
             </a:fld>
             <a:endParaRPr lang="en-US"/>
           </a:p>
@@ -1144,7 +1144,7 @@
           <a:p>
             <a:fld id="{21FCD2E4-10FD-024D-A6CE-709BDBB9CDF1}" type="datetimeFigureOut">
               <a:rPr lang="en-US" smtClean="0"/>
-              <a:t>1/12/24</a:t>
+              <a:t>1/15/24</a:t>
             </a:fld>
             <a:endParaRPr lang="en-US"/>
           </a:p>
@@ -1409,7 +1409,7 @@
           <a:p>
             <a:fld id="{21FCD2E4-10FD-024D-A6CE-709BDBB9CDF1}" type="datetimeFigureOut">
               <a:rPr lang="en-US" smtClean="0"/>
-              <a:t>1/12/24</a:t>
+              <a:t>1/15/24</a:t>
             </a:fld>
             <a:endParaRPr lang="en-US"/>
           </a:p>
@@ -1821,7 +1821,7 @@
           <a:p>
             <a:fld id="{21FCD2E4-10FD-024D-A6CE-709BDBB9CDF1}" type="datetimeFigureOut">
               <a:rPr lang="en-US" smtClean="0"/>
-              <a:t>1/12/24</a:t>
+              <a:t>1/15/24</a:t>
             </a:fld>
             <a:endParaRPr lang="en-US"/>
           </a:p>
@@ -1962,7 +1962,7 @@
           <a:p>
             <a:fld id="{21FCD2E4-10FD-024D-A6CE-709BDBB9CDF1}" type="datetimeFigureOut">
               <a:rPr lang="en-US" smtClean="0"/>
-              <a:t>1/12/24</a:t>
+              <a:t>1/15/24</a:t>
             </a:fld>
             <a:endParaRPr lang="en-US"/>
           </a:p>
@@ -2075,7 +2075,7 @@
           <a:p>
             <a:fld id="{21FCD2E4-10FD-024D-A6CE-709BDBB9CDF1}" type="datetimeFigureOut">
               <a:rPr lang="en-US" smtClean="0"/>
-              <a:t>1/12/24</a:t>
+              <a:t>1/15/24</a:t>
             </a:fld>
             <a:endParaRPr lang="en-US"/>
           </a:p>
@@ -2386,7 +2386,7 @@
           <a:p>
             <a:fld id="{21FCD2E4-10FD-024D-A6CE-709BDBB9CDF1}" type="datetimeFigureOut">
               <a:rPr lang="en-US" smtClean="0"/>
-              <a:t>1/12/24</a:t>
+              <a:t>1/15/24</a:t>
             </a:fld>
             <a:endParaRPr lang="en-US"/>
           </a:p>
@@ -2674,7 +2674,7 @@
           <a:p>
             <a:fld id="{21FCD2E4-10FD-024D-A6CE-709BDBB9CDF1}" type="datetimeFigureOut">
               <a:rPr lang="en-US" smtClean="0"/>
-              <a:t>1/12/24</a:t>
+              <a:t>1/15/24</a:t>
             </a:fld>
             <a:endParaRPr lang="en-US"/>
           </a:p>
@@ -2915,7 +2915,7 @@
           <a:p>
             <a:fld id="{21FCD2E4-10FD-024D-A6CE-709BDBB9CDF1}" type="datetimeFigureOut">
               <a:rPr lang="en-US" smtClean="0"/>
-              <a:t>1/12/24</a:t>
+              <a:t>1/15/24</a:t>
             </a:fld>
             <a:endParaRPr lang="en-US"/>
           </a:p>
@@ -3962,8 +3962,8 @@
             </a:fontRef>
           </p:style>
         </p:cxnSp>
-        <mc:AlternateContent xmlns:mc="http://schemas.openxmlformats.org/markup-compatibility/2006">
-          <mc:Choice xmlns:a14="http://schemas.microsoft.com/office/drawing/2010/main" Requires="a14">
+        <mc:AlternateContent xmlns:mc="http://schemas.openxmlformats.org/markup-compatibility/2006" xmlns:a14="http://schemas.microsoft.com/office/drawing/2010/main">
+          <mc:Choice Requires="a14">
             <p:sp>
               <p:nvSpPr>
                 <p:cNvPr id="12" name="TextBox 11">
@@ -4032,7 +4032,7 @@
               </p:txBody>
             </p:sp>
           </mc:Choice>
-          <mc:Fallback>
+          <mc:Fallback xmlns="">
             <p:sp>
               <p:nvSpPr>
                 <p:cNvPr id="12" name="TextBox 11">
@@ -4649,8 +4649,8 @@
           </a:p>
         </p:txBody>
       </p:sp>
-      <mc:AlternateContent xmlns:mc="http://schemas.openxmlformats.org/markup-compatibility/2006">
-        <mc:Choice xmlns:a14="http://schemas.microsoft.com/office/drawing/2010/main" Requires="a14">
+      <mc:AlternateContent xmlns:mc="http://schemas.openxmlformats.org/markup-compatibility/2006" xmlns:a14="http://schemas.microsoft.com/office/drawing/2010/main">
+        <mc:Choice Requires="a14">
           <p:sp>
             <p:nvSpPr>
               <p:cNvPr id="4" name="TextBox 3">
@@ -4702,7 +4702,7 @@
             </p:txBody>
           </p:sp>
         </mc:Choice>
-        <mc:Fallback>
+        <mc:Fallback xmlns="">
           <p:sp>
             <p:nvSpPr>
               <p:cNvPr id="4" name="TextBox 3">
@@ -4770,8 +4770,8 @@
             <a:chExt cx="1753536" cy="546702"/>
           </a:xfrm>
         </p:grpSpPr>
-        <mc:AlternateContent xmlns:mc="http://schemas.openxmlformats.org/markup-compatibility/2006">
-          <mc:Choice xmlns:a14="http://schemas.microsoft.com/office/drawing/2010/main" Requires="a14">
+        <mc:AlternateContent xmlns:mc="http://schemas.openxmlformats.org/markup-compatibility/2006" xmlns:a14="http://schemas.microsoft.com/office/drawing/2010/main">
+          <mc:Choice Requires="a14">
             <p:sp>
               <p:nvSpPr>
                 <p:cNvPr id="3" name="TextBox 2">
@@ -4823,7 +4823,7 @@
               </p:txBody>
             </p:sp>
           </mc:Choice>
-          <mc:Fallback>
+          <mc:Fallback xmlns="">
             <p:sp>
               <p:nvSpPr>
                 <p:cNvPr id="3" name="TextBox 2">
@@ -5524,6 +5524,53 @@
           <a:chExt cx="0" cy="0"/>
         </a:xfrm>
       </p:grpSpPr>
+      <p:pic>
+        <p:nvPicPr>
+          <p:cNvPr id="1028" name="Picture 4">
+            <a:extLst>
+              <a:ext uri="{FF2B5EF4-FFF2-40B4-BE49-F238E27FC236}">
+                <a16:creationId xmlns:a16="http://schemas.microsoft.com/office/drawing/2014/main" id="{E940FAB5-AF83-814D-7CD8-3D838A17DB7E}"/>
+              </a:ext>
+            </a:extLst>
+          </p:cNvPr>
+          <p:cNvPicPr>
+            <a:picLocks noChangeAspect="1" noChangeArrowheads="1"/>
+          </p:cNvPicPr>
+          <p:nvPr/>
+        </p:nvPicPr>
+        <p:blipFill>
+          <a:blip r:embed="rId2">
+            <a:extLst>
+              <a:ext uri="{28A0092B-C50C-407E-A947-70E740481C1C}">
+                <a14:useLocalDpi xmlns:a14="http://schemas.microsoft.com/office/drawing/2010/main" val="0"/>
+              </a:ext>
+            </a:extLst>
+          </a:blip>
+          <a:srcRect/>
+          <a:stretch>
+            <a:fillRect/>
+          </a:stretch>
+        </p:blipFill>
+        <p:spPr bwMode="auto">
+          <a:xfrm>
+            <a:off x="1530350" y="0"/>
+            <a:ext cx="9131300" cy="6858000"/>
+          </a:xfrm>
+          <a:prstGeom prst="rect">
+            <a:avLst/>
+          </a:prstGeom>
+          <a:noFill/>
+          <a:extLst>
+            <a:ext uri="{909E8E84-426E-40DD-AFC4-6F175D3DCCD1}">
+              <a14:hiddenFill xmlns:a14="http://schemas.microsoft.com/office/drawing/2010/main">
+                <a:solidFill>
+                  <a:srgbClr val="FFFFFF"/>
+                </a:solidFill>
+              </a14:hiddenFill>
+            </a:ext>
+          </a:extLst>
+        </p:spPr>
+      </p:pic>
     </p:spTree>
     <p:extLst>
       <p:ext uri="{BB962C8B-B14F-4D97-AF65-F5344CB8AC3E}">
@@ -5678,10 +5725,10 @@
       </p:grpSpPr>
       <p:pic>
         <p:nvPicPr>
-          <p:cNvPr id="2" name="Picture 2">
-            <a:extLst>
-              <a:ext uri="{FF2B5EF4-FFF2-40B4-BE49-F238E27FC236}">
-                <a16:creationId xmlns:a16="http://schemas.microsoft.com/office/drawing/2014/main" id="{204BAF71-578E-A62F-0CB5-1A8A12ACECA2}"/>
+          <p:cNvPr id="3" name="Picture 2">
+            <a:extLst>
+              <a:ext uri="{FF2B5EF4-FFF2-40B4-BE49-F238E27FC236}">
+                <a16:creationId xmlns:a16="http://schemas.microsoft.com/office/drawing/2014/main" id="{BC4B536A-663F-BFF2-88CF-7AFF296C1A32}"/>
               </a:ext>
             </a:extLst>
           </p:cNvPr>
@@ -5705,8 +5752,8 @@
         </p:blipFill>
         <p:spPr bwMode="auto">
           <a:xfrm>
-            <a:off x="2304402" y="505502"/>
-            <a:ext cx="6947174" cy="5212191"/>
+            <a:off x="2191282" y="354331"/>
+            <a:ext cx="7168071" cy="5383530"/>
           </a:xfrm>
           <a:prstGeom prst="rect">
             <a:avLst/>

</xml_diff>

<commit_message>
Working of SEM images of growing facet area
</commit_message>
<xml_diff>
--- a/nesh/graphics.pptx
+++ b/nesh/graphics.pptx
@@ -18,6 +18,7 @@
     <p:sldId id="266" r:id="rId12"/>
     <p:sldId id="268" r:id="rId13"/>
     <p:sldId id="269" r:id="rId14"/>
+    <p:sldId id="270" r:id="rId15"/>
   </p:sldIdLst>
   <p:sldSz cx="12192000" cy="6858000"/>
   <p:notesSz cx="6858000" cy="9144000"/>
@@ -271,7 +272,7 @@
           <a:p>
             <a:fld id="{21FCD2E4-10FD-024D-A6CE-709BDBB9CDF1}" type="datetimeFigureOut">
               <a:rPr lang="en-US" smtClean="0"/>
-              <a:t>1/27/24</a:t>
+              <a:t>1/28/24</a:t>
             </a:fld>
             <a:endParaRPr lang="en-US"/>
           </a:p>
@@ -469,7 +470,7 @@
           <a:p>
             <a:fld id="{21FCD2E4-10FD-024D-A6CE-709BDBB9CDF1}" type="datetimeFigureOut">
               <a:rPr lang="en-US" smtClean="0"/>
-              <a:t>1/27/24</a:t>
+              <a:t>1/28/24</a:t>
             </a:fld>
             <a:endParaRPr lang="en-US"/>
           </a:p>
@@ -677,7 +678,7 @@
           <a:p>
             <a:fld id="{21FCD2E4-10FD-024D-A6CE-709BDBB9CDF1}" type="datetimeFigureOut">
               <a:rPr lang="en-US" smtClean="0"/>
-              <a:t>1/27/24</a:t>
+              <a:t>1/28/24</a:t>
             </a:fld>
             <a:endParaRPr lang="en-US"/>
           </a:p>
@@ -875,7 +876,7 @@
           <a:p>
             <a:fld id="{21FCD2E4-10FD-024D-A6CE-709BDBB9CDF1}" type="datetimeFigureOut">
               <a:rPr lang="en-US" smtClean="0"/>
-              <a:t>1/27/24</a:t>
+              <a:t>1/28/24</a:t>
             </a:fld>
             <a:endParaRPr lang="en-US"/>
           </a:p>
@@ -1150,7 +1151,7 @@
           <a:p>
             <a:fld id="{21FCD2E4-10FD-024D-A6CE-709BDBB9CDF1}" type="datetimeFigureOut">
               <a:rPr lang="en-US" smtClean="0"/>
-              <a:t>1/27/24</a:t>
+              <a:t>1/28/24</a:t>
             </a:fld>
             <a:endParaRPr lang="en-US"/>
           </a:p>
@@ -1415,7 +1416,7 @@
           <a:p>
             <a:fld id="{21FCD2E4-10FD-024D-A6CE-709BDBB9CDF1}" type="datetimeFigureOut">
               <a:rPr lang="en-US" smtClean="0"/>
-              <a:t>1/27/24</a:t>
+              <a:t>1/28/24</a:t>
             </a:fld>
             <a:endParaRPr lang="en-US"/>
           </a:p>
@@ -1827,7 +1828,7 @@
           <a:p>
             <a:fld id="{21FCD2E4-10FD-024D-A6CE-709BDBB9CDF1}" type="datetimeFigureOut">
               <a:rPr lang="en-US" smtClean="0"/>
-              <a:t>1/27/24</a:t>
+              <a:t>1/28/24</a:t>
             </a:fld>
             <a:endParaRPr lang="en-US"/>
           </a:p>
@@ -1968,7 +1969,7 @@
           <a:p>
             <a:fld id="{21FCD2E4-10FD-024D-A6CE-709BDBB9CDF1}" type="datetimeFigureOut">
               <a:rPr lang="en-US" smtClean="0"/>
-              <a:t>1/27/24</a:t>
+              <a:t>1/28/24</a:t>
             </a:fld>
             <a:endParaRPr lang="en-US"/>
           </a:p>
@@ -2081,7 +2082,7 @@
           <a:p>
             <a:fld id="{21FCD2E4-10FD-024D-A6CE-709BDBB9CDF1}" type="datetimeFigureOut">
               <a:rPr lang="en-US" smtClean="0"/>
-              <a:t>1/27/24</a:t>
+              <a:t>1/28/24</a:t>
             </a:fld>
             <a:endParaRPr lang="en-US"/>
           </a:p>
@@ -2392,7 +2393,7 @@
           <a:p>
             <a:fld id="{21FCD2E4-10FD-024D-A6CE-709BDBB9CDF1}" type="datetimeFigureOut">
               <a:rPr lang="en-US" smtClean="0"/>
-              <a:t>1/27/24</a:t>
+              <a:t>1/28/24</a:t>
             </a:fld>
             <a:endParaRPr lang="en-US"/>
           </a:p>
@@ -2680,7 +2681,7 @@
           <a:p>
             <a:fld id="{21FCD2E4-10FD-024D-A6CE-709BDBB9CDF1}" type="datetimeFigureOut">
               <a:rPr lang="en-US" smtClean="0"/>
-              <a:t>1/27/24</a:t>
+              <a:t>1/28/24</a:t>
             </a:fld>
             <a:endParaRPr lang="en-US"/>
           </a:p>
@@ -2921,7 +2922,7 @@
           <a:p>
             <a:fld id="{21FCD2E4-10FD-024D-A6CE-709BDBB9CDF1}" type="datetimeFigureOut">
               <a:rPr lang="en-US" smtClean="0"/>
-              <a:t>1/27/24</a:t>
+              <a:t>1/28/24</a:t>
             </a:fld>
             <a:endParaRPr lang="en-US"/>
           </a:p>
@@ -6292,10 +6293,10 @@
       </p:pic>
       <p:pic>
         <p:nvPicPr>
-          <p:cNvPr id="2052" name="Picture 4">
-            <a:extLst>
-              <a:ext uri="{FF2B5EF4-FFF2-40B4-BE49-F238E27FC236}">
-                <a16:creationId xmlns:a16="http://schemas.microsoft.com/office/drawing/2014/main" id="{C6529CED-52F8-89F7-AACE-8EC2AC8DD7A7}"/>
+          <p:cNvPr id="2054" name="Picture 6">
+            <a:extLst>
+              <a:ext uri="{FF2B5EF4-FFF2-40B4-BE49-F238E27FC236}">
+                <a16:creationId xmlns:a16="http://schemas.microsoft.com/office/drawing/2014/main" id="{B99C2432-BA15-D1E1-4ABD-A2771DAD2816}"/>
               </a:ext>
             </a:extLst>
           </p:cNvPr>
@@ -6319,8 +6320,8 @@
         </p:blipFill>
         <p:spPr bwMode="auto">
           <a:xfrm>
-            <a:off x="429896" y="1318321"/>
-            <a:ext cx="5207847" cy="3657600"/>
+            <a:off x="429896" y="1256684"/>
+            <a:ext cx="5666104" cy="3917665"/>
           </a:xfrm>
           <a:prstGeom prst="rect">
             <a:avLst/>
@@ -6495,6 +6496,94 @@
     <p:extLst>
       <p:ext uri="{BB962C8B-B14F-4D97-AF65-F5344CB8AC3E}">
         <p14:creationId xmlns:p14="http://schemas.microsoft.com/office/powerpoint/2010/main" val="1895107107"/>
+      </p:ext>
+    </p:extLst>
+  </p:cSld>
+  <p:clrMapOvr>
+    <a:masterClrMapping/>
+  </p:clrMapOvr>
+</p:sld>
+</file>
+
+<file path=ppt/slides/slide14.xml><?xml version="1.0" encoding="utf-8"?>
+<p:sld xmlns:a="http://schemas.openxmlformats.org/drawingml/2006/main" xmlns:r="http://schemas.openxmlformats.org/officeDocument/2006/relationships" xmlns:p="http://schemas.openxmlformats.org/presentationml/2006/main">
+  <p:cSld>
+    <p:spTree>
+      <p:nvGrpSpPr>
+        <p:cNvPr id="1" name=""/>
+        <p:cNvGrpSpPr/>
+        <p:nvPr/>
+      </p:nvGrpSpPr>
+      <p:grpSpPr>
+        <a:xfrm>
+          <a:off x="0" y="0"/>
+          <a:ext cx="0" cy="0"/>
+          <a:chOff x="0" y="0"/>
+          <a:chExt cx="0" cy="0"/>
+        </a:xfrm>
+      </p:grpSpPr>
+      <p:pic>
+        <p:nvPicPr>
+          <p:cNvPr id="21" name="Picture 20">
+            <a:extLst>
+              <a:ext uri="{FF2B5EF4-FFF2-40B4-BE49-F238E27FC236}">
+                <a16:creationId xmlns:a16="http://schemas.microsoft.com/office/drawing/2014/main" id="{0FDAED04-B18E-3D3D-F09B-593F1C2572CB}"/>
+              </a:ext>
+            </a:extLst>
+          </p:cNvPr>
+          <p:cNvPicPr>
+            <a:picLocks noChangeAspect="1"/>
+          </p:cNvPicPr>
+          <p:nvPr/>
+        </p:nvPicPr>
+        <p:blipFill rotWithShape="1">
+          <a:blip r:embed="rId2"/>
+          <a:srcRect l="19926" t="32429" r="19828" b="32543"/>
+          <a:stretch/>
+        </p:blipFill>
+        <p:spPr>
+          <a:xfrm>
+            <a:off x="5497823" y="598523"/>
+            <a:ext cx="3192651" cy="2402238"/>
+          </a:xfrm>
+          <a:prstGeom prst="rect">
+            <a:avLst/>
+          </a:prstGeom>
+        </p:spPr>
+      </p:pic>
+      <p:pic>
+        <p:nvPicPr>
+          <p:cNvPr id="19" name="Picture 18">
+            <a:extLst>
+              <a:ext uri="{FF2B5EF4-FFF2-40B4-BE49-F238E27FC236}">
+                <a16:creationId xmlns:a16="http://schemas.microsoft.com/office/drawing/2014/main" id="{2499EF7D-39D6-081D-65E4-1B223F050304}"/>
+              </a:ext>
+            </a:extLst>
+          </p:cNvPr>
+          <p:cNvPicPr>
+            <a:picLocks noChangeAspect="1"/>
+          </p:cNvPicPr>
+          <p:nvPr/>
+        </p:nvPicPr>
+        <p:blipFill rotWithShape="1">
+          <a:blip r:embed="rId3"/>
+          <a:srcRect l="19779" t="32430" r="19975" b="32542"/>
+          <a:stretch/>
+        </p:blipFill>
+        <p:spPr>
+          <a:xfrm>
+            <a:off x="5489584" y="2860714"/>
+            <a:ext cx="3192651" cy="2402238"/>
+          </a:xfrm>
+          <a:prstGeom prst="rect">
+            <a:avLst/>
+          </a:prstGeom>
+        </p:spPr>
+      </p:pic>
+    </p:spTree>
+    <p:extLst>
+      <p:ext uri="{BB962C8B-B14F-4D97-AF65-F5344CB8AC3E}">
+        <p14:creationId xmlns:p14="http://schemas.microsoft.com/office/powerpoint/2010/main" val="1716866906"/>
       </p:ext>
     </p:extLst>
   </p:cSld>

</xml_diff>

<commit_message>
Laying out a game plan for hexagonal crystals
</commit_message>
<xml_diff>
--- a/nesh/graphics.pptx
+++ b/nesh/graphics.pptx
@@ -4,6 +4,9 @@
   <p:sldMasterIdLst>
     <p:sldMasterId id="2147483648" r:id="rId1"/>
   </p:sldMasterIdLst>
+  <p:notesMasterIdLst>
+    <p:notesMasterId r:id="rId20"/>
+  </p:notesMasterIdLst>
   <p:sldIdLst>
     <p:sldId id="260" r:id="rId2"/>
     <p:sldId id="257" r:id="rId3"/>
@@ -17,8 +20,12 @@
     <p:sldId id="264" r:id="rId11"/>
     <p:sldId id="266" r:id="rId12"/>
     <p:sldId id="268" r:id="rId13"/>
-    <p:sldId id="269" r:id="rId14"/>
-    <p:sldId id="270" r:id="rId15"/>
+    <p:sldId id="271" r:id="rId14"/>
+    <p:sldId id="269" r:id="rId15"/>
+    <p:sldId id="270" r:id="rId16"/>
+    <p:sldId id="256" r:id="rId17"/>
+    <p:sldId id="273" r:id="rId18"/>
+    <p:sldId id="272" r:id="rId19"/>
   </p:sldIdLst>
   <p:sldSz cx="12192000" cy="6858000"/>
   <p:notesSz cx="6858000" cy="9144000"/>
@@ -125,6 +132,439 @@
 </p:presentation>
 </file>
 
+<file path=ppt/notesMasters/notesMaster1.xml><?xml version="1.0" encoding="utf-8"?>
+<p:notesMaster xmlns:a="http://schemas.openxmlformats.org/drawingml/2006/main" xmlns:r="http://schemas.openxmlformats.org/officeDocument/2006/relationships" xmlns:p="http://schemas.openxmlformats.org/presentationml/2006/main">
+  <p:cSld>
+    <p:bg>
+      <p:bgRef idx="1001">
+        <a:schemeClr val="bg1"/>
+      </p:bgRef>
+    </p:bg>
+    <p:spTree>
+      <p:nvGrpSpPr>
+        <p:cNvPr id="1" name=""/>
+        <p:cNvGrpSpPr/>
+        <p:nvPr/>
+      </p:nvGrpSpPr>
+      <p:grpSpPr>
+        <a:xfrm>
+          <a:off x="0" y="0"/>
+          <a:ext cx="0" cy="0"/>
+          <a:chOff x="0" y="0"/>
+          <a:chExt cx="0" cy="0"/>
+        </a:xfrm>
+      </p:grpSpPr>
+      <p:sp>
+        <p:nvSpPr>
+          <p:cNvPr id="2" name="Header Placeholder 1"/>
+          <p:cNvSpPr>
+            <a:spLocks noGrp="1"/>
+          </p:cNvSpPr>
+          <p:nvPr>
+            <p:ph type="hdr" sz="quarter"/>
+          </p:nvPr>
+        </p:nvSpPr>
+        <p:spPr>
+          <a:xfrm>
+            <a:off x="0" y="0"/>
+            <a:ext cx="2971800" cy="458788"/>
+          </a:xfrm>
+          <a:prstGeom prst="rect">
+            <a:avLst/>
+          </a:prstGeom>
+        </p:spPr>
+        <p:txBody>
+          <a:bodyPr vert="horz" lIns="91440" tIns="45720" rIns="91440" bIns="45720" rtlCol="0"/>
+          <a:lstStyle>
+            <a:lvl1pPr algn="l">
+              <a:defRPr sz="1200"/>
+            </a:lvl1pPr>
+          </a:lstStyle>
+          <a:p>
+            <a:endParaRPr lang="en-US"/>
+          </a:p>
+        </p:txBody>
+      </p:sp>
+      <p:sp>
+        <p:nvSpPr>
+          <p:cNvPr id="3" name="Date Placeholder 2"/>
+          <p:cNvSpPr>
+            <a:spLocks noGrp="1"/>
+          </p:cNvSpPr>
+          <p:nvPr>
+            <p:ph type="dt" idx="1"/>
+          </p:nvPr>
+        </p:nvSpPr>
+        <p:spPr>
+          <a:xfrm>
+            <a:off x="3884613" y="0"/>
+            <a:ext cx="2971800" cy="458788"/>
+          </a:xfrm>
+          <a:prstGeom prst="rect">
+            <a:avLst/>
+          </a:prstGeom>
+        </p:spPr>
+        <p:txBody>
+          <a:bodyPr vert="horz" lIns="91440" tIns="45720" rIns="91440" bIns="45720" rtlCol="0"/>
+          <a:lstStyle>
+            <a:lvl1pPr algn="r">
+              <a:defRPr sz="1200"/>
+            </a:lvl1pPr>
+          </a:lstStyle>
+          <a:p>
+            <a:fld id="{82C47B78-F32E-9342-8D83-D853785C664C}" type="datetimeFigureOut">
+              <a:rPr lang="en-US" smtClean="0"/>
+              <a:t>2/20/24</a:t>
+            </a:fld>
+            <a:endParaRPr lang="en-US"/>
+          </a:p>
+        </p:txBody>
+      </p:sp>
+      <p:sp>
+        <p:nvSpPr>
+          <p:cNvPr id="4" name="Slide Image Placeholder 3"/>
+          <p:cNvSpPr>
+            <a:spLocks noGrp="1" noRot="1" noChangeAspect="1"/>
+          </p:cNvSpPr>
+          <p:nvPr>
+            <p:ph type="sldImg" idx="2"/>
+          </p:nvPr>
+        </p:nvSpPr>
+        <p:spPr>
+          <a:xfrm>
+            <a:off x="685800" y="1143000"/>
+            <a:ext cx="5486400" cy="3086100"/>
+          </a:xfrm>
+          <a:prstGeom prst="rect">
+            <a:avLst/>
+          </a:prstGeom>
+          <a:noFill/>
+          <a:ln w="12700">
+            <a:solidFill>
+              <a:prstClr val="black"/>
+            </a:solidFill>
+          </a:ln>
+        </p:spPr>
+        <p:txBody>
+          <a:bodyPr vert="horz" lIns="91440" tIns="45720" rIns="91440" bIns="45720" rtlCol="0" anchor="ctr"/>
+          <a:lstStyle/>
+          <a:p>
+            <a:endParaRPr lang="en-US"/>
+          </a:p>
+        </p:txBody>
+      </p:sp>
+      <p:sp>
+        <p:nvSpPr>
+          <p:cNvPr id="5" name="Notes Placeholder 4"/>
+          <p:cNvSpPr>
+            <a:spLocks noGrp="1"/>
+          </p:cNvSpPr>
+          <p:nvPr>
+            <p:ph type="body" sz="quarter" idx="3"/>
+          </p:nvPr>
+        </p:nvSpPr>
+        <p:spPr>
+          <a:xfrm>
+            <a:off x="685800" y="4400550"/>
+            <a:ext cx="5486400" cy="3600450"/>
+          </a:xfrm>
+          <a:prstGeom prst="rect">
+            <a:avLst/>
+          </a:prstGeom>
+        </p:spPr>
+        <p:txBody>
+          <a:bodyPr vert="horz" lIns="91440" tIns="45720" rIns="91440" bIns="45720" rtlCol="0"/>
+          <a:lstStyle/>
+          <a:p>
+            <a:pPr lvl="0"/>
+            <a:r>
+              <a:rPr lang="en-US"/>
+              <a:t>Click to edit Master text styles</a:t>
+            </a:r>
+          </a:p>
+          <a:p>
+            <a:pPr lvl="1"/>
+            <a:r>
+              <a:rPr lang="en-US"/>
+              <a:t>Second level</a:t>
+            </a:r>
+          </a:p>
+          <a:p>
+            <a:pPr lvl="2"/>
+            <a:r>
+              <a:rPr lang="en-US"/>
+              <a:t>Third level</a:t>
+            </a:r>
+          </a:p>
+          <a:p>
+            <a:pPr lvl="3"/>
+            <a:r>
+              <a:rPr lang="en-US"/>
+              <a:t>Fourth level</a:t>
+            </a:r>
+          </a:p>
+          <a:p>
+            <a:pPr lvl="4"/>
+            <a:r>
+              <a:rPr lang="en-US"/>
+              <a:t>Fifth level</a:t>
+            </a:r>
+          </a:p>
+        </p:txBody>
+      </p:sp>
+      <p:sp>
+        <p:nvSpPr>
+          <p:cNvPr id="6" name="Footer Placeholder 5"/>
+          <p:cNvSpPr>
+            <a:spLocks noGrp="1"/>
+          </p:cNvSpPr>
+          <p:nvPr>
+            <p:ph type="ftr" sz="quarter" idx="4"/>
+          </p:nvPr>
+        </p:nvSpPr>
+        <p:spPr>
+          <a:xfrm>
+            <a:off x="0" y="8685213"/>
+            <a:ext cx="2971800" cy="458787"/>
+          </a:xfrm>
+          <a:prstGeom prst="rect">
+            <a:avLst/>
+          </a:prstGeom>
+        </p:spPr>
+        <p:txBody>
+          <a:bodyPr vert="horz" lIns="91440" tIns="45720" rIns="91440" bIns="45720" rtlCol="0" anchor="b"/>
+          <a:lstStyle>
+            <a:lvl1pPr algn="l">
+              <a:defRPr sz="1200"/>
+            </a:lvl1pPr>
+          </a:lstStyle>
+          <a:p>
+            <a:endParaRPr lang="en-US"/>
+          </a:p>
+        </p:txBody>
+      </p:sp>
+      <p:sp>
+        <p:nvSpPr>
+          <p:cNvPr id="7" name="Slide Number Placeholder 6"/>
+          <p:cNvSpPr>
+            <a:spLocks noGrp="1"/>
+          </p:cNvSpPr>
+          <p:nvPr>
+            <p:ph type="sldNum" sz="quarter" idx="5"/>
+          </p:nvPr>
+        </p:nvSpPr>
+        <p:spPr>
+          <a:xfrm>
+            <a:off x="3884613" y="8685213"/>
+            <a:ext cx="2971800" cy="458787"/>
+          </a:xfrm>
+          <a:prstGeom prst="rect">
+            <a:avLst/>
+          </a:prstGeom>
+        </p:spPr>
+        <p:txBody>
+          <a:bodyPr vert="horz" lIns="91440" tIns="45720" rIns="91440" bIns="45720" rtlCol="0" anchor="b"/>
+          <a:lstStyle>
+            <a:lvl1pPr algn="r">
+              <a:defRPr sz="1200"/>
+            </a:lvl1pPr>
+          </a:lstStyle>
+          <a:p>
+            <a:fld id="{7B46638A-0CF2-5C48-B6FA-D3D6062515CD}" type="slidenum">
+              <a:rPr lang="en-US" smtClean="0"/>
+              <a:t>‹#›</a:t>
+            </a:fld>
+            <a:endParaRPr lang="en-US"/>
+          </a:p>
+        </p:txBody>
+      </p:sp>
+    </p:spTree>
+    <p:extLst>
+      <p:ext uri="{BB962C8B-B14F-4D97-AF65-F5344CB8AC3E}">
+        <p14:creationId xmlns:p14="http://schemas.microsoft.com/office/powerpoint/2010/main" val="943703350"/>
+      </p:ext>
+    </p:extLst>
+  </p:cSld>
+  <p:clrMap bg1="lt1" tx1="dk1" bg2="lt2" tx2="dk2" accent1="accent1" accent2="accent2" accent3="accent3" accent4="accent4" accent5="accent5" accent6="accent6" hlink="hlink" folHlink="folHlink"/>
+  <p:notesStyle>
+    <a:lvl1pPr marL="0" algn="l" defTabSz="914400" rtl="0" eaLnBrk="1" latinLnBrk="0" hangingPunct="1">
+      <a:defRPr sz="1200" kern="1200">
+        <a:solidFill>
+          <a:schemeClr val="tx1"/>
+        </a:solidFill>
+        <a:latin typeface="+mn-lt"/>
+        <a:ea typeface="+mn-ea"/>
+        <a:cs typeface="+mn-cs"/>
+      </a:defRPr>
+    </a:lvl1pPr>
+    <a:lvl2pPr marL="457200" algn="l" defTabSz="914400" rtl="0" eaLnBrk="1" latinLnBrk="0" hangingPunct="1">
+      <a:defRPr sz="1200" kern="1200">
+        <a:solidFill>
+          <a:schemeClr val="tx1"/>
+        </a:solidFill>
+        <a:latin typeface="+mn-lt"/>
+        <a:ea typeface="+mn-ea"/>
+        <a:cs typeface="+mn-cs"/>
+      </a:defRPr>
+    </a:lvl2pPr>
+    <a:lvl3pPr marL="914400" algn="l" defTabSz="914400" rtl="0" eaLnBrk="1" latinLnBrk="0" hangingPunct="1">
+      <a:defRPr sz="1200" kern="1200">
+        <a:solidFill>
+          <a:schemeClr val="tx1"/>
+        </a:solidFill>
+        <a:latin typeface="+mn-lt"/>
+        <a:ea typeface="+mn-ea"/>
+        <a:cs typeface="+mn-cs"/>
+      </a:defRPr>
+    </a:lvl3pPr>
+    <a:lvl4pPr marL="1371600" algn="l" defTabSz="914400" rtl="0" eaLnBrk="1" latinLnBrk="0" hangingPunct="1">
+      <a:defRPr sz="1200" kern="1200">
+        <a:solidFill>
+          <a:schemeClr val="tx1"/>
+        </a:solidFill>
+        <a:latin typeface="+mn-lt"/>
+        <a:ea typeface="+mn-ea"/>
+        <a:cs typeface="+mn-cs"/>
+      </a:defRPr>
+    </a:lvl4pPr>
+    <a:lvl5pPr marL="1828800" algn="l" defTabSz="914400" rtl="0" eaLnBrk="1" latinLnBrk="0" hangingPunct="1">
+      <a:defRPr sz="1200" kern="1200">
+        <a:solidFill>
+          <a:schemeClr val="tx1"/>
+        </a:solidFill>
+        <a:latin typeface="+mn-lt"/>
+        <a:ea typeface="+mn-ea"/>
+        <a:cs typeface="+mn-cs"/>
+      </a:defRPr>
+    </a:lvl5pPr>
+    <a:lvl6pPr marL="2286000" algn="l" defTabSz="914400" rtl="0" eaLnBrk="1" latinLnBrk="0" hangingPunct="1">
+      <a:defRPr sz="1200" kern="1200">
+        <a:solidFill>
+          <a:schemeClr val="tx1"/>
+        </a:solidFill>
+        <a:latin typeface="+mn-lt"/>
+        <a:ea typeface="+mn-ea"/>
+        <a:cs typeface="+mn-cs"/>
+      </a:defRPr>
+    </a:lvl6pPr>
+    <a:lvl7pPr marL="2743200" algn="l" defTabSz="914400" rtl="0" eaLnBrk="1" latinLnBrk="0" hangingPunct="1">
+      <a:defRPr sz="1200" kern="1200">
+        <a:solidFill>
+          <a:schemeClr val="tx1"/>
+        </a:solidFill>
+        <a:latin typeface="+mn-lt"/>
+        <a:ea typeface="+mn-ea"/>
+        <a:cs typeface="+mn-cs"/>
+      </a:defRPr>
+    </a:lvl7pPr>
+    <a:lvl8pPr marL="3200400" algn="l" defTabSz="914400" rtl="0" eaLnBrk="1" latinLnBrk="0" hangingPunct="1">
+      <a:defRPr sz="1200" kern="1200">
+        <a:solidFill>
+          <a:schemeClr val="tx1"/>
+        </a:solidFill>
+        <a:latin typeface="+mn-lt"/>
+        <a:ea typeface="+mn-ea"/>
+        <a:cs typeface="+mn-cs"/>
+      </a:defRPr>
+    </a:lvl8pPr>
+    <a:lvl9pPr marL="3657600" algn="l" defTabSz="914400" rtl="0" eaLnBrk="1" latinLnBrk="0" hangingPunct="1">
+      <a:defRPr sz="1200" kern="1200">
+        <a:solidFill>
+          <a:schemeClr val="tx1"/>
+        </a:solidFill>
+        <a:latin typeface="+mn-lt"/>
+        <a:ea typeface="+mn-ea"/>
+        <a:cs typeface="+mn-cs"/>
+      </a:defRPr>
+    </a:lvl9pPr>
+  </p:notesStyle>
+</p:notesMaster>
+</file>
+
+<file path=ppt/notesSlides/notesSlide1.xml><?xml version="1.0" encoding="utf-8"?>
+<p:notes xmlns:a="http://schemas.openxmlformats.org/drawingml/2006/main" xmlns:r="http://schemas.openxmlformats.org/officeDocument/2006/relationships" xmlns:p="http://schemas.openxmlformats.org/presentationml/2006/main">
+  <p:cSld>
+    <p:spTree>
+      <p:nvGrpSpPr>
+        <p:cNvPr id="1" name=""/>
+        <p:cNvGrpSpPr/>
+        <p:nvPr/>
+      </p:nvGrpSpPr>
+      <p:grpSpPr>
+        <a:xfrm>
+          <a:off x="0" y="0"/>
+          <a:ext cx="0" cy="0"/>
+          <a:chOff x="0" y="0"/>
+          <a:chExt cx="0" cy="0"/>
+        </a:xfrm>
+      </p:grpSpPr>
+      <p:sp>
+        <p:nvSpPr>
+          <p:cNvPr id="2" name="Slide Image Placeholder 1"/>
+          <p:cNvSpPr>
+            <a:spLocks noGrp="1" noRot="1" noChangeAspect="1"/>
+          </p:cNvSpPr>
+          <p:nvPr>
+            <p:ph type="sldImg"/>
+          </p:nvPr>
+        </p:nvSpPr>
+        <p:spPr/>
+      </p:sp>
+      <p:sp>
+        <p:nvSpPr>
+          <p:cNvPr id="3" name="Notes Placeholder 2"/>
+          <p:cNvSpPr>
+            <a:spLocks noGrp="1"/>
+          </p:cNvSpPr>
+          <p:nvPr>
+            <p:ph type="body" idx="1"/>
+          </p:nvPr>
+        </p:nvSpPr>
+        <p:spPr/>
+        <p:txBody>
+          <a:bodyPr/>
+          <a:lstStyle/>
+          <a:p>
+            <a:endParaRPr lang="en-US" dirty="0"/>
+          </a:p>
+        </p:txBody>
+      </p:sp>
+      <p:sp>
+        <p:nvSpPr>
+          <p:cNvPr id="4" name="Slide Number Placeholder 3"/>
+          <p:cNvSpPr>
+            <a:spLocks noGrp="1"/>
+          </p:cNvSpPr>
+          <p:nvPr>
+            <p:ph type="sldNum" sz="quarter" idx="5"/>
+          </p:nvPr>
+        </p:nvSpPr>
+        <p:spPr/>
+        <p:txBody>
+          <a:bodyPr/>
+          <a:lstStyle/>
+          <a:p>
+            <a:fld id="{EAEF2BDB-0CF7-2349-A57E-21762E6C0F16}" type="slidenum">
+              <a:rPr lang="en-US" smtClean="0"/>
+              <a:t>18</a:t>
+            </a:fld>
+            <a:endParaRPr lang="en-US"/>
+          </a:p>
+        </p:txBody>
+      </p:sp>
+    </p:spTree>
+    <p:extLst>
+      <p:ext uri="{BB962C8B-B14F-4D97-AF65-F5344CB8AC3E}">
+        <p14:creationId xmlns:p14="http://schemas.microsoft.com/office/powerpoint/2010/main" val="1400019656"/>
+      </p:ext>
+    </p:extLst>
+  </p:cSld>
+  <p:clrMapOvr>
+    <a:masterClrMapping/>
+  </p:clrMapOvr>
+</p:notes>
+</file>
+
 <file path=ppt/slideLayouts/slideLayout1.xml><?xml version="1.0" encoding="utf-8"?>
 <p:sldLayout xmlns:a="http://schemas.openxmlformats.org/drawingml/2006/main" xmlns:r="http://schemas.openxmlformats.org/officeDocument/2006/relationships" xmlns:p="http://schemas.openxmlformats.org/presentationml/2006/main" type="title" preserve="1">
   <p:cSld name="Title Slide">
@@ -272,7 +712,7 @@
           <a:p>
             <a:fld id="{21FCD2E4-10FD-024D-A6CE-709BDBB9CDF1}" type="datetimeFigureOut">
               <a:rPr lang="en-US" smtClean="0"/>
-              <a:t>1/28/24</a:t>
+              <a:t>2/20/24</a:t>
             </a:fld>
             <a:endParaRPr lang="en-US"/>
           </a:p>
@@ -470,7 +910,7 @@
           <a:p>
             <a:fld id="{21FCD2E4-10FD-024D-A6CE-709BDBB9CDF1}" type="datetimeFigureOut">
               <a:rPr lang="en-US" smtClean="0"/>
-              <a:t>1/28/24</a:t>
+              <a:t>2/20/24</a:t>
             </a:fld>
             <a:endParaRPr lang="en-US"/>
           </a:p>
@@ -678,7 +1118,7 @@
           <a:p>
             <a:fld id="{21FCD2E4-10FD-024D-A6CE-709BDBB9CDF1}" type="datetimeFigureOut">
               <a:rPr lang="en-US" smtClean="0"/>
-              <a:t>1/28/24</a:t>
+              <a:t>2/20/24</a:t>
             </a:fld>
             <a:endParaRPr lang="en-US"/>
           </a:p>
@@ -876,7 +1316,7 @@
           <a:p>
             <a:fld id="{21FCD2E4-10FD-024D-A6CE-709BDBB9CDF1}" type="datetimeFigureOut">
               <a:rPr lang="en-US" smtClean="0"/>
-              <a:t>1/28/24</a:t>
+              <a:t>2/20/24</a:t>
             </a:fld>
             <a:endParaRPr lang="en-US"/>
           </a:p>
@@ -1151,7 +1591,7 @@
           <a:p>
             <a:fld id="{21FCD2E4-10FD-024D-A6CE-709BDBB9CDF1}" type="datetimeFigureOut">
               <a:rPr lang="en-US" smtClean="0"/>
-              <a:t>1/28/24</a:t>
+              <a:t>2/20/24</a:t>
             </a:fld>
             <a:endParaRPr lang="en-US"/>
           </a:p>
@@ -1416,7 +1856,7 @@
           <a:p>
             <a:fld id="{21FCD2E4-10FD-024D-A6CE-709BDBB9CDF1}" type="datetimeFigureOut">
               <a:rPr lang="en-US" smtClean="0"/>
-              <a:t>1/28/24</a:t>
+              <a:t>2/20/24</a:t>
             </a:fld>
             <a:endParaRPr lang="en-US"/>
           </a:p>
@@ -1828,7 +2268,7 @@
           <a:p>
             <a:fld id="{21FCD2E4-10FD-024D-A6CE-709BDBB9CDF1}" type="datetimeFigureOut">
               <a:rPr lang="en-US" smtClean="0"/>
-              <a:t>1/28/24</a:t>
+              <a:t>2/20/24</a:t>
             </a:fld>
             <a:endParaRPr lang="en-US"/>
           </a:p>
@@ -1969,7 +2409,7 @@
           <a:p>
             <a:fld id="{21FCD2E4-10FD-024D-A6CE-709BDBB9CDF1}" type="datetimeFigureOut">
               <a:rPr lang="en-US" smtClean="0"/>
-              <a:t>1/28/24</a:t>
+              <a:t>2/20/24</a:t>
             </a:fld>
             <a:endParaRPr lang="en-US"/>
           </a:p>
@@ -2082,7 +2522,7 @@
           <a:p>
             <a:fld id="{21FCD2E4-10FD-024D-A6CE-709BDBB9CDF1}" type="datetimeFigureOut">
               <a:rPr lang="en-US" smtClean="0"/>
-              <a:t>1/28/24</a:t>
+              <a:t>2/20/24</a:t>
             </a:fld>
             <a:endParaRPr lang="en-US"/>
           </a:p>
@@ -2393,7 +2833,7 @@
           <a:p>
             <a:fld id="{21FCD2E4-10FD-024D-A6CE-709BDBB9CDF1}" type="datetimeFigureOut">
               <a:rPr lang="en-US" smtClean="0"/>
-              <a:t>1/28/24</a:t>
+              <a:t>2/20/24</a:t>
             </a:fld>
             <a:endParaRPr lang="en-US"/>
           </a:p>
@@ -2681,7 +3121,7 @@
           <a:p>
             <a:fld id="{21FCD2E4-10FD-024D-A6CE-709BDBB9CDF1}" type="datetimeFigureOut">
               <a:rPr lang="en-US" smtClean="0"/>
-              <a:t>1/28/24</a:t>
+              <a:t>2/20/24</a:t>
             </a:fld>
             <a:endParaRPr lang="en-US"/>
           </a:p>
@@ -2922,7 +3362,7 @@
           <a:p>
             <a:fld id="{21FCD2E4-10FD-024D-A6CE-709BDBB9CDF1}" type="datetimeFigureOut">
               <a:rPr lang="en-US" smtClean="0"/>
-              <a:t>1/28/24</a:t>
+              <a:t>2/20/24</a:t>
             </a:fld>
             <a:endParaRPr lang="en-US"/>
           </a:p>
@@ -6447,6 +6887,83 @@
       </p:grpSpPr>
       <p:pic>
         <p:nvPicPr>
+          <p:cNvPr id="1026" name="Picture 2">
+            <a:extLst>
+              <a:ext uri="{FF2B5EF4-FFF2-40B4-BE49-F238E27FC236}">
+                <a16:creationId xmlns:a16="http://schemas.microsoft.com/office/drawing/2014/main" id="{32D64EAF-1D18-662F-0FAD-8CCF4A7E86FC}"/>
+              </a:ext>
+            </a:extLst>
+          </p:cNvPr>
+          <p:cNvPicPr>
+            <a:picLocks noChangeAspect="1" noChangeArrowheads="1"/>
+          </p:cNvPicPr>
+          <p:nvPr/>
+        </p:nvPicPr>
+        <p:blipFill>
+          <a:blip r:embed="rId2">
+            <a:extLst>
+              <a:ext uri="{28A0092B-C50C-407E-A947-70E740481C1C}">
+                <a14:useLocalDpi xmlns:a14="http://schemas.microsoft.com/office/drawing/2010/main" val="0"/>
+              </a:ext>
+            </a:extLst>
+          </a:blip>
+          <a:srcRect/>
+          <a:stretch>
+            <a:fillRect/>
+          </a:stretch>
+        </p:blipFill>
+        <p:spPr bwMode="auto">
+          <a:xfrm>
+            <a:off x="3813485" y="1839372"/>
+            <a:ext cx="4565029" cy="3179256"/>
+          </a:xfrm>
+          <a:prstGeom prst="rect">
+            <a:avLst/>
+          </a:prstGeom>
+          <a:noFill/>
+          <a:extLst>
+            <a:ext uri="{909E8E84-426E-40DD-AFC4-6F175D3DCCD1}">
+              <a14:hiddenFill xmlns:a14="http://schemas.microsoft.com/office/drawing/2010/main">
+                <a:solidFill>
+                  <a:srgbClr val="FFFFFF"/>
+                </a:solidFill>
+              </a14:hiddenFill>
+            </a:ext>
+          </a:extLst>
+        </p:spPr>
+      </p:pic>
+    </p:spTree>
+    <p:extLst>
+      <p:ext uri="{BB962C8B-B14F-4D97-AF65-F5344CB8AC3E}">
+        <p14:creationId xmlns:p14="http://schemas.microsoft.com/office/powerpoint/2010/main" val="3493691444"/>
+      </p:ext>
+    </p:extLst>
+  </p:cSld>
+  <p:clrMapOvr>
+    <a:masterClrMapping/>
+  </p:clrMapOvr>
+</p:sld>
+</file>
+
+<file path=ppt/slides/slide14.xml><?xml version="1.0" encoding="utf-8"?>
+<p:sld xmlns:a="http://schemas.openxmlformats.org/drawingml/2006/main" xmlns:r="http://schemas.openxmlformats.org/officeDocument/2006/relationships" xmlns:p="http://schemas.openxmlformats.org/presentationml/2006/main">
+  <p:cSld>
+    <p:spTree>
+      <p:nvGrpSpPr>
+        <p:cNvPr id="1" name=""/>
+        <p:cNvGrpSpPr/>
+        <p:nvPr/>
+      </p:nvGrpSpPr>
+      <p:grpSpPr>
+        <a:xfrm>
+          <a:off x="0" y="0"/>
+          <a:ext cx="0" cy="0"/>
+          <a:chOff x="0" y="0"/>
+          <a:chExt cx="0" cy="0"/>
+        </a:xfrm>
+      </p:grpSpPr>
+      <p:pic>
+        <p:nvPicPr>
           <p:cNvPr id="4098" name="Picture 2">
             <a:extLst>
               <a:ext uri="{FF2B5EF4-FFF2-40B4-BE49-F238E27FC236}">
@@ -6505,7 +7022,7 @@
 </p:sld>
 </file>
 
-<file path=ppt/slides/slide14.xml><?xml version="1.0" encoding="utf-8"?>
+<file path=ppt/slides/slide15.xml><?xml version="1.0" encoding="utf-8"?>
 <p:sld xmlns:a="http://schemas.openxmlformats.org/drawingml/2006/main" xmlns:r="http://schemas.openxmlformats.org/officeDocument/2006/relationships" xmlns:p="http://schemas.openxmlformats.org/presentationml/2006/main">
   <p:cSld>
     <p:spTree>
@@ -6584,6 +7101,3770 @@
     <p:extLst>
       <p:ext uri="{BB962C8B-B14F-4D97-AF65-F5344CB8AC3E}">
         <p14:creationId xmlns:p14="http://schemas.microsoft.com/office/powerpoint/2010/main" val="1716866906"/>
+      </p:ext>
+    </p:extLst>
+  </p:cSld>
+  <p:clrMapOvr>
+    <a:masterClrMapping/>
+  </p:clrMapOvr>
+</p:sld>
+</file>
+
+<file path=ppt/slides/slide16.xml><?xml version="1.0" encoding="utf-8"?>
+<p:sld xmlns:a="http://schemas.openxmlformats.org/drawingml/2006/main" xmlns:r="http://schemas.openxmlformats.org/officeDocument/2006/relationships" xmlns:p="http://schemas.openxmlformats.org/presentationml/2006/main">
+  <p:cSld>
+    <p:spTree>
+      <p:nvGrpSpPr>
+        <p:cNvPr id="1" name=""/>
+        <p:cNvGrpSpPr/>
+        <p:nvPr/>
+      </p:nvGrpSpPr>
+      <p:grpSpPr>
+        <a:xfrm>
+          <a:off x="0" y="0"/>
+          <a:ext cx="0" cy="0"/>
+          <a:chOff x="0" y="0"/>
+          <a:chExt cx="0" cy="0"/>
+        </a:xfrm>
+      </p:grpSpPr>
+      <p:grpSp>
+        <p:nvGrpSpPr>
+          <p:cNvPr id="21" name="Group 20">
+            <a:extLst>
+              <a:ext uri="{FF2B5EF4-FFF2-40B4-BE49-F238E27FC236}">
+                <a16:creationId xmlns:a16="http://schemas.microsoft.com/office/drawing/2014/main" id="{092C801C-3023-0CA6-82D6-C61D1CB29D34}"/>
+              </a:ext>
+            </a:extLst>
+          </p:cNvPr>
+          <p:cNvGrpSpPr>
+            <a:grpSpLocks noChangeAspect="1"/>
+          </p:cNvGrpSpPr>
+          <p:nvPr/>
+        </p:nvGrpSpPr>
+        <p:grpSpPr>
+          <a:xfrm>
+            <a:off x="7686845" y="665464"/>
+            <a:ext cx="4155385" cy="4155385"/>
+            <a:chOff x="3786690" y="585569"/>
+            <a:chExt cx="4618620" cy="4618620"/>
+          </a:xfrm>
+        </p:grpSpPr>
+        <p:grpSp>
+          <p:nvGrpSpPr>
+            <p:cNvPr id="22" name="Group 21">
+              <a:extLst>
+                <a:ext uri="{FF2B5EF4-FFF2-40B4-BE49-F238E27FC236}">
+                  <a16:creationId xmlns:a16="http://schemas.microsoft.com/office/drawing/2014/main" id="{DAA5D954-9B74-3498-D79F-CAC692CE6160}"/>
+                </a:ext>
+              </a:extLst>
+            </p:cNvPr>
+            <p:cNvGrpSpPr/>
+            <p:nvPr/>
+          </p:nvGrpSpPr>
+          <p:grpSpPr>
+            <a:xfrm>
+              <a:off x="3786690" y="585569"/>
+              <a:ext cx="4618620" cy="4618620"/>
+              <a:chOff x="1410474" y="614962"/>
+              <a:chExt cx="4618620" cy="4618620"/>
+            </a:xfrm>
+          </p:grpSpPr>
+          <p:sp>
+            <p:nvSpPr>
+              <p:cNvPr id="24" name="Donut 23">
+                <a:extLst>
+                  <a:ext uri="{FF2B5EF4-FFF2-40B4-BE49-F238E27FC236}">
+                    <a16:creationId xmlns:a16="http://schemas.microsoft.com/office/drawing/2014/main" id="{D6849C42-0DC5-100D-000D-C3AEFFC11C97}"/>
+                  </a:ext>
+                </a:extLst>
+              </p:cNvPr>
+              <p:cNvSpPr>
+                <a:spLocks noChangeAspect="1"/>
+              </p:cNvSpPr>
+              <p:nvPr/>
+            </p:nvSpPr>
+            <p:spPr>
+              <a:xfrm>
+                <a:off x="2502444" y="1776220"/>
+                <a:ext cx="2354580" cy="2354580"/>
+              </a:xfrm>
+              <a:prstGeom prst="donut">
+                <a:avLst>
+                  <a:gd name="adj" fmla="val 1280"/>
+                </a:avLst>
+              </a:prstGeom>
+              <a:solidFill>
+                <a:schemeClr val="bg2">
+                  <a:lumMod val="50000"/>
+                </a:schemeClr>
+              </a:solidFill>
+              <a:ln>
+                <a:noFill/>
+              </a:ln>
+            </p:spPr>
+            <p:style>
+              <a:lnRef idx="2">
+                <a:schemeClr val="accent1">
+                  <a:shade val="15000"/>
+                </a:schemeClr>
+              </a:lnRef>
+              <a:fillRef idx="1">
+                <a:schemeClr val="accent1"/>
+              </a:fillRef>
+              <a:effectRef idx="0">
+                <a:schemeClr val="accent1"/>
+              </a:effectRef>
+              <a:fontRef idx="minor">
+                <a:schemeClr val="lt1"/>
+              </a:fontRef>
+            </p:style>
+            <p:txBody>
+              <a:bodyPr rtlCol="0" anchor="ctr"/>
+              <a:lstStyle/>
+              <a:p>
+                <a:pPr algn="ctr"/>
+                <a:endParaRPr lang="en-US">
+                  <a:solidFill>
+                    <a:schemeClr val="tx1"/>
+                  </a:solidFill>
+                </a:endParaRPr>
+              </a:p>
+            </p:txBody>
+          </p:sp>
+          <p:sp>
+            <p:nvSpPr>
+              <p:cNvPr id="25" name="Donut 24">
+                <a:extLst>
+                  <a:ext uri="{FF2B5EF4-FFF2-40B4-BE49-F238E27FC236}">
+                    <a16:creationId xmlns:a16="http://schemas.microsoft.com/office/drawing/2014/main" id="{CFB03FB1-0A62-7D9C-6DDC-789779428C09}"/>
+                  </a:ext>
+                </a:extLst>
+              </p:cNvPr>
+              <p:cNvSpPr>
+                <a:spLocks noChangeAspect="1"/>
+              </p:cNvSpPr>
+              <p:nvPr/>
+            </p:nvSpPr>
+            <p:spPr>
+              <a:xfrm>
+                <a:off x="2145827" y="1419603"/>
+                <a:ext cx="3067813" cy="3067813"/>
+              </a:xfrm>
+              <a:prstGeom prst="donut">
+                <a:avLst>
+                  <a:gd name="adj" fmla="val 969"/>
+                </a:avLst>
+              </a:prstGeom>
+              <a:solidFill>
+                <a:schemeClr val="bg2">
+                  <a:lumMod val="50000"/>
+                </a:schemeClr>
+              </a:solidFill>
+              <a:ln>
+                <a:noFill/>
+              </a:ln>
+            </p:spPr>
+            <p:style>
+              <a:lnRef idx="2">
+                <a:schemeClr val="accent1">
+                  <a:shade val="15000"/>
+                </a:schemeClr>
+              </a:lnRef>
+              <a:fillRef idx="1">
+                <a:schemeClr val="accent1"/>
+              </a:fillRef>
+              <a:effectRef idx="0">
+                <a:schemeClr val="accent1"/>
+              </a:effectRef>
+              <a:fontRef idx="minor">
+                <a:schemeClr val="lt1"/>
+              </a:fontRef>
+            </p:style>
+            <p:txBody>
+              <a:bodyPr rtlCol="0" anchor="ctr"/>
+              <a:lstStyle/>
+              <a:p>
+                <a:pPr algn="ctr"/>
+                <a:endParaRPr lang="en-US">
+                  <a:solidFill>
+                    <a:schemeClr val="tx1"/>
+                  </a:solidFill>
+                </a:endParaRPr>
+              </a:p>
+            </p:txBody>
+          </p:sp>
+          <p:sp>
+            <p:nvSpPr>
+              <p:cNvPr id="26" name="Donut 25">
+                <a:extLst>
+                  <a:ext uri="{FF2B5EF4-FFF2-40B4-BE49-F238E27FC236}">
+                    <a16:creationId xmlns:a16="http://schemas.microsoft.com/office/drawing/2014/main" id="{2CBA8977-A287-CDFC-272D-918E4C7745EF}"/>
+                  </a:ext>
+                </a:extLst>
+              </p:cNvPr>
+              <p:cNvSpPr>
+                <a:spLocks noChangeAspect="1"/>
+              </p:cNvSpPr>
+              <p:nvPr/>
+            </p:nvSpPr>
+            <p:spPr>
+              <a:xfrm>
+                <a:off x="1410474" y="614962"/>
+                <a:ext cx="4618620" cy="4618620"/>
+              </a:xfrm>
+              <a:prstGeom prst="donut">
+                <a:avLst>
+                  <a:gd name="adj" fmla="val 661"/>
+                </a:avLst>
+              </a:prstGeom>
+              <a:solidFill>
+                <a:schemeClr val="bg2">
+                  <a:lumMod val="50000"/>
+                </a:schemeClr>
+              </a:solidFill>
+              <a:ln>
+                <a:noFill/>
+              </a:ln>
+            </p:spPr>
+            <p:style>
+              <a:lnRef idx="2">
+                <a:schemeClr val="accent1">
+                  <a:shade val="15000"/>
+                </a:schemeClr>
+              </a:lnRef>
+              <a:fillRef idx="1">
+                <a:schemeClr val="accent1"/>
+              </a:fillRef>
+              <a:effectRef idx="0">
+                <a:schemeClr val="accent1"/>
+              </a:effectRef>
+              <a:fontRef idx="minor">
+                <a:schemeClr val="lt1"/>
+              </a:fontRef>
+            </p:style>
+            <p:txBody>
+              <a:bodyPr rtlCol="0" anchor="ctr"/>
+              <a:lstStyle/>
+              <a:p>
+                <a:pPr algn="ctr"/>
+                <a:endParaRPr lang="en-US">
+                  <a:solidFill>
+                    <a:schemeClr val="tx1"/>
+                  </a:solidFill>
+                </a:endParaRPr>
+              </a:p>
+            </p:txBody>
+          </p:sp>
+        </p:grpSp>
+        <p:pic>
+          <p:nvPicPr>
+            <p:cNvPr id="23" name="Picture 2" descr="Hexagonal Prisms: Paper Models, Surface Area, Volume Formulas and Nets">
+              <a:extLst>
+                <a:ext uri="{FF2B5EF4-FFF2-40B4-BE49-F238E27FC236}">
+                  <a16:creationId xmlns:a16="http://schemas.microsoft.com/office/drawing/2014/main" id="{F2F4EC6A-8206-0A6F-8186-B7DF8F23C1F0}"/>
+                </a:ext>
+              </a:extLst>
+            </p:cNvPr>
+            <p:cNvPicPr>
+              <a:picLocks noChangeAspect="1" noChangeArrowheads="1"/>
+            </p:cNvPicPr>
+            <p:nvPr/>
+          </p:nvPicPr>
+          <p:blipFill>
+            <a:blip r:embed="rId2">
+              <a:extLst>
+                <a:ext uri="{28A0092B-C50C-407E-A947-70E740481C1C}">
+                  <a14:useLocalDpi xmlns:a14="http://schemas.microsoft.com/office/drawing/2010/main" val="0"/>
+                </a:ext>
+              </a:extLst>
+            </a:blip>
+            <a:srcRect/>
+            <a:stretch>
+              <a:fillRect/>
+            </a:stretch>
+          </p:blipFill>
+          <p:spPr bwMode="auto">
+            <a:xfrm>
+              <a:off x="5182824" y="1687951"/>
+              <a:ext cx="1586276" cy="2535144"/>
+            </a:xfrm>
+            <a:prstGeom prst="rect">
+              <a:avLst/>
+            </a:prstGeom>
+            <a:noFill/>
+            <a:extLst>
+              <a:ext uri="{909E8E84-426E-40DD-AFC4-6F175D3DCCD1}">
+                <a14:hiddenFill xmlns:a14="http://schemas.microsoft.com/office/drawing/2010/main">
+                  <a:solidFill>
+                    <a:srgbClr val="FFFFFF"/>
+                  </a:solidFill>
+                </a14:hiddenFill>
+              </a:ext>
+            </a:extLst>
+          </p:spPr>
+        </p:pic>
+      </p:grpSp>
+      <p:grpSp>
+        <p:nvGrpSpPr>
+          <p:cNvPr id="35" name="Group 34">
+            <a:extLst>
+              <a:ext uri="{FF2B5EF4-FFF2-40B4-BE49-F238E27FC236}">
+                <a16:creationId xmlns:a16="http://schemas.microsoft.com/office/drawing/2014/main" id="{B4298E4D-1A7A-D30E-B399-0BDEF8299373}"/>
+              </a:ext>
+            </a:extLst>
+          </p:cNvPr>
+          <p:cNvGrpSpPr/>
+          <p:nvPr/>
+        </p:nvGrpSpPr>
+        <p:grpSpPr>
+          <a:xfrm>
+            <a:off x="227926" y="1389402"/>
+            <a:ext cx="3114281" cy="3114281"/>
+            <a:chOff x="227926" y="1389402"/>
+            <a:chExt cx="3114281" cy="3114281"/>
+          </a:xfrm>
+        </p:grpSpPr>
+        <p:grpSp>
+          <p:nvGrpSpPr>
+            <p:cNvPr id="19" name="Group 18">
+              <a:extLst>
+                <a:ext uri="{FF2B5EF4-FFF2-40B4-BE49-F238E27FC236}">
+                  <a16:creationId xmlns:a16="http://schemas.microsoft.com/office/drawing/2014/main" id="{57683CE8-2B65-D571-FBB2-F9B103964DC7}"/>
+                </a:ext>
+              </a:extLst>
+            </p:cNvPr>
+            <p:cNvGrpSpPr>
+              <a:grpSpLocks noChangeAspect="1"/>
+            </p:cNvGrpSpPr>
+            <p:nvPr/>
+          </p:nvGrpSpPr>
+          <p:grpSpPr>
+            <a:xfrm>
+              <a:off x="227926" y="1389402"/>
+              <a:ext cx="3114281" cy="3114281"/>
+              <a:chOff x="6604774" y="614962"/>
+              <a:chExt cx="4618620" cy="4618620"/>
+            </a:xfrm>
+          </p:grpSpPr>
+          <p:grpSp>
+            <p:nvGrpSpPr>
+              <p:cNvPr id="2" name="Group 1">
+                <a:extLst>
+                  <a:ext uri="{FF2B5EF4-FFF2-40B4-BE49-F238E27FC236}">
+                    <a16:creationId xmlns:a16="http://schemas.microsoft.com/office/drawing/2014/main" id="{981ADC5F-1F0A-9FB2-48B8-A638A68EEA66}"/>
+                  </a:ext>
+                </a:extLst>
+              </p:cNvPr>
+              <p:cNvGrpSpPr>
+                <a:grpSpLocks noChangeAspect="1"/>
+              </p:cNvGrpSpPr>
+              <p:nvPr/>
+            </p:nvGrpSpPr>
+            <p:grpSpPr>
+              <a:xfrm>
+                <a:off x="8066314" y="2137338"/>
+                <a:ext cx="1623242" cy="1623242"/>
+                <a:chOff x="8207298" y="2509024"/>
+                <a:chExt cx="1828800" cy="1828800"/>
+              </a:xfrm>
+            </p:grpSpPr>
+            <p:sp>
+              <p:nvSpPr>
+                <p:cNvPr id="11" name="Frame 10">
+                  <a:extLst>
+                    <a:ext uri="{FF2B5EF4-FFF2-40B4-BE49-F238E27FC236}">
+                      <a16:creationId xmlns:a16="http://schemas.microsoft.com/office/drawing/2014/main" id="{D0AE3B92-487F-9AD0-3A6E-EF51950C630F}"/>
+                    </a:ext>
+                  </a:extLst>
+                </p:cNvPr>
+                <p:cNvSpPr>
+                  <a:spLocks noChangeAspect="1"/>
+                </p:cNvSpPr>
+                <p:nvPr/>
+              </p:nvSpPr>
+              <p:spPr>
+                <a:xfrm>
+                  <a:off x="8210072" y="2509024"/>
+                  <a:ext cx="1826026" cy="1826026"/>
+                </a:xfrm>
+                <a:prstGeom prst="frame">
+                  <a:avLst>
+                    <a:gd name="adj1" fmla="val 50000"/>
+                  </a:avLst>
+                </a:prstGeom>
+                <a:solidFill>
+                  <a:srgbClr val="76D6FF">
+                    <a:alpha val="31000"/>
+                  </a:srgbClr>
+                </a:solidFill>
+                <a:ln w="38100">
+                  <a:noFill/>
+                </a:ln>
+              </p:spPr>
+              <p:style>
+                <a:lnRef idx="2">
+                  <a:schemeClr val="accent1">
+                    <a:shade val="15000"/>
+                  </a:schemeClr>
+                </a:lnRef>
+                <a:fillRef idx="1">
+                  <a:schemeClr val="accent1"/>
+                </a:fillRef>
+                <a:effectRef idx="0">
+                  <a:schemeClr val="accent1"/>
+                </a:effectRef>
+                <a:fontRef idx="minor">
+                  <a:schemeClr val="lt1"/>
+                </a:fontRef>
+              </p:style>
+              <p:txBody>
+                <a:bodyPr rtlCol="0" anchor="ctr"/>
+                <a:lstStyle/>
+                <a:p>
+                  <a:pPr algn="ctr"/>
+                  <a:endParaRPr lang="en-US" dirty="0">
+                    <a:solidFill>
+                      <a:sysClr val="windowText" lastClr="000000"/>
+                    </a:solidFill>
+                  </a:endParaRPr>
+                </a:p>
+              </p:txBody>
+            </p:sp>
+            <p:sp>
+              <p:nvSpPr>
+                <p:cNvPr id="10" name="Frame 9">
+                  <a:extLst>
+                    <a:ext uri="{FF2B5EF4-FFF2-40B4-BE49-F238E27FC236}">
+                      <a16:creationId xmlns:a16="http://schemas.microsoft.com/office/drawing/2014/main" id="{FBAECFEF-81C4-4F08-7C4F-079D8A7862F3}"/>
+                    </a:ext>
+                  </a:extLst>
+                </p:cNvPr>
+                <p:cNvSpPr>
+                  <a:spLocks noChangeAspect="1"/>
+                </p:cNvSpPr>
+                <p:nvPr/>
+              </p:nvSpPr>
+              <p:spPr>
+                <a:xfrm>
+                  <a:off x="8207298" y="2509024"/>
+                  <a:ext cx="1828800" cy="1828800"/>
+                </a:xfrm>
+                <a:prstGeom prst="frame">
+                  <a:avLst>
+                    <a:gd name="adj1" fmla="val 3721"/>
+                  </a:avLst>
+                </a:prstGeom>
+                <a:solidFill>
+                  <a:schemeClr val="accent1"/>
+                </a:solidFill>
+                <a:ln w="38100">
+                  <a:noFill/>
+                </a:ln>
+              </p:spPr>
+              <p:style>
+                <a:lnRef idx="2">
+                  <a:schemeClr val="accent1">
+                    <a:shade val="15000"/>
+                  </a:schemeClr>
+                </a:lnRef>
+                <a:fillRef idx="1">
+                  <a:schemeClr val="accent1"/>
+                </a:fillRef>
+                <a:effectRef idx="0">
+                  <a:schemeClr val="accent1"/>
+                </a:effectRef>
+                <a:fontRef idx="minor">
+                  <a:schemeClr val="lt1"/>
+                </a:fontRef>
+              </p:style>
+              <p:txBody>
+                <a:bodyPr rtlCol="0" anchor="ctr"/>
+                <a:lstStyle/>
+                <a:p>
+                  <a:pPr algn="ctr"/>
+                  <a:endParaRPr lang="en-US" dirty="0">
+                    <a:solidFill>
+                      <a:sysClr val="windowText" lastClr="000000"/>
+                    </a:solidFill>
+                  </a:endParaRPr>
+                </a:p>
+              </p:txBody>
+            </p:sp>
+          </p:grpSp>
+          <p:grpSp>
+            <p:nvGrpSpPr>
+              <p:cNvPr id="14" name="Group 13">
+                <a:extLst>
+                  <a:ext uri="{FF2B5EF4-FFF2-40B4-BE49-F238E27FC236}">
+                    <a16:creationId xmlns:a16="http://schemas.microsoft.com/office/drawing/2014/main" id="{AE53B852-5432-F84E-1D3D-03F8F0B02CC5}"/>
+                  </a:ext>
+                </a:extLst>
+              </p:cNvPr>
+              <p:cNvGrpSpPr/>
+              <p:nvPr/>
+            </p:nvGrpSpPr>
+            <p:grpSpPr>
+              <a:xfrm>
+                <a:off x="6604774" y="614962"/>
+                <a:ext cx="4618620" cy="4618620"/>
+                <a:chOff x="1410474" y="614962"/>
+                <a:chExt cx="4618620" cy="4618620"/>
+              </a:xfrm>
+            </p:grpSpPr>
+            <p:sp>
+              <p:nvSpPr>
+                <p:cNvPr id="15" name="Donut 14">
+                  <a:extLst>
+                    <a:ext uri="{FF2B5EF4-FFF2-40B4-BE49-F238E27FC236}">
+                      <a16:creationId xmlns:a16="http://schemas.microsoft.com/office/drawing/2014/main" id="{22E42DCF-FAF3-91C5-1848-1EAB1132EDF6}"/>
+                    </a:ext>
+                  </a:extLst>
+                </p:cNvPr>
+                <p:cNvSpPr>
+                  <a:spLocks noChangeAspect="1"/>
+                </p:cNvSpPr>
+                <p:nvPr/>
+              </p:nvSpPr>
+              <p:spPr>
+                <a:xfrm>
+                  <a:off x="2502444" y="1776220"/>
+                  <a:ext cx="2354580" cy="2354580"/>
+                </a:xfrm>
+                <a:prstGeom prst="donut">
+                  <a:avLst>
+                    <a:gd name="adj" fmla="val 1280"/>
+                  </a:avLst>
+                </a:prstGeom>
+                <a:solidFill>
+                  <a:schemeClr val="bg2">
+                    <a:lumMod val="50000"/>
+                  </a:schemeClr>
+                </a:solidFill>
+                <a:ln>
+                  <a:noFill/>
+                </a:ln>
+              </p:spPr>
+              <p:style>
+                <a:lnRef idx="2">
+                  <a:schemeClr val="accent1">
+                    <a:shade val="15000"/>
+                  </a:schemeClr>
+                </a:lnRef>
+                <a:fillRef idx="1">
+                  <a:schemeClr val="accent1"/>
+                </a:fillRef>
+                <a:effectRef idx="0">
+                  <a:schemeClr val="accent1"/>
+                </a:effectRef>
+                <a:fontRef idx="minor">
+                  <a:schemeClr val="lt1"/>
+                </a:fontRef>
+              </p:style>
+              <p:txBody>
+                <a:bodyPr rtlCol="0" anchor="ctr"/>
+                <a:lstStyle/>
+                <a:p>
+                  <a:pPr algn="ctr"/>
+                  <a:endParaRPr lang="en-US">
+                    <a:solidFill>
+                      <a:schemeClr val="tx1"/>
+                    </a:solidFill>
+                  </a:endParaRPr>
+                </a:p>
+              </p:txBody>
+            </p:sp>
+            <p:sp>
+              <p:nvSpPr>
+                <p:cNvPr id="16" name="Donut 15">
+                  <a:extLst>
+                    <a:ext uri="{FF2B5EF4-FFF2-40B4-BE49-F238E27FC236}">
+                      <a16:creationId xmlns:a16="http://schemas.microsoft.com/office/drawing/2014/main" id="{3B2FC7F0-3462-AF7B-A8C7-5E29843976C9}"/>
+                    </a:ext>
+                  </a:extLst>
+                </p:cNvPr>
+                <p:cNvSpPr>
+                  <a:spLocks noChangeAspect="1"/>
+                </p:cNvSpPr>
+                <p:nvPr/>
+              </p:nvSpPr>
+              <p:spPr>
+                <a:xfrm>
+                  <a:off x="2145827" y="1419603"/>
+                  <a:ext cx="3067813" cy="3067813"/>
+                </a:xfrm>
+                <a:prstGeom prst="donut">
+                  <a:avLst>
+                    <a:gd name="adj" fmla="val 969"/>
+                  </a:avLst>
+                </a:prstGeom>
+                <a:solidFill>
+                  <a:schemeClr val="bg2">
+                    <a:lumMod val="50000"/>
+                  </a:schemeClr>
+                </a:solidFill>
+                <a:ln>
+                  <a:noFill/>
+                </a:ln>
+              </p:spPr>
+              <p:style>
+                <a:lnRef idx="2">
+                  <a:schemeClr val="accent1">
+                    <a:shade val="15000"/>
+                  </a:schemeClr>
+                </a:lnRef>
+                <a:fillRef idx="1">
+                  <a:schemeClr val="accent1"/>
+                </a:fillRef>
+                <a:effectRef idx="0">
+                  <a:schemeClr val="accent1"/>
+                </a:effectRef>
+                <a:fontRef idx="minor">
+                  <a:schemeClr val="lt1"/>
+                </a:fontRef>
+              </p:style>
+              <p:txBody>
+                <a:bodyPr rtlCol="0" anchor="ctr"/>
+                <a:lstStyle/>
+                <a:p>
+                  <a:pPr algn="ctr"/>
+                  <a:endParaRPr lang="en-US">
+                    <a:solidFill>
+                      <a:schemeClr val="tx1"/>
+                    </a:solidFill>
+                  </a:endParaRPr>
+                </a:p>
+              </p:txBody>
+            </p:sp>
+            <p:sp>
+              <p:nvSpPr>
+                <p:cNvPr id="17" name="Donut 16">
+                  <a:extLst>
+                    <a:ext uri="{FF2B5EF4-FFF2-40B4-BE49-F238E27FC236}">
+                      <a16:creationId xmlns:a16="http://schemas.microsoft.com/office/drawing/2014/main" id="{60DE1187-E9A4-C8DE-5BEC-8BDCC2936CD3}"/>
+                    </a:ext>
+                  </a:extLst>
+                </p:cNvPr>
+                <p:cNvSpPr>
+                  <a:spLocks noChangeAspect="1"/>
+                </p:cNvSpPr>
+                <p:nvPr/>
+              </p:nvSpPr>
+              <p:spPr>
+                <a:xfrm>
+                  <a:off x="1410474" y="614962"/>
+                  <a:ext cx="4618620" cy="4618620"/>
+                </a:xfrm>
+                <a:prstGeom prst="donut">
+                  <a:avLst>
+                    <a:gd name="adj" fmla="val 661"/>
+                  </a:avLst>
+                </a:prstGeom>
+                <a:solidFill>
+                  <a:schemeClr val="bg2">
+                    <a:lumMod val="50000"/>
+                  </a:schemeClr>
+                </a:solidFill>
+                <a:ln>
+                  <a:noFill/>
+                </a:ln>
+              </p:spPr>
+              <p:style>
+                <a:lnRef idx="2">
+                  <a:schemeClr val="accent1">
+                    <a:shade val="15000"/>
+                  </a:schemeClr>
+                </a:lnRef>
+                <a:fillRef idx="1">
+                  <a:schemeClr val="accent1"/>
+                </a:fillRef>
+                <a:effectRef idx="0">
+                  <a:schemeClr val="accent1"/>
+                </a:effectRef>
+                <a:fontRef idx="minor">
+                  <a:schemeClr val="lt1"/>
+                </a:fontRef>
+              </p:style>
+              <p:txBody>
+                <a:bodyPr rtlCol="0" anchor="ctr"/>
+                <a:lstStyle/>
+                <a:p>
+                  <a:pPr algn="ctr"/>
+                  <a:endParaRPr lang="en-US" dirty="0">
+                    <a:solidFill>
+                      <a:schemeClr val="tx1"/>
+                    </a:solidFill>
+                  </a:endParaRPr>
+                </a:p>
+              </p:txBody>
+            </p:sp>
+          </p:grpSp>
+        </p:grpSp>
+        <p:sp>
+          <p:nvSpPr>
+            <p:cNvPr id="34" name="TextBox 33">
+              <a:extLst>
+                <a:ext uri="{FF2B5EF4-FFF2-40B4-BE49-F238E27FC236}">
+                  <a16:creationId xmlns:a16="http://schemas.microsoft.com/office/drawing/2014/main" id="{87FBBD18-02FC-0D25-951B-27AD7E766E3B}"/>
+                </a:ext>
+              </a:extLst>
+            </p:cNvPr>
+            <p:cNvSpPr txBox="1"/>
+            <p:nvPr/>
+          </p:nvSpPr>
+          <p:spPr>
+            <a:xfrm>
+              <a:off x="1119568" y="2608016"/>
+              <a:ext cx="1276985" cy="646331"/>
+            </a:xfrm>
+            <a:prstGeom prst="rect">
+              <a:avLst/>
+            </a:prstGeom>
+            <a:noFill/>
+          </p:spPr>
+          <p:txBody>
+            <a:bodyPr wrap="square">
+              <a:spAutoFit/>
+            </a:bodyPr>
+            <a:lstStyle/>
+            <a:p>
+              <a:pPr algn="ctr"/>
+              <a:r>
+                <a:rPr lang="en-US" dirty="0"/>
+                <a:t>Ice crystal</a:t>
+              </a:r>
+            </a:p>
+            <a:p>
+              <a:pPr algn="ctr"/>
+              <a:r>
+                <a:rPr lang="en-US" dirty="0"/>
+                <a:t>(2D)</a:t>
+              </a:r>
+            </a:p>
+          </p:txBody>
+        </p:sp>
+      </p:grpSp>
+      <p:grpSp>
+        <p:nvGrpSpPr>
+          <p:cNvPr id="37" name="Group 36">
+            <a:extLst>
+              <a:ext uri="{FF2B5EF4-FFF2-40B4-BE49-F238E27FC236}">
+                <a16:creationId xmlns:a16="http://schemas.microsoft.com/office/drawing/2014/main" id="{0E3102E9-3A6C-61AE-0784-1775DFB17E4B}"/>
+              </a:ext>
+            </a:extLst>
+          </p:cNvPr>
+          <p:cNvGrpSpPr/>
+          <p:nvPr/>
+        </p:nvGrpSpPr>
+        <p:grpSpPr>
+          <a:xfrm>
+            <a:off x="3974276" y="490626"/>
+            <a:ext cx="3114281" cy="3939559"/>
+            <a:chOff x="3974276" y="490626"/>
+            <a:chExt cx="3114281" cy="3939559"/>
+          </a:xfrm>
+        </p:grpSpPr>
+        <p:grpSp>
+          <p:nvGrpSpPr>
+            <p:cNvPr id="20" name="Group 19">
+              <a:extLst>
+                <a:ext uri="{FF2B5EF4-FFF2-40B4-BE49-F238E27FC236}">
+                  <a16:creationId xmlns:a16="http://schemas.microsoft.com/office/drawing/2014/main" id="{8051B33F-A8A0-C99C-7F33-AA1E3EA73571}"/>
+                </a:ext>
+              </a:extLst>
+            </p:cNvPr>
+            <p:cNvGrpSpPr>
+              <a:grpSpLocks noChangeAspect="1"/>
+            </p:cNvGrpSpPr>
+            <p:nvPr/>
+          </p:nvGrpSpPr>
+          <p:grpSpPr>
+            <a:xfrm>
+              <a:off x="3974276" y="1315904"/>
+              <a:ext cx="3114281" cy="3114281"/>
+              <a:chOff x="1410474" y="614962"/>
+              <a:chExt cx="4618620" cy="4618620"/>
+            </a:xfrm>
+          </p:grpSpPr>
+          <p:pic>
+            <p:nvPicPr>
+              <p:cNvPr id="13" name="Picture 8">
+                <a:extLst>
+                  <a:ext uri="{FF2B5EF4-FFF2-40B4-BE49-F238E27FC236}">
+                    <a16:creationId xmlns:a16="http://schemas.microsoft.com/office/drawing/2014/main" id="{2400342A-9EDE-AC98-F66C-17E64E564151}"/>
+                  </a:ext>
+                </a:extLst>
+              </p:cNvPr>
+              <p:cNvPicPr>
+                <a:picLocks noChangeAspect="1" noChangeArrowheads="1"/>
+              </p:cNvPicPr>
+              <p:nvPr/>
+            </p:nvPicPr>
+            <p:blipFill>
+              <a:blip r:embed="rId3">
+                <a:extLst>
+                  <a:ext uri="{28A0092B-C50C-407E-A947-70E740481C1C}">
+                    <a14:useLocalDpi xmlns:a14="http://schemas.microsoft.com/office/drawing/2010/main" val="0"/>
+                  </a:ext>
+                </a:extLst>
+              </a:blip>
+              <a:srcRect/>
+              <a:stretch>
+                <a:fillRect/>
+              </a:stretch>
+            </p:blipFill>
+            <p:spPr bwMode="auto">
+              <a:xfrm>
+                <a:off x="2477283" y="1719352"/>
+                <a:ext cx="2404872" cy="2468880"/>
+              </a:xfrm>
+              <a:prstGeom prst="rect">
+                <a:avLst/>
+              </a:prstGeom>
+              <a:noFill/>
+              <a:extLst>
+                <a:ext uri="{909E8E84-426E-40DD-AFC4-6F175D3DCCD1}">
+                  <a14:hiddenFill xmlns:a14="http://schemas.microsoft.com/office/drawing/2010/main">
+                    <a:solidFill>
+                      <a:srgbClr val="FFFFFF"/>
+                    </a:solidFill>
+                  </a14:hiddenFill>
+                </a:ext>
+              </a:extLst>
+            </p:spPr>
+          </p:pic>
+          <p:grpSp>
+            <p:nvGrpSpPr>
+              <p:cNvPr id="8" name="Group 7">
+                <a:extLst>
+                  <a:ext uri="{FF2B5EF4-FFF2-40B4-BE49-F238E27FC236}">
+                    <a16:creationId xmlns:a16="http://schemas.microsoft.com/office/drawing/2014/main" id="{A8E57A2B-CEA5-C092-9357-B221490E63F2}"/>
+                  </a:ext>
+                </a:extLst>
+              </p:cNvPr>
+              <p:cNvGrpSpPr/>
+              <p:nvPr/>
+            </p:nvGrpSpPr>
+            <p:grpSpPr>
+              <a:xfrm>
+                <a:off x="1410474" y="614962"/>
+                <a:ext cx="4618620" cy="4618620"/>
+                <a:chOff x="1410474" y="614962"/>
+                <a:chExt cx="4618620" cy="4618620"/>
+              </a:xfrm>
+            </p:grpSpPr>
+            <p:sp>
+              <p:nvSpPr>
+                <p:cNvPr id="4" name="Donut 3">
+                  <a:extLst>
+                    <a:ext uri="{FF2B5EF4-FFF2-40B4-BE49-F238E27FC236}">
+                      <a16:creationId xmlns:a16="http://schemas.microsoft.com/office/drawing/2014/main" id="{AD727F63-B088-52DF-6948-186525FC36A8}"/>
+                    </a:ext>
+                  </a:extLst>
+                </p:cNvPr>
+                <p:cNvSpPr>
+                  <a:spLocks noChangeAspect="1"/>
+                </p:cNvSpPr>
+                <p:nvPr/>
+              </p:nvSpPr>
+              <p:spPr>
+                <a:xfrm>
+                  <a:off x="2502444" y="1776220"/>
+                  <a:ext cx="2354580" cy="2354580"/>
+                </a:xfrm>
+                <a:prstGeom prst="donut">
+                  <a:avLst>
+                    <a:gd name="adj" fmla="val 1280"/>
+                  </a:avLst>
+                </a:prstGeom>
+                <a:solidFill>
+                  <a:schemeClr val="bg2">
+                    <a:lumMod val="50000"/>
+                  </a:schemeClr>
+                </a:solidFill>
+                <a:ln>
+                  <a:noFill/>
+                </a:ln>
+              </p:spPr>
+              <p:style>
+                <a:lnRef idx="2">
+                  <a:schemeClr val="accent1">
+                    <a:shade val="15000"/>
+                  </a:schemeClr>
+                </a:lnRef>
+                <a:fillRef idx="1">
+                  <a:schemeClr val="accent1"/>
+                </a:fillRef>
+                <a:effectRef idx="0">
+                  <a:schemeClr val="accent1"/>
+                </a:effectRef>
+                <a:fontRef idx="minor">
+                  <a:schemeClr val="lt1"/>
+                </a:fontRef>
+              </p:style>
+              <p:txBody>
+                <a:bodyPr rtlCol="0" anchor="ctr"/>
+                <a:lstStyle/>
+                <a:p>
+                  <a:pPr algn="ctr"/>
+                  <a:endParaRPr lang="en-US">
+                    <a:solidFill>
+                      <a:schemeClr val="tx1"/>
+                    </a:solidFill>
+                  </a:endParaRPr>
+                </a:p>
+              </p:txBody>
+            </p:sp>
+            <p:sp>
+              <p:nvSpPr>
+                <p:cNvPr id="6" name="Donut 5">
+                  <a:extLst>
+                    <a:ext uri="{FF2B5EF4-FFF2-40B4-BE49-F238E27FC236}">
+                      <a16:creationId xmlns:a16="http://schemas.microsoft.com/office/drawing/2014/main" id="{B6D8A556-B185-394F-016E-1E968AB0435E}"/>
+                    </a:ext>
+                  </a:extLst>
+                </p:cNvPr>
+                <p:cNvSpPr>
+                  <a:spLocks noChangeAspect="1"/>
+                </p:cNvSpPr>
+                <p:nvPr/>
+              </p:nvSpPr>
+              <p:spPr>
+                <a:xfrm>
+                  <a:off x="2145827" y="1419603"/>
+                  <a:ext cx="3067813" cy="3067813"/>
+                </a:xfrm>
+                <a:prstGeom prst="donut">
+                  <a:avLst>
+                    <a:gd name="adj" fmla="val 969"/>
+                  </a:avLst>
+                </a:prstGeom>
+                <a:solidFill>
+                  <a:schemeClr val="bg2">
+                    <a:lumMod val="50000"/>
+                  </a:schemeClr>
+                </a:solidFill>
+                <a:ln>
+                  <a:noFill/>
+                </a:ln>
+              </p:spPr>
+              <p:style>
+                <a:lnRef idx="2">
+                  <a:schemeClr val="accent1">
+                    <a:shade val="15000"/>
+                  </a:schemeClr>
+                </a:lnRef>
+                <a:fillRef idx="1">
+                  <a:schemeClr val="accent1"/>
+                </a:fillRef>
+                <a:effectRef idx="0">
+                  <a:schemeClr val="accent1"/>
+                </a:effectRef>
+                <a:fontRef idx="minor">
+                  <a:schemeClr val="lt1"/>
+                </a:fontRef>
+              </p:style>
+              <p:txBody>
+                <a:bodyPr rtlCol="0" anchor="ctr"/>
+                <a:lstStyle/>
+                <a:p>
+                  <a:pPr algn="ctr"/>
+                  <a:endParaRPr lang="en-US">
+                    <a:solidFill>
+                      <a:schemeClr val="tx1"/>
+                    </a:solidFill>
+                  </a:endParaRPr>
+                </a:p>
+              </p:txBody>
+            </p:sp>
+            <p:sp>
+              <p:nvSpPr>
+                <p:cNvPr id="7" name="Donut 6">
+                  <a:extLst>
+                    <a:ext uri="{FF2B5EF4-FFF2-40B4-BE49-F238E27FC236}">
+                      <a16:creationId xmlns:a16="http://schemas.microsoft.com/office/drawing/2014/main" id="{546469F5-5E90-8674-65A8-284238A85D9D}"/>
+                    </a:ext>
+                  </a:extLst>
+                </p:cNvPr>
+                <p:cNvSpPr>
+                  <a:spLocks noChangeAspect="1"/>
+                </p:cNvSpPr>
+                <p:nvPr/>
+              </p:nvSpPr>
+              <p:spPr>
+                <a:xfrm>
+                  <a:off x="1410474" y="614962"/>
+                  <a:ext cx="4618620" cy="4618620"/>
+                </a:xfrm>
+                <a:prstGeom prst="donut">
+                  <a:avLst>
+                    <a:gd name="adj" fmla="val 661"/>
+                  </a:avLst>
+                </a:prstGeom>
+                <a:solidFill>
+                  <a:schemeClr val="bg2">
+                    <a:lumMod val="50000"/>
+                  </a:schemeClr>
+                </a:solidFill>
+                <a:ln>
+                  <a:noFill/>
+                </a:ln>
+              </p:spPr>
+              <p:style>
+                <a:lnRef idx="2">
+                  <a:schemeClr val="accent1">
+                    <a:shade val="15000"/>
+                  </a:schemeClr>
+                </a:lnRef>
+                <a:fillRef idx="1">
+                  <a:schemeClr val="accent1"/>
+                </a:fillRef>
+                <a:effectRef idx="0">
+                  <a:schemeClr val="accent1"/>
+                </a:effectRef>
+                <a:fontRef idx="minor">
+                  <a:schemeClr val="lt1"/>
+                </a:fontRef>
+              </p:style>
+              <p:txBody>
+                <a:bodyPr rtlCol="0" anchor="ctr"/>
+                <a:lstStyle/>
+                <a:p>
+                  <a:pPr algn="ctr"/>
+                  <a:endParaRPr lang="en-US">
+                    <a:solidFill>
+                      <a:schemeClr val="tx1"/>
+                    </a:solidFill>
+                  </a:endParaRPr>
+                </a:p>
+              </p:txBody>
+            </p:sp>
+          </p:grpSp>
+        </p:grpSp>
+        <p:grpSp>
+          <p:nvGrpSpPr>
+            <p:cNvPr id="27" name="Group 26">
+              <a:extLst>
+                <a:ext uri="{FF2B5EF4-FFF2-40B4-BE49-F238E27FC236}">
+                  <a16:creationId xmlns:a16="http://schemas.microsoft.com/office/drawing/2014/main" id="{F4AFD8E5-BA4C-3006-A582-77CF6A9772B2}"/>
+                </a:ext>
+              </a:extLst>
+            </p:cNvPr>
+            <p:cNvGrpSpPr/>
+            <p:nvPr/>
+          </p:nvGrpSpPr>
+          <p:grpSpPr>
+            <a:xfrm>
+              <a:off x="4834107" y="490626"/>
+              <a:ext cx="1621577" cy="1495610"/>
+              <a:chOff x="1130422" y="621224"/>
+              <a:chExt cx="1621577" cy="1495610"/>
+            </a:xfrm>
+          </p:grpSpPr>
+          <p:sp>
+            <p:nvSpPr>
+              <p:cNvPr id="28" name="Right Arrow 27">
+                <a:extLst>
+                  <a:ext uri="{FF2B5EF4-FFF2-40B4-BE49-F238E27FC236}">
+                    <a16:creationId xmlns:a16="http://schemas.microsoft.com/office/drawing/2014/main" id="{F5A3A26C-0F2D-A452-FCDA-3267689152AD}"/>
+                  </a:ext>
+                </a:extLst>
+              </p:cNvPr>
+              <p:cNvSpPr/>
+              <p:nvPr/>
+            </p:nvSpPr>
+            <p:spPr>
+              <a:xfrm rot="5400000">
+                <a:off x="1274345" y="1470748"/>
+                <a:ext cx="1061894" cy="230278"/>
+              </a:xfrm>
+              <a:prstGeom prst="rightArrow">
+                <a:avLst/>
+              </a:prstGeom>
+            </p:spPr>
+            <p:style>
+              <a:lnRef idx="2">
+                <a:schemeClr val="accent1">
+                  <a:shade val="15000"/>
+                </a:schemeClr>
+              </a:lnRef>
+              <a:fillRef idx="1">
+                <a:schemeClr val="accent1"/>
+              </a:fillRef>
+              <a:effectRef idx="0">
+                <a:schemeClr val="accent1"/>
+              </a:effectRef>
+              <a:fontRef idx="minor">
+                <a:schemeClr val="lt1"/>
+              </a:fontRef>
+            </p:style>
+            <p:txBody>
+              <a:bodyPr rtlCol="0" anchor="ctr"/>
+              <a:lstStyle/>
+              <a:p>
+                <a:pPr algn="ctr"/>
+                <a:endParaRPr lang="en-US"/>
+              </a:p>
+            </p:txBody>
+          </p:sp>
+          <p:sp>
+            <p:nvSpPr>
+              <p:cNvPr id="29" name="TextBox 28">
+                <a:extLst>
+                  <a:ext uri="{FF2B5EF4-FFF2-40B4-BE49-F238E27FC236}">
+                    <a16:creationId xmlns:a16="http://schemas.microsoft.com/office/drawing/2014/main" id="{D26E630F-F2E1-52A2-4DB1-57FD106F9213}"/>
+                  </a:ext>
+                </a:extLst>
+              </p:cNvPr>
+              <p:cNvSpPr txBox="1"/>
+              <p:nvPr/>
+            </p:nvSpPr>
+            <p:spPr>
+              <a:xfrm>
+                <a:off x="1130422" y="621224"/>
+                <a:ext cx="1621577" cy="369332"/>
+              </a:xfrm>
+              <a:prstGeom prst="rect">
+                <a:avLst/>
+              </a:prstGeom>
+              <a:noFill/>
+            </p:spPr>
+            <p:txBody>
+              <a:bodyPr wrap="square">
+                <a:spAutoFit/>
+              </a:bodyPr>
+              <a:lstStyle/>
+              <a:p>
+                <a:r>
+                  <a:rPr lang="en-US" dirty="0"/>
+                  <a:t>Water vapor </a:t>
+                </a:r>
+              </a:p>
+            </p:txBody>
+          </p:sp>
+        </p:grpSp>
+        <p:sp>
+          <p:nvSpPr>
+            <p:cNvPr id="36" name="TextBox 35">
+              <a:extLst>
+                <a:ext uri="{FF2B5EF4-FFF2-40B4-BE49-F238E27FC236}">
+                  <a16:creationId xmlns:a16="http://schemas.microsoft.com/office/drawing/2014/main" id="{8E81F61A-BB41-F13E-D1C1-F10E308686A6}"/>
+                </a:ext>
+              </a:extLst>
+            </p:cNvPr>
+            <p:cNvSpPr txBox="1"/>
+            <p:nvPr/>
+          </p:nvSpPr>
+          <p:spPr>
+            <a:xfrm>
+              <a:off x="4876033" y="2569593"/>
+              <a:ext cx="1276985" cy="646331"/>
+            </a:xfrm>
+            <a:prstGeom prst="rect">
+              <a:avLst/>
+            </a:prstGeom>
+            <a:noFill/>
+          </p:spPr>
+          <p:txBody>
+            <a:bodyPr wrap="square">
+              <a:spAutoFit/>
+            </a:bodyPr>
+            <a:lstStyle/>
+            <a:p>
+              <a:pPr algn="ctr"/>
+              <a:r>
+                <a:rPr lang="en-US" dirty="0"/>
+                <a:t>Ice crystal</a:t>
+              </a:r>
+            </a:p>
+            <a:p>
+              <a:pPr algn="ctr"/>
+              <a:r>
+                <a:rPr lang="en-US" dirty="0"/>
+                <a:t>(2D)</a:t>
+              </a:r>
+            </a:p>
+          </p:txBody>
+        </p:sp>
+      </p:grpSp>
+      <p:sp>
+        <p:nvSpPr>
+          <p:cNvPr id="38" name="TextBox 37">
+            <a:extLst>
+              <a:ext uri="{FF2B5EF4-FFF2-40B4-BE49-F238E27FC236}">
+                <a16:creationId xmlns:a16="http://schemas.microsoft.com/office/drawing/2014/main" id="{49789EF1-FD12-4883-2548-338FECCD3B6E}"/>
+              </a:ext>
+            </a:extLst>
+          </p:cNvPr>
+          <p:cNvSpPr txBox="1"/>
+          <p:nvPr/>
+        </p:nvSpPr>
+        <p:spPr>
+          <a:xfrm>
+            <a:off x="9089980" y="2284850"/>
+            <a:ext cx="1276985" cy="646331"/>
+          </a:xfrm>
+          <a:prstGeom prst="rect">
+            <a:avLst/>
+          </a:prstGeom>
+          <a:noFill/>
+        </p:spPr>
+        <p:txBody>
+          <a:bodyPr wrap="square">
+            <a:spAutoFit/>
+          </a:bodyPr>
+          <a:lstStyle/>
+          <a:p>
+            <a:pPr algn="ctr"/>
+            <a:r>
+              <a:rPr lang="en-US" dirty="0"/>
+              <a:t>Ice crystal</a:t>
+            </a:r>
+          </a:p>
+          <a:p>
+            <a:pPr algn="ctr"/>
+            <a:r>
+              <a:rPr lang="en-US" dirty="0"/>
+              <a:t>(3D)</a:t>
+            </a:r>
+          </a:p>
+        </p:txBody>
+      </p:sp>
+      <p:sp>
+        <p:nvSpPr>
+          <p:cNvPr id="39" name="Right Arrow 38">
+            <a:extLst>
+              <a:ext uri="{FF2B5EF4-FFF2-40B4-BE49-F238E27FC236}">
+                <a16:creationId xmlns:a16="http://schemas.microsoft.com/office/drawing/2014/main" id="{E95F1144-C1A2-ED0B-B644-0F4E1A0D2D88}"/>
+              </a:ext>
+            </a:extLst>
+          </p:cNvPr>
+          <p:cNvSpPr/>
+          <p:nvPr/>
+        </p:nvSpPr>
+        <p:spPr>
+          <a:xfrm rot="8520344">
+            <a:off x="2801060" y="1496311"/>
+            <a:ext cx="2185605" cy="198969"/>
+          </a:xfrm>
+          <a:prstGeom prst="rightArrow">
+            <a:avLst/>
+          </a:prstGeom>
+        </p:spPr>
+        <p:style>
+          <a:lnRef idx="2">
+            <a:schemeClr val="accent1">
+              <a:shade val="15000"/>
+            </a:schemeClr>
+          </a:lnRef>
+          <a:fillRef idx="1">
+            <a:schemeClr val="accent1"/>
+          </a:fillRef>
+          <a:effectRef idx="0">
+            <a:schemeClr val="accent1"/>
+          </a:effectRef>
+          <a:fontRef idx="minor">
+            <a:schemeClr val="lt1"/>
+          </a:fontRef>
+        </p:style>
+        <p:txBody>
+          <a:bodyPr rtlCol="0" anchor="ctr"/>
+          <a:lstStyle/>
+          <a:p>
+            <a:pPr algn="ctr"/>
+            <a:endParaRPr lang="en-US"/>
+          </a:p>
+        </p:txBody>
+      </p:sp>
+      <p:sp>
+        <p:nvSpPr>
+          <p:cNvPr id="40" name="Right Arrow 39">
+            <a:extLst>
+              <a:ext uri="{FF2B5EF4-FFF2-40B4-BE49-F238E27FC236}">
+                <a16:creationId xmlns:a16="http://schemas.microsoft.com/office/drawing/2014/main" id="{00075494-C1B0-4386-6CFB-3396C68CCAD7}"/>
+              </a:ext>
+            </a:extLst>
+          </p:cNvPr>
+          <p:cNvSpPr/>
+          <p:nvPr/>
+        </p:nvSpPr>
+        <p:spPr>
+          <a:xfrm rot="1494113">
+            <a:off x="6153033" y="1216419"/>
+            <a:ext cx="2185605" cy="198969"/>
+          </a:xfrm>
+          <a:prstGeom prst="rightArrow">
+            <a:avLst/>
+          </a:prstGeom>
+        </p:spPr>
+        <p:style>
+          <a:lnRef idx="2">
+            <a:schemeClr val="accent1">
+              <a:shade val="15000"/>
+            </a:schemeClr>
+          </a:lnRef>
+          <a:fillRef idx="1">
+            <a:schemeClr val="accent1"/>
+          </a:fillRef>
+          <a:effectRef idx="0">
+            <a:schemeClr val="accent1"/>
+          </a:effectRef>
+          <a:fontRef idx="minor">
+            <a:schemeClr val="lt1"/>
+          </a:fontRef>
+        </p:style>
+        <p:txBody>
+          <a:bodyPr rtlCol="0" anchor="ctr"/>
+          <a:lstStyle/>
+          <a:p>
+            <a:pPr algn="ctr"/>
+            <a:endParaRPr lang="en-US"/>
+          </a:p>
+        </p:txBody>
+      </p:sp>
+    </p:spTree>
+    <p:extLst>
+      <p:ext uri="{BB962C8B-B14F-4D97-AF65-F5344CB8AC3E}">
+        <p14:creationId xmlns:p14="http://schemas.microsoft.com/office/powerpoint/2010/main" val="4261389518"/>
+      </p:ext>
+    </p:extLst>
+  </p:cSld>
+  <p:clrMapOvr>
+    <a:masterClrMapping/>
+  </p:clrMapOvr>
+</p:sld>
+</file>
+
+<file path=ppt/slides/slide17.xml><?xml version="1.0" encoding="utf-8"?>
+<p:sld xmlns:a="http://schemas.openxmlformats.org/drawingml/2006/main" xmlns:r="http://schemas.openxmlformats.org/officeDocument/2006/relationships" xmlns:p="http://schemas.openxmlformats.org/presentationml/2006/main">
+  <p:cSld>
+    <p:spTree>
+      <p:nvGrpSpPr>
+        <p:cNvPr id="1" name=""/>
+        <p:cNvGrpSpPr/>
+        <p:nvPr/>
+      </p:nvGrpSpPr>
+      <p:grpSpPr>
+        <a:xfrm>
+          <a:off x="0" y="0"/>
+          <a:ext cx="0" cy="0"/>
+          <a:chOff x="0" y="0"/>
+          <a:chExt cx="0" cy="0"/>
+        </a:xfrm>
+      </p:grpSpPr>
+      <p:grpSp>
+        <p:nvGrpSpPr>
+          <p:cNvPr id="53" name="Group 52">
+            <a:extLst>
+              <a:ext uri="{FF2B5EF4-FFF2-40B4-BE49-F238E27FC236}">
+                <a16:creationId xmlns:a16="http://schemas.microsoft.com/office/drawing/2014/main" id="{788C9176-56C3-3553-1DB6-0A3554B00773}"/>
+              </a:ext>
+            </a:extLst>
+          </p:cNvPr>
+          <p:cNvGrpSpPr>
+            <a:grpSpLocks noChangeAspect="1"/>
+          </p:cNvGrpSpPr>
+          <p:nvPr/>
+        </p:nvGrpSpPr>
+        <p:grpSpPr>
+          <a:xfrm>
+            <a:off x="327699" y="768866"/>
+            <a:ext cx="4285391" cy="4285391"/>
+            <a:chOff x="2626765" y="298602"/>
+            <a:chExt cx="5539070" cy="5539070"/>
+          </a:xfrm>
+        </p:grpSpPr>
+        <p:grpSp>
+          <p:nvGrpSpPr>
+            <p:cNvPr id="49" name="Group 48">
+              <a:extLst>
+                <a:ext uri="{FF2B5EF4-FFF2-40B4-BE49-F238E27FC236}">
+                  <a16:creationId xmlns:a16="http://schemas.microsoft.com/office/drawing/2014/main" id="{433D4794-FFEB-DCCE-724B-3F13E923C0B2}"/>
+                </a:ext>
+              </a:extLst>
+            </p:cNvPr>
+            <p:cNvGrpSpPr>
+              <a:grpSpLocks noChangeAspect="1"/>
+            </p:cNvGrpSpPr>
+            <p:nvPr/>
+          </p:nvGrpSpPr>
+          <p:grpSpPr>
+            <a:xfrm>
+              <a:off x="2626765" y="298602"/>
+              <a:ext cx="5539070" cy="5539070"/>
+              <a:chOff x="1410370" y="1638633"/>
+              <a:chExt cx="3114281" cy="3114281"/>
+            </a:xfrm>
+          </p:grpSpPr>
+          <p:grpSp>
+            <p:nvGrpSpPr>
+              <p:cNvPr id="20" name="Group 19">
+                <a:extLst>
+                  <a:ext uri="{FF2B5EF4-FFF2-40B4-BE49-F238E27FC236}">
+                    <a16:creationId xmlns:a16="http://schemas.microsoft.com/office/drawing/2014/main" id="{8051B33F-A8A0-C99C-7F33-AA1E3EA73571}"/>
+                  </a:ext>
+                </a:extLst>
+              </p:cNvPr>
+              <p:cNvGrpSpPr>
+                <a:grpSpLocks noChangeAspect="1"/>
+              </p:cNvGrpSpPr>
+              <p:nvPr/>
+            </p:nvGrpSpPr>
+            <p:grpSpPr>
+              <a:xfrm>
+                <a:off x="1410370" y="1638633"/>
+                <a:ext cx="3114281" cy="3114281"/>
+                <a:chOff x="1410474" y="614962"/>
+                <a:chExt cx="4618620" cy="4618620"/>
+              </a:xfrm>
+            </p:grpSpPr>
+            <p:pic>
+              <p:nvPicPr>
+                <p:cNvPr id="13" name="Picture 8">
+                  <a:extLst>
+                    <a:ext uri="{FF2B5EF4-FFF2-40B4-BE49-F238E27FC236}">
+                      <a16:creationId xmlns:a16="http://schemas.microsoft.com/office/drawing/2014/main" id="{2400342A-9EDE-AC98-F66C-17E64E564151}"/>
+                    </a:ext>
+                  </a:extLst>
+                </p:cNvPr>
+                <p:cNvPicPr>
+                  <a:picLocks noChangeAspect="1" noChangeArrowheads="1"/>
+                </p:cNvPicPr>
+                <p:nvPr/>
+              </p:nvPicPr>
+              <p:blipFill>
+                <a:blip r:embed="rId2">
+                  <a:extLst>
+                    <a:ext uri="{28A0092B-C50C-407E-A947-70E740481C1C}">
+                      <a14:useLocalDpi xmlns:a14="http://schemas.microsoft.com/office/drawing/2010/main" val="0"/>
+                    </a:ext>
+                  </a:extLst>
+                </a:blip>
+                <a:srcRect/>
+                <a:stretch>
+                  <a:fillRect/>
+                </a:stretch>
+              </p:blipFill>
+              <p:spPr bwMode="auto">
+                <a:xfrm>
+                  <a:off x="2477283" y="1719352"/>
+                  <a:ext cx="2404872" cy="2468880"/>
+                </a:xfrm>
+                <a:prstGeom prst="rect">
+                  <a:avLst/>
+                </a:prstGeom>
+                <a:noFill/>
+                <a:extLst>
+                  <a:ext uri="{909E8E84-426E-40DD-AFC4-6F175D3DCCD1}">
+                    <a14:hiddenFill xmlns:a14="http://schemas.microsoft.com/office/drawing/2010/main">
+                      <a:solidFill>
+                        <a:srgbClr val="FFFFFF"/>
+                      </a:solidFill>
+                    </a14:hiddenFill>
+                  </a:ext>
+                </a:extLst>
+              </p:spPr>
+            </p:pic>
+            <p:grpSp>
+              <p:nvGrpSpPr>
+                <p:cNvPr id="8" name="Group 7">
+                  <a:extLst>
+                    <a:ext uri="{FF2B5EF4-FFF2-40B4-BE49-F238E27FC236}">
+                      <a16:creationId xmlns:a16="http://schemas.microsoft.com/office/drawing/2014/main" id="{A8E57A2B-CEA5-C092-9357-B221490E63F2}"/>
+                    </a:ext>
+                  </a:extLst>
+                </p:cNvPr>
+                <p:cNvGrpSpPr/>
+                <p:nvPr/>
+              </p:nvGrpSpPr>
+              <p:grpSpPr>
+                <a:xfrm>
+                  <a:off x="1410474" y="614962"/>
+                  <a:ext cx="4618620" cy="4618620"/>
+                  <a:chOff x="1410474" y="614962"/>
+                  <a:chExt cx="4618620" cy="4618620"/>
+                </a:xfrm>
+              </p:grpSpPr>
+              <p:sp>
+                <p:nvSpPr>
+                  <p:cNvPr id="4" name="Donut 3">
+                    <a:extLst>
+                      <a:ext uri="{FF2B5EF4-FFF2-40B4-BE49-F238E27FC236}">
+                        <a16:creationId xmlns:a16="http://schemas.microsoft.com/office/drawing/2014/main" id="{AD727F63-B088-52DF-6948-186525FC36A8}"/>
+                      </a:ext>
+                    </a:extLst>
+                  </p:cNvPr>
+                  <p:cNvSpPr>
+                    <a:spLocks noChangeAspect="1"/>
+                  </p:cNvSpPr>
+                  <p:nvPr/>
+                </p:nvSpPr>
+                <p:spPr>
+                  <a:xfrm>
+                    <a:off x="2502444" y="1776220"/>
+                    <a:ext cx="2354580" cy="2354580"/>
+                  </a:xfrm>
+                  <a:prstGeom prst="donut">
+                    <a:avLst>
+                      <a:gd name="adj" fmla="val 1280"/>
+                    </a:avLst>
+                  </a:prstGeom>
+                  <a:solidFill>
+                    <a:schemeClr val="bg2">
+                      <a:lumMod val="50000"/>
+                    </a:schemeClr>
+                  </a:solidFill>
+                  <a:ln>
+                    <a:noFill/>
+                  </a:ln>
+                </p:spPr>
+                <p:style>
+                  <a:lnRef idx="2">
+                    <a:schemeClr val="accent1">
+                      <a:shade val="15000"/>
+                    </a:schemeClr>
+                  </a:lnRef>
+                  <a:fillRef idx="1">
+                    <a:schemeClr val="accent1"/>
+                  </a:fillRef>
+                  <a:effectRef idx="0">
+                    <a:schemeClr val="accent1"/>
+                  </a:effectRef>
+                  <a:fontRef idx="minor">
+                    <a:schemeClr val="lt1"/>
+                  </a:fontRef>
+                </p:style>
+                <p:txBody>
+                  <a:bodyPr rtlCol="0" anchor="ctr"/>
+                  <a:lstStyle/>
+                  <a:p>
+                    <a:pPr algn="ctr"/>
+                    <a:endParaRPr lang="en-US">
+                      <a:solidFill>
+                        <a:schemeClr val="tx1"/>
+                      </a:solidFill>
+                    </a:endParaRPr>
+                  </a:p>
+                </p:txBody>
+              </p:sp>
+              <p:sp>
+                <p:nvSpPr>
+                  <p:cNvPr id="6" name="Donut 5">
+                    <a:extLst>
+                      <a:ext uri="{FF2B5EF4-FFF2-40B4-BE49-F238E27FC236}">
+                        <a16:creationId xmlns:a16="http://schemas.microsoft.com/office/drawing/2014/main" id="{B6D8A556-B185-394F-016E-1E968AB0435E}"/>
+                      </a:ext>
+                    </a:extLst>
+                  </p:cNvPr>
+                  <p:cNvSpPr>
+                    <a:spLocks noChangeAspect="1"/>
+                  </p:cNvSpPr>
+                  <p:nvPr/>
+                </p:nvSpPr>
+                <p:spPr>
+                  <a:xfrm>
+                    <a:off x="2145827" y="1419603"/>
+                    <a:ext cx="3067813" cy="3067813"/>
+                  </a:xfrm>
+                  <a:prstGeom prst="donut">
+                    <a:avLst>
+                      <a:gd name="adj" fmla="val 969"/>
+                    </a:avLst>
+                  </a:prstGeom>
+                  <a:solidFill>
+                    <a:schemeClr val="bg2">
+                      <a:lumMod val="50000"/>
+                    </a:schemeClr>
+                  </a:solidFill>
+                  <a:ln>
+                    <a:noFill/>
+                  </a:ln>
+                </p:spPr>
+                <p:style>
+                  <a:lnRef idx="2">
+                    <a:schemeClr val="accent1">
+                      <a:shade val="15000"/>
+                    </a:schemeClr>
+                  </a:lnRef>
+                  <a:fillRef idx="1">
+                    <a:schemeClr val="accent1"/>
+                  </a:fillRef>
+                  <a:effectRef idx="0">
+                    <a:schemeClr val="accent1"/>
+                  </a:effectRef>
+                  <a:fontRef idx="minor">
+                    <a:schemeClr val="lt1"/>
+                  </a:fontRef>
+                </p:style>
+                <p:txBody>
+                  <a:bodyPr rtlCol="0" anchor="ctr"/>
+                  <a:lstStyle/>
+                  <a:p>
+                    <a:pPr algn="ctr"/>
+                    <a:endParaRPr lang="en-US">
+                      <a:solidFill>
+                        <a:schemeClr val="tx1"/>
+                      </a:solidFill>
+                    </a:endParaRPr>
+                  </a:p>
+                </p:txBody>
+              </p:sp>
+              <p:sp>
+                <p:nvSpPr>
+                  <p:cNvPr id="7" name="Donut 6">
+                    <a:extLst>
+                      <a:ext uri="{FF2B5EF4-FFF2-40B4-BE49-F238E27FC236}">
+                        <a16:creationId xmlns:a16="http://schemas.microsoft.com/office/drawing/2014/main" id="{546469F5-5E90-8674-65A8-284238A85D9D}"/>
+                      </a:ext>
+                    </a:extLst>
+                  </p:cNvPr>
+                  <p:cNvSpPr>
+                    <a:spLocks noChangeAspect="1"/>
+                  </p:cNvSpPr>
+                  <p:nvPr/>
+                </p:nvSpPr>
+                <p:spPr>
+                  <a:xfrm>
+                    <a:off x="1410474" y="614962"/>
+                    <a:ext cx="4618620" cy="4618620"/>
+                  </a:xfrm>
+                  <a:prstGeom prst="donut">
+                    <a:avLst>
+                      <a:gd name="adj" fmla="val 661"/>
+                    </a:avLst>
+                  </a:prstGeom>
+                  <a:solidFill>
+                    <a:schemeClr val="bg2">
+                      <a:lumMod val="50000"/>
+                    </a:schemeClr>
+                  </a:solidFill>
+                  <a:ln>
+                    <a:noFill/>
+                  </a:ln>
+                </p:spPr>
+                <p:style>
+                  <a:lnRef idx="2">
+                    <a:schemeClr val="accent1">
+                      <a:shade val="15000"/>
+                    </a:schemeClr>
+                  </a:lnRef>
+                  <a:fillRef idx="1">
+                    <a:schemeClr val="accent1"/>
+                  </a:fillRef>
+                  <a:effectRef idx="0">
+                    <a:schemeClr val="accent1"/>
+                  </a:effectRef>
+                  <a:fontRef idx="minor">
+                    <a:schemeClr val="lt1"/>
+                  </a:fontRef>
+                </p:style>
+                <p:txBody>
+                  <a:bodyPr rtlCol="0" anchor="ctr"/>
+                  <a:lstStyle/>
+                  <a:p>
+                    <a:pPr algn="ctr"/>
+                    <a:endParaRPr lang="en-US">
+                      <a:solidFill>
+                        <a:schemeClr val="tx1"/>
+                      </a:solidFill>
+                    </a:endParaRPr>
+                  </a:p>
+                </p:txBody>
+              </p:sp>
+            </p:grpSp>
+          </p:grpSp>
+          <p:grpSp>
+            <p:nvGrpSpPr>
+              <p:cNvPr id="48" name="Group 47">
+                <a:extLst>
+                  <a:ext uri="{FF2B5EF4-FFF2-40B4-BE49-F238E27FC236}">
+                    <a16:creationId xmlns:a16="http://schemas.microsoft.com/office/drawing/2014/main" id="{7A87EA1C-5AC8-59E9-E8F4-11D0E5935E6C}"/>
+                  </a:ext>
+                </a:extLst>
+              </p:cNvPr>
+              <p:cNvGrpSpPr/>
+              <p:nvPr/>
+            </p:nvGrpSpPr>
+            <p:grpSpPr>
+              <a:xfrm>
+                <a:off x="2828531" y="2588647"/>
+                <a:ext cx="506436" cy="660341"/>
+                <a:chOff x="6013166" y="1017898"/>
+                <a:chExt cx="506436" cy="660341"/>
+              </a:xfrm>
+            </p:grpSpPr>
+            <p:cxnSp>
+              <p:nvCxnSpPr>
+                <p:cNvPr id="45" name="Straight Arrow Connector 44">
+                  <a:extLst>
+                    <a:ext uri="{FF2B5EF4-FFF2-40B4-BE49-F238E27FC236}">
+                      <a16:creationId xmlns:a16="http://schemas.microsoft.com/office/drawing/2014/main" id="{9ACA624F-63B7-A245-2628-DA479C0EBF75}"/>
+                    </a:ext>
+                  </a:extLst>
+                </p:cNvPr>
+                <p:cNvCxnSpPr>
+                  <a:cxnSpLocks/>
+                </p:cNvCxnSpPr>
+                <p:nvPr/>
+              </p:nvCxnSpPr>
+              <p:spPr>
+                <a:xfrm flipV="1">
+                  <a:off x="6132086" y="1029226"/>
+                  <a:ext cx="373235" cy="649013"/>
+                </a:xfrm>
+                <a:prstGeom prst="straightConnector1">
+                  <a:avLst/>
+                </a:prstGeom>
+                <a:ln w="25400">
+                  <a:solidFill>
+                    <a:schemeClr val="tx1"/>
+                  </a:solidFill>
+                  <a:tailEnd type="arrow"/>
+                </a:ln>
+              </p:spPr>
+              <p:style>
+                <a:lnRef idx="1">
+                  <a:schemeClr val="accent1"/>
+                </a:lnRef>
+                <a:fillRef idx="0">
+                  <a:schemeClr val="accent1"/>
+                </a:fillRef>
+                <a:effectRef idx="0">
+                  <a:schemeClr val="accent1"/>
+                </a:effectRef>
+                <a:fontRef idx="minor">
+                  <a:schemeClr val="tx1"/>
+                </a:fontRef>
+              </p:style>
+            </p:cxnSp>
+            <p:cxnSp>
+              <p:nvCxnSpPr>
+                <p:cNvPr id="46" name="Straight Arrow Connector 45">
+                  <a:extLst>
+                    <a:ext uri="{FF2B5EF4-FFF2-40B4-BE49-F238E27FC236}">
+                      <a16:creationId xmlns:a16="http://schemas.microsoft.com/office/drawing/2014/main" id="{5E39C386-5CDF-2B8C-1EA7-9E96EDE66A09}"/>
+                    </a:ext>
+                  </a:extLst>
+                </p:cNvPr>
+                <p:cNvCxnSpPr>
+                  <a:cxnSpLocks/>
+                </p:cNvCxnSpPr>
+                <p:nvPr/>
+              </p:nvCxnSpPr>
+              <p:spPr>
+                <a:xfrm rot="16200000" flipV="1">
+                  <a:off x="5801915" y="1345750"/>
+                  <a:ext cx="660341" cy="4637"/>
+                </a:xfrm>
+                <a:prstGeom prst="straightConnector1">
+                  <a:avLst/>
+                </a:prstGeom>
+                <a:ln w="25400">
+                  <a:solidFill>
+                    <a:schemeClr val="tx1"/>
+                  </a:solidFill>
+                  <a:tailEnd type="arrow"/>
+                </a:ln>
+              </p:spPr>
+              <p:style>
+                <a:lnRef idx="1">
+                  <a:schemeClr val="accent1"/>
+                </a:lnRef>
+                <a:fillRef idx="0">
+                  <a:schemeClr val="accent1"/>
+                </a:fillRef>
+                <a:effectRef idx="0">
+                  <a:schemeClr val="accent1"/>
+                </a:effectRef>
+                <a:fontRef idx="minor">
+                  <a:schemeClr val="tx1"/>
+                </a:fontRef>
+              </p:style>
+            </p:cxnSp>
+            <mc:AlternateContent xmlns:mc="http://schemas.openxmlformats.org/markup-compatibility/2006">
+              <mc:Choice xmlns:a14="http://schemas.microsoft.com/office/drawing/2010/main" Requires="a14">
+                <p:sp>
+                  <p:nvSpPr>
+                    <p:cNvPr id="47" name="TextBox 46">
+                      <a:extLst>
+                        <a:ext uri="{FF2B5EF4-FFF2-40B4-BE49-F238E27FC236}">
+                          <a16:creationId xmlns:a16="http://schemas.microsoft.com/office/drawing/2014/main" id="{67715EF4-0319-F186-2618-03FE033FABFE}"/>
+                        </a:ext>
+                      </a:extLst>
+                    </p:cNvPr>
+                    <p:cNvSpPr txBox="1"/>
+                    <p:nvPr/>
+                  </p:nvSpPr>
+                  <p:spPr>
+                    <a:xfrm>
+                      <a:off x="6013166" y="1128278"/>
+                      <a:ext cx="506436" cy="307777"/>
+                    </a:xfrm>
+                    <a:prstGeom prst="rect">
+                      <a:avLst/>
+                    </a:prstGeom>
+                    <a:noFill/>
+                  </p:spPr>
+                  <p:txBody>
+                    <a:bodyPr wrap="square" rtlCol="0">
+                      <a:spAutoFit/>
+                    </a:bodyPr>
+                    <a:lstStyle/>
+                    <a:p>
+                      <a14:m>
+                        <m:oMathPara xmlns:m="http://schemas.openxmlformats.org/officeDocument/2006/math">
+                          <m:oMathParaPr>
+                            <m:jc m:val="centerGroup"/>
+                          </m:oMathParaPr>
+                          <m:oMath xmlns:m="http://schemas.openxmlformats.org/officeDocument/2006/math">
+                            <m:r>
+                              <a:rPr lang="en-US" sz="1400" b="0" i="1" dirty="0" smtClean="0">
+                                <a:latin typeface="Cambria Math" panose="02040503050406030204" pitchFamily="18" charset="0"/>
+                                <a:ea typeface="Cambria Math" panose="02040503050406030204" pitchFamily="18" charset="0"/>
+                              </a:rPr>
+                              <m:t>30</m:t>
+                            </m:r>
+                            <m:r>
+                              <a:rPr lang="en-US" sz="1400" i="1" dirty="0" smtClean="0">
+                                <a:latin typeface="Cambria Math" panose="02040503050406030204" pitchFamily="18" charset="0"/>
+                                <a:ea typeface="Cambria Math" panose="02040503050406030204" pitchFamily="18" charset="0"/>
+                              </a:rPr>
+                              <m:t>°</m:t>
+                            </m:r>
+                          </m:oMath>
+                        </m:oMathPara>
+                      </a14:m>
+                      <a:endParaRPr lang="en-US" sz="1400" dirty="0"/>
+                    </a:p>
+                  </p:txBody>
+                </p:sp>
+              </mc:Choice>
+              <mc:Fallback>
+                <p:sp>
+                  <p:nvSpPr>
+                    <p:cNvPr id="47" name="TextBox 46">
+                      <a:extLst>
+                        <a:ext uri="{FF2B5EF4-FFF2-40B4-BE49-F238E27FC236}">
+                          <a16:creationId xmlns:a16="http://schemas.microsoft.com/office/drawing/2014/main" id="{67715EF4-0319-F186-2618-03FE033FABFE}"/>
+                        </a:ext>
+                      </a:extLst>
+                    </p:cNvPr>
+                    <p:cNvSpPr txBox="1">
+                      <a:spLocks noRot="1" noChangeAspect="1" noMove="1" noResize="1" noEditPoints="1" noAdjustHandles="1" noChangeArrowheads="1" noChangeShapeType="1" noTextEdit="1"/>
+                    </p:cNvSpPr>
+                    <p:nvPr/>
+                  </p:nvSpPr>
+                  <p:spPr>
+                    <a:xfrm>
+                      <a:off x="6013166" y="1128278"/>
+                      <a:ext cx="506436" cy="307777"/>
+                    </a:xfrm>
+                    <a:prstGeom prst="rect">
+                      <a:avLst/>
+                    </a:prstGeom>
+                    <a:blipFill>
+                      <a:blip r:embed="rId3"/>
+                      <a:stretch>
+                        <a:fillRect/>
+                      </a:stretch>
+                    </a:blipFill>
+                  </p:spPr>
+                  <p:txBody>
+                    <a:bodyPr/>
+                    <a:lstStyle/>
+                    <a:p>
+                      <a:r>
+                        <a:rPr lang="en-US">
+                          <a:noFill/>
+                        </a:rPr>
+                        <a:t> </a:t>
+                      </a:r>
+                    </a:p>
+                  </p:txBody>
+                </p:sp>
+              </mc:Fallback>
+            </mc:AlternateContent>
+          </p:grpSp>
+        </p:grpSp>
+        <mc:AlternateContent xmlns:mc="http://schemas.openxmlformats.org/markup-compatibility/2006">
+          <mc:Choice xmlns:a14="http://schemas.microsoft.com/office/drawing/2010/main" Requires="a14">
+            <p:sp>
+              <p:nvSpPr>
+                <p:cNvPr id="50" name="TextBox 49">
+                  <a:extLst>
+                    <a:ext uri="{FF2B5EF4-FFF2-40B4-BE49-F238E27FC236}">
+                      <a16:creationId xmlns:a16="http://schemas.microsoft.com/office/drawing/2014/main" id="{FB77BC97-03DD-6AF4-1D5F-9523924C853D}"/>
+                    </a:ext>
+                  </a:extLst>
+                </p:cNvPr>
+                <p:cNvSpPr txBox="1"/>
+                <p:nvPr/>
+              </p:nvSpPr>
+              <p:spPr>
+                <a:xfrm>
+                  <a:off x="4742741" y="2245751"/>
+                  <a:ext cx="497057" cy="369331"/>
+                </a:xfrm>
+                <a:prstGeom prst="rect">
+                  <a:avLst/>
+                </a:prstGeom>
+                <a:noFill/>
+              </p:spPr>
+              <p:txBody>
+                <a:bodyPr wrap="square" rtlCol="0">
+                  <a:spAutoFit/>
+                </a:bodyPr>
+                <a:lstStyle/>
+                <a:p>
+                  <a14:m>
+                    <m:oMathPara xmlns:m="http://schemas.openxmlformats.org/officeDocument/2006/math">
+                      <m:oMathParaPr>
+                        <m:jc m:val="centerGroup"/>
+                      </m:oMathParaPr>
+                      <m:oMath xmlns:m="http://schemas.openxmlformats.org/officeDocument/2006/math">
+                        <m:sSub>
+                          <m:sSubPr>
+                            <m:ctrlPr>
+                              <a:rPr lang="en-US" b="0" i="1" smtClean="0">
+                                <a:latin typeface="Cambria Math" panose="02040503050406030204" pitchFamily="18" charset="0"/>
+                              </a:rPr>
+                            </m:ctrlPr>
+                          </m:sSubPr>
+                          <m:e>
+                            <m:r>
+                              <a:rPr lang="en-US" b="0" i="1" smtClean="0">
+                                <a:latin typeface="Cambria Math" panose="02040503050406030204" pitchFamily="18" charset="0"/>
+                              </a:rPr>
+                              <m:t>𝑟</m:t>
+                            </m:r>
+                          </m:e>
+                          <m:sub>
+                            <m:r>
+                              <a:rPr lang="en-US" b="0" i="1" smtClean="0">
+                                <a:latin typeface="Cambria Math" panose="02040503050406030204" pitchFamily="18" charset="0"/>
+                              </a:rPr>
+                              <m:t>h𝑒𝑥</m:t>
+                            </m:r>
+                          </m:sub>
+                        </m:sSub>
+                      </m:oMath>
+                    </m:oMathPara>
+                  </a14:m>
+                  <a:endParaRPr lang="en-US" b="0" dirty="0"/>
+                </a:p>
+              </p:txBody>
+            </p:sp>
+          </mc:Choice>
+          <mc:Fallback>
+            <p:sp>
+              <p:nvSpPr>
+                <p:cNvPr id="50" name="TextBox 49">
+                  <a:extLst>
+                    <a:ext uri="{FF2B5EF4-FFF2-40B4-BE49-F238E27FC236}">
+                      <a16:creationId xmlns:a16="http://schemas.microsoft.com/office/drawing/2014/main" id="{FB77BC97-03DD-6AF4-1D5F-9523924C853D}"/>
+                    </a:ext>
+                  </a:extLst>
+                </p:cNvPr>
+                <p:cNvSpPr txBox="1">
+                  <a:spLocks noRot="1" noChangeAspect="1" noMove="1" noResize="1" noEditPoints="1" noAdjustHandles="1" noChangeArrowheads="1" noChangeShapeType="1" noTextEdit="1"/>
+                </p:cNvSpPr>
+                <p:nvPr/>
+              </p:nvSpPr>
+              <p:spPr>
+                <a:xfrm>
+                  <a:off x="4742741" y="2245751"/>
+                  <a:ext cx="497057" cy="369331"/>
+                </a:xfrm>
+                <a:prstGeom prst="rect">
+                  <a:avLst/>
+                </a:prstGeom>
+                <a:blipFill>
+                  <a:blip r:embed="rId4"/>
+                  <a:stretch>
+                    <a:fillRect r="-35484" b="-26087"/>
+                  </a:stretch>
+                </a:blipFill>
+              </p:spPr>
+              <p:txBody>
+                <a:bodyPr/>
+                <a:lstStyle/>
+                <a:p>
+                  <a:r>
+                    <a:rPr lang="en-US">
+                      <a:noFill/>
+                    </a:rPr>
+                    <a:t> </a:t>
+                  </a:r>
+                </a:p>
+              </p:txBody>
+            </p:sp>
+          </mc:Fallback>
+        </mc:AlternateContent>
+        <mc:AlternateContent xmlns:mc="http://schemas.openxmlformats.org/markup-compatibility/2006">
+          <mc:Choice xmlns:a14="http://schemas.microsoft.com/office/drawing/2010/main" Requires="a14">
+            <p:sp>
+              <p:nvSpPr>
+                <p:cNvPr id="51" name="TextBox 50">
+                  <a:extLst>
+                    <a:ext uri="{FF2B5EF4-FFF2-40B4-BE49-F238E27FC236}">
+                      <a16:creationId xmlns:a16="http://schemas.microsoft.com/office/drawing/2014/main" id="{DD28C619-F92C-10CD-6630-A6AB4ABE743D}"/>
+                    </a:ext>
+                  </a:extLst>
+                </p:cNvPr>
+                <p:cNvSpPr txBox="1"/>
+                <p:nvPr/>
+              </p:nvSpPr>
+              <p:spPr>
+                <a:xfrm>
+                  <a:off x="4285988" y="3337106"/>
+                  <a:ext cx="497058" cy="369332"/>
+                </a:xfrm>
+                <a:prstGeom prst="rect">
+                  <a:avLst/>
+                </a:prstGeom>
+                <a:noFill/>
+              </p:spPr>
+              <p:txBody>
+                <a:bodyPr wrap="square" rtlCol="0">
+                  <a:spAutoFit/>
+                </a:bodyPr>
+                <a:lstStyle/>
+                <a:p>
+                  <a14:m>
+                    <m:oMathPara xmlns:m="http://schemas.openxmlformats.org/officeDocument/2006/math">
+                      <m:oMathParaPr>
+                        <m:jc m:val="centerGroup"/>
+                      </m:oMathParaPr>
+                      <m:oMath xmlns:m="http://schemas.openxmlformats.org/officeDocument/2006/math">
+                        <m:sSub>
+                          <m:sSubPr>
+                            <m:ctrlPr>
+                              <a:rPr lang="en-US" b="0" i="1" smtClean="0">
+                                <a:latin typeface="Cambria Math" panose="02040503050406030204" pitchFamily="18" charset="0"/>
+                              </a:rPr>
+                            </m:ctrlPr>
+                          </m:sSubPr>
+                          <m:e>
+                            <m:r>
+                              <a:rPr lang="en-US" b="0" i="1" smtClean="0">
+                                <a:latin typeface="Cambria Math" panose="02040503050406030204" pitchFamily="18" charset="0"/>
+                              </a:rPr>
+                              <m:t>𝑟</m:t>
+                            </m:r>
+                          </m:e>
+                          <m:sub>
+                            <m:r>
+                              <a:rPr lang="en-US" b="0" i="1" smtClean="0">
+                                <a:latin typeface="Cambria Math" panose="02040503050406030204" pitchFamily="18" charset="0"/>
+                              </a:rPr>
+                              <m:t>h𝑒𝑥</m:t>
+                            </m:r>
+                          </m:sub>
+                        </m:sSub>
+                      </m:oMath>
+                    </m:oMathPara>
+                  </a14:m>
+                  <a:endParaRPr lang="en-US" b="0" dirty="0"/>
+                </a:p>
+              </p:txBody>
+            </p:sp>
+          </mc:Choice>
+          <mc:Fallback>
+            <p:sp>
+              <p:nvSpPr>
+                <p:cNvPr id="51" name="TextBox 50">
+                  <a:extLst>
+                    <a:ext uri="{FF2B5EF4-FFF2-40B4-BE49-F238E27FC236}">
+                      <a16:creationId xmlns:a16="http://schemas.microsoft.com/office/drawing/2014/main" id="{DD28C619-F92C-10CD-6630-A6AB4ABE743D}"/>
+                    </a:ext>
+                  </a:extLst>
+                </p:cNvPr>
+                <p:cNvSpPr txBox="1">
+                  <a:spLocks noRot="1" noChangeAspect="1" noMove="1" noResize="1" noEditPoints="1" noAdjustHandles="1" noChangeArrowheads="1" noChangeShapeType="1" noTextEdit="1"/>
+                </p:cNvSpPr>
+                <p:nvPr/>
+              </p:nvSpPr>
+              <p:spPr>
+                <a:xfrm>
+                  <a:off x="4285988" y="3337106"/>
+                  <a:ext cx="497058" cy="369332"/>
+                </a:xfrm>
+                <a:prstGeom prst="rect">
+                  <a:avLst/>
+                </a:prstGeom>
+                <a:blipFill>
+                  <a:blip r:embed="rId5"/>
+                  <a:stretch>
+                    <a:fillRect r="-35484" b="-25000"/>
+                  </a:stretch>
+                </a:blipFill>
+              </p:spPr>
+              <p:txBody>
+                <a:bodyPr/>
+                <a:lstStyle/>
+                <a:p>
+                  <a:r>
+                    <a:rPr lang="en-US">
+                      <a:noFill/>
+                    </a:rPr>
+                    <a:t> </a:t>
+                  </a:r>
+                </a:p>
+              </p:txBody>
+            </p:sp>
+          </mc:Fallback>
+        </mc:AlternateContent>
+        <mc:AlternateContent xmlns:mc="http://schemas.openxmlformats.org/markup-compatibility/2006">
+          <mc:Choice xmlns:a14="http://schemas.microsoft.com/office/drawing/2010/main" Requires="a14">
+            <p:sp>
+              <p:nvSpPr>
+                <p:cNvPr id="52" name="TextBox 51">
+                  <a:extLst>
+                    <a:ext uri="{FF2B5EF4-FFF2-40B4-BE49-F238E27FC236}">
+                      <a16:creationId xmlns:a16="http://schemas.microsoft.com/office/drawing/2014/main" id="{A44D180E-B22F-22CB-1607-DDC6788635E5}"/>
+                    </a:ext>
+                  </a:extLst>
+                </p:cNvPr>
+                <p:cNvSpPr txBox="1"/>
+                <p:nvPr/>
+              </p:nvSpPr>
+              <p:spPr>
+                <a:xfrm>
+                  <a:off x="5670485" y="2487345"/>
+                  <a:ext cx="497058" cy="369332"/>
+                </a:xfrm>
+                <a:prstGeom prst="rect">
+                  <a:avLst/>
+                </a:prstGeom>
+                <a:noFill/>
+              </p:spPr>
+              <p:txBody>
+                <a:bodyPr wrap="square" rtlCol="0">
+                  <a:spAutoFit/>
+                </a:bodyPr>
+                <a:lstStyle/>
+                <a:p>
+                  <a14:m>
+                    <m:oMathPara xmlns:m="http://schemas.openxmlformats.org/officeDocument/2006/math">
+                      <m:oMathParaPr>
+                        <m:jc m:val="centerGroup"/>
+                      </m:oMathParaPr>
+                      <m:oMath xmlns:m="http://schemas.openxmlformats.org/officeDocument/2006/math">
+                        <m:sSub>
+                          <m:sSubPr>
+                            <m:ctrlPr>
+                              <a:rPr lang="en-US" b="0" i="1" smtClean="0">
+                                <a:latin typeface="Cambria Math" panose="02040503050406030204" pitchFamily="18" charset="0"/>
+                              </a:rPr>
+                            </m:ctrlPr>
+                          </m:sSubPr>
+                          <m:e>
+                            <m:r>
+                              <a:rPr lang="en-US" b="0" i="1" smtClean="0">
+                                <a:latin typeface="Cambria Math" panose="02040503050406030204" pitchFamily="18" charset="0"/>
+                              </a:rPr>
+                              <m:t>𝑟</m:t>
+                            </m:r>
+                            <m:r>
+                              <a:rPr lang="en-US" b="0" i="1" smtClean="0">
+                                <a:latin typeface="Cambria Math" panose="02040503050406030204" pitchFamily="18" charset="0"/>
+                              </a:rPr>
+                              <m:t>′</m:t>
+                            </m:r>
+                          </m:e>
+                          <m:sub>
+                            <m:r>
+                              <a:rPr lang="en-US" b="0" i="1" smtClean="0">
+                                <a:latin typeface="Cambria Math" panose="02040503050406030204" pitchFamily="18" charset="0"/>
+                              </a:rPr>
+                              <m:t>h𝑒𝑥</m:t>
+                            </m:r>
+                          </m:sub>
+                        </m:sSub>
+                      </m:oMath>
+                    </m:oMathPara>
+                  </a14:m>
+                  <a:endParaRPr lang="en-US" b="0" dirty="0"/>
+                </a:p>
+              </p:txBody>
+            </p:sp>
+          </mc:Choice>
+          <mc:Fallback>
+            <p:sp>
+              <p:nvSpPr>
+                <p:cNvPr id="52" name="TextBox 51">
+                  <a:extLst>
+                    <a:ext uri="{FF2B5EF4-FFF2-40B4-BE49-F238E27FC236}">
+                      <a16:creationId xmlns:a16="http://schemas.microsoft.com/office/drawing/2014/main" id="{A44D180E-B22F-22CB-1607-DDC6788635E5}"/>
+                    </a:ext>
+                  </a:extLst>
+                </p:cNvPr>
+                <p:cNvSpPr txBox="1">
+                  <a:spLocks noRot="1" noChangeAspect="1" noMove="1" noResize="1" noEditPoints="1" noAdjustHandles="1" noChangeArrowheads="1" noChangeShapeType="1" noTextEdit="1"/>
+                </p:cNvSpPr>
+                <p:nvPr/>
+              </p:nvSpPr>
+              <p:spPr>
+                <a:xfrm>
+                  <a:off x="5670485" y="2487345"/>
+                  <a:ext cx="497058" cy="369332"/>
+                </a:xfrm>
+                <a:prstGeom prst="rect">
+                  <a:avLst/>
+                </a:prstGeom>
+                <a:blipFill>
+                  <a:blip r:embed="rId6"/>
+                  <a:stretch>
+                    <a:fillRect r="-54839" b="-25000"/>
+                  </a:stretch>
+                </a:blipFill>
+              </p:spPr>
+              <p:txBody>
+                <a:bodyPr/>
+                <a:lstStyle/>
+                <a:p>
+                  <a:r>
+                    <a:rPr lang="en-US">
+                      <a:noFill/>
+                    </a:rPr>
+                    <a:t> </a:t>
+                  </a:r>
+                </a:p>
+              </p:txBody>
+            </p:sp>
+          </mc:Fallback>
+        </mc:AlternateContent>
+      </p:grpSp>
+      <p:grpSp>
+        <p:nvGrpSpPr>
+          <p:cNvPr id="59" name="Group 58">
+            <a:extLst>
+              <a:ext uri="{FF2B5EF4-FFF2-40B4-BE49-F238E27FC236}">
+                <a16:creationId xmlns:a16="http://schemas.microsoft.com/office/drawing/2014/main" id="{AD2BC698-42E8-883D-D99C-F5A169871C86}"/>
+              </a:ext>
+            </a:extLst>
+          </p:cNvPr>
+          <p:cNvGrpSpPr>
+            <a:grpSpLocks noChangeAspect="1"/>
+          </p:cNvGrpSpPr>
+          <p:nvPr/>
+        </p:nvGrpSpPr>
+        <p:grpSpPr>
+          <a:xfrm>
+            <a:off x="5244549" y="1793575"/>
+            <a:ext cx="2256408" cy="2316464"/>
+            <a:chOff x="6945468" y="2093351"/>
+            <a:chExt cx="2884142" cy="2960906"/>
+          </a:xfrm>
+        </p:grpSpPr>
+        <p:pic>
+          <p:nvPicPr>
+            <p:cNvPr id="54" name="Picture 8">
+              <a:extLst>
+                <a:ext uri="{FF2B5EF4-FFF2-40B4-BE49-F238E27FC236}">
+                  <a16:creationId xmlns:a16="http://schemas.microsoft.com/office/drawing/2014/main" id="{18DCF5F9-2324-33E1-85CD-2EB02BE82862}"/>
+                </a:ext>
+              </a:extLst>
+            </p:cNvPr>
+            <p:cNvPicPr>
+              <a:picLocks noChangeAspect="1" noChangeArrowheads="1"/>
+            </p:cNvPicPr>
+            <p:nvPr/>
+          </p:nvPicPr>
+          <p:blipFill>
+            <a:blip r:embed="rId2">
+              <a:extLst>
+                <a:ext uri="{28A0092B-C50C-407E-A947-70E740481C1C}">
+                  <a14:useLocalDpi xmlns:a14="http://schemas.microsoft.com/office/drawing/2010/main" val="0"/>
+                </a:ext>
+              </a:extLst>
+            </a:blip>
+            <a:srcRect/>
+            <a:stretch>
+              <a:fillRect/>
+            </a:stretch>
+          </p:blipFill>
+          <p:spPr bwMode="auto">
+            <a:xfrm>
+              <a:off x="6945468" y="2093351"/>
+              <a:ext cx="2884142" cy="2960906"/>
+            </a:xfrm>
+            <a:prstGeom prst="rect">
+              <a:avLst/>
+            </a:prstGeom>
+            <a:noFill/>
+            <a:extLst>
+              <a:ext uri="{909E8E84-426E-40DD-AFC4-6F175D3DCCD1}">
+                <a14:hiddenFill xmlns:a14="http://schemas.microsoft.com/office/drawing/2010/main">
+                  <a:solidFill>
+                    <a:srgbClr val="FFFFFF"/>
+                  </a:solidFill>
+                </a14:hiddenFill>
+              </a:ext>
+            </a:extLst>
+          </p:spPr>
+        </p:pic>
+        <p:sp>
+          <p:nvSpPr>
+            <p:cNvPr id="55" name="Donut 54">
+              <a:extLst>
+                <a:ext uri="{FF2B5EF4-FFF2-40B4-BE49-F238E27FC236}">
+                  <a16:creationId xmlns:a16="http://schemas.microsoft.com/office/drawing/2014/main" id="{45A15569-177F-AA35-08F9-900CE71A300F}"/>
+                </a:ext>
+              </a:extLst>
+            </p:cNvPr>
+            <p:cNvSpPr>
+              <a:spLocks noChangeAspect="1"/>
+            </p:cNvSpPr>
+            <p:nvPr/>
+          </p:nvSpPr>
+          <p:spPr>
+            <a:xfrm>
+              <a:off x="7125584" y="2306600"/>
+              <a:ext cx="2532333" cy="2532333"/>
+            </a:xfrm>
+            <a:prstGeom prst="donut">
+              <a:avLst>
+                <a:gd name="adj" fmla="val 969"/>
+              </a:avLst>
+            </a:prstGeom>
+            <a:solidFill>
+              <a:schemeClr val="bg2">
+                <a:lumMod val="50000"/>
+              </a:schemeClr>
+            </a:solidFill>
+            <a:ln>
+              <a:noFill/>
+            </a:ln>
+          </p:spPr>
+          <p:style>
+            <a:lnRef idx="2">
+              <a:schemeClr val="accent1">
+                <a:shade val="15000"/>
+              </a:schemeClr>
+            </a:lnRef>
+            <a:fillRef idx="1">
+              <a:schemeClr val="accent1"/>
+            </a:fillRef>
+            <a:effectRef idx="0">
+              <a:schemeClr val="accent1"/>
+            </a:effectRef>
+            <a:fontRef idx="minor">
+              <a:schemeClr val="lt1"/>
+            </a:fontRef>
+          </p:style>
+          <p:txBody>
+            <a:bodyPr rtlCol="0" anchor="ctr"/>
+            <a:lstStyle/>
+            <a:p>
+              <a:pPr algn="ctr"/>
+              <a:endParaRPr lang="en-US">
+                <a:solidFill>
+                  <a:schemeClr val="tx1"/>
+                </a:solidFill>
+              </a:endParaRPr>
+            </a:p>
+          </p:txBody>
+        </p:sp>
+        <p:cxnSp>
+          <p:nvCxnSpPr>
+            <p:cNvPr id="56" name="Straight Arrow Connector 55">
+              <a:extLst>
+                <a:ext uri="{FF2B5EF4-FFF2-40B4-BE49-F238E27FC236}">
+                  <a16:creationId xmlns:a16="http://schemas.microsoft.com/office/drawing/2014/main" id="{7C087A2B-6608-5947-B19F-2EF630C0EECF}"/>
+                </a:ext>
+              </a:extLst>
+            </p:cNvPr>
+            <p:cNvCxnSpPr>
+              <a:cxnSpLocks/>
+            </p:cNvCxnSpPr>
+            <p:nvPr/>
+          </p:nvCxnSpPr>
+          <p:spPr>
+            <a:xfrm flipV="1">
+              <a:off x="8387539" y="2306600"/>
+              <a:ext cx="1" cy="1266166"/>
+            </a:xfrm>
+            <a:prstGeom prst="straightConnector1">
+              <a:avLst/>
+            </a:prstGeom>
+            <a:ln w="25400">
+              <a:solidFill>
+                <a:schemeClr val="tx1"/>
+              </a:solidFill>
+              <a:tailEnd type="arrow"/>
+            </a:ln>
+          </p:spPr>
+          <p:style>
+            <a:lnRef idx="1">
+              <a:schemeClr val="accent1"/>
+            </a:lnRef>
+            <a:fillRef idx="0">
+              <a:schemeClr val="accent1"/>
+            </a:fillRef>
+            <a:effectRef idx="0">
+              <a:schemeClr val="accent1"/>
+            </a:effectRef>
+            <a:fontRef idx="minor">
+              <a:schemeClr val="tx1"/>
+            </a:fontRef>
+          </p:style>
+        </p:cxnSp>
+        <mc:AlternateContent xmlns:mc="http://schemas.openxmlformats.org/markup-compatibility/2006">
+          <mc:Choice xmlns:a14="http://schemas.microsoft.com/office/drawing/2010/main" Requires="a14">
+            <p:sp>
+              <p:nvSpPr>
+                <p:cNvPr id="58" name="TextBox 57">
+                  <a:extLst>
+                    <a:ext uri="{FF2B5EF4-FFF2-40B4-BE49-F238E27FC236}">
+                      <a16:creationId xmlns:a16="http://schemas.microsoft.com/office/drawing/2014/main" id="{D1DD7650-A10B-F275-A2A5-17A2F2964892}"/>
+                    </a:ext>
+                  </a:extLst>
+                </p:cNvPr>
+                <p:cNvSpPr txBox="1"/>
+                <p:nvPr/>
+              </p:nvSpPr>
+              <p:spPr>
+                <a:xfrm>
+                  <a:off x="7661309" y="2681276"/>
+                  <a:ext cx="497058" cy="391582"/>
+                </a:xfrm>
+                <a:prstGeom prst="rect">
+                  <a:avLst/>
+                </a:prstGeom>
+                <a:noFill/>
+              </p:spPr>
+              <p:txBody>
+                <a:bodyPr wrap="square" rtlCol="0">
+                  <a:spAutoFit/>
+                </a:bodyPr>
+                <a:lstStyle/>
+                <a:p>
+                  <a14:m>
+                    <m:oMathPara xmlns:m="http://schemas.openxmlformats.org/officeDocument/2006/math">
+                      <m:oMathParaPr>
+                        <m:jc m:val="centerGroup"/>
+                      </m:oMathParaPr>
+                      <m:oMath xmlns:m="http://schemas.openxmlformats.org/officeDocument/2006/math">
+                        <m:sSub>
+                          <m:sSubPr>
+                            <m:ctrlPr>
+                              <a:rPr lang="en-US" b="0" i="1" smtClean="0">
+                                <a:latin typeface="Cambria Math" panose="02040503050406030204" pitchFamily="18" charset="0"/>
+                              </a:rPr>
+                            </m:ctrlPr>
+                          </m:sSubPr>
+                          <m:e>
+                            <m:r>
+                              <a:rPr lang="en-US" b="0" i="1" smtClean="0">
+                                <a:latin typeface="Cambria Math" panose="02040503050406030204" pitchFamily="18" charset="0"/>
+                              </a:rPr>
+                              <m:t>𝑟</m:t>
+                            </m:r>
+                          </m:e>
+                          <m:sub>
+                            <m:r>
+                              <a:rPr lang="en-US" b="0" i="1" smtClean="0">
+                                <a:latin typeface="Cambria Math" panose="02040503050406030204" pitchFamily="18" charset="0"/>
+                              </a:rPr>
+                              <m:t>𝑒𝑓𝑓</m:t>
+                            </m:r>
+                          </m:sub>
+                        </m:sSub>
+                      </m:oMath>
+                    </m:oMathPara>
+                  </a14:m>
+                  <a:endParaRPr lang="en-US" b="0" dirty="0"/>
+                </a:p>
+              </p:txBody>
+            </p:sp>
+          </mc:Choice>
+          <mc:Fallback>
+            <p:sp>
+              <p:nvSpPr>
+                <p:cNvPr id="58" name="TextBox 57">
+                  <a:extLst>
+                    <a:ext uri="{FF2B5EF4-FFF2-40B4-BE49-F238E27FC236}">
+                      <a16:creationId xmlns:a16="http://schemas.microsoft.com/office/drawing/2014/main" id="{D1DD7650-A10B-F275-A2A5-17A2F2964892}"/>
+                    </a:ext>
+                  </a:extLst>
+                </p:cNvPr>
+                <p:cNvSpPr txBox="1">
+                  <a:spLocks noRot="1" noChangeAspect="1" noMove="1" noResize="1" noEditPoints="1" noAdjustHandles="1" noChangeArrowheads="1" noChangeShapeType="1" noTextEdit="1"/>
+                </p:cNvSpPr>
+                <p:nvPr/>
+              </p:nvSpPr>
+              <p:spPr>
+                <a:xfrm>
+                  <a:off x="7661309" y="2681276"/>
+                  <a:ext cx="497058" cy="391582"/>
+                </a:xfrm>
+                <a:prstGeom prst="rect">
+                  <a:avLst/>
+                </a:prstGeom>
+                <a:blipFill>
+                  <a:blip r:embed="rId7"/>
+                  <a:stretch>
+                    <a:fillRect r="-37500" b="-36000"/>
+                  </a:stretch>
+                </a:blipFill>
+              </p:spPr>
+              <p:txBody>
+                <a:bodyPr/>
+                <a:lstStyle/>
+                <a:p>
+                  <a:r>
+                    <a:rPr lang="en-US">
+                      <a:noFill/>
+                    </a:rPr>
+                    <a:t> </a:t>
+                  </a:r>
+                </a:p>
+              </p:txBody>
+            </p:sp>
+          </mc:Fallback>
+        </mc:AlternateContent>
+      </p:grpSp>
+      <p:pic>
+        <p:nvPicPr>
+          <p:cNvPr id="71" name="Picture 8">
+            <a:extLst>
+              <a:ext uri="{FF2B5EF4-FFF2-40B4-BE49-F238E27FC236}">
+                <a16:creationId xmlns:a16="http://schemas.microsoft.com/office/drawing/2014/main" id="{7AC4372F-A656-77E9-465B-541D3C877DE1}"/>
+              </a:ext>
+            </a:extLst>
+          </p:cNvPr>
+          <p:cNvPicPr>
+            <a:picLocks noChangeAspect="1" noChangeArrowheads="1"/>
+          </p:cNvPicPr>
+          <p:nvPr/>
+        </p:nvPicPr>
+        <p:blipFill>
+          <a:blip r:embed="rId2">
+            <a:extLst>
+              <a:ext uri="{28A0092B-C50C-407E-A947-70E740481C1C}">
+                <a14:useLocalDpi xmlns:a14="http://schemas.microsoft.com/office/drawing/2010/main" val="0"/>
+              </a:ext>
+            </a:extLst>
+          </a:blip>
+          <a:srcRect/>
+          <a:stretch>
+            <a:fillRect/>
+          </a:stretch>
+        </p:blipFill>
+        <p:spPr bwMode="auto">
+          <a:xfrm>
+            <a:off x="8381272" y="1793575"/>
+            <a:ext cx="2256407" cy="2316464"/>
+          </a:xfrm>
+          <a:prstGeom prst="rect">
+            <a:avLst/>
+          </a:prstGeom>
+          <a:noFill/>
+          <a:extLst>
+            <a:ext uri="{909E8E84-426E-40DD-AFC4-6F175D3DCCD1}">
+              <a14:hiddenFill xmlns:a14="http://schemas.microsoft.com/office/drawing/2010/main">
+                <a:solidFill>
+                  <a:srgbClr val="FFFFFF"/>
+                </a:solidFill>
+              </a14:hiddenFill>
+            </a:ext>
+          </a:extLst>
+        </p:spPr>
+      </p:pic>
+      <mc:AlternateContent xmlns:mc="http://schemas.openxmlformats.org/markup-compatibility/2006">
+        <mc:Choice xmlns:a14="http://schemas.microsoft.com/office/drawing/2010/main" Requires="a14">
+          <p:sp>
+            <p:nvSpPr>
+              <p:cNvPr id="73" name="TextBox 72">
+                <a:extLst>
+                  <a:ext uri="{FF2B5EF4-FFF2-40B4-BE49-F238E27FC236}">
+                    <a16:creationId xmlns:a16="http://schemas.microsoft.com/office/drawing/2014/main" id="{0DD6A803-447C-6623-BA35-616914385B10}"/>
+                  </a:ext>
+                </a:extLst>
+              </p:cNvPr>
+              <p:cNvSpPr txBox="1"/>
+              <p:nvPr/>
+            </p:nvSpPr>
+            <p:spPr>
+              <a:xfrm>
+                <a:off x="9207947" y="2107135"/>
+                <a:ext cx="603062" cy="369332"/>
+              </a:xfrm>
+              <a:prstGeom prst="rect">
+                <a:avLst/>
+              </a:prstGeom>
+              <a:noFill/>
+            </p:spPr>
+            <p:txBody>
+              <a:bodyPr wrap="square" rtlCol="0">
+                <a:spAutoFit/>
+              </a:bodyPr>
+              <a:lstStyle/>
+              <a:p>
+                <a14:m>
+                  <m:oMathPara xmlns:m="http://schemas.openxmlformats.org/officeDocument/2006/math">
+                    <m:oMathParaPr>
+                      <m:jc m:val="centerGroup"/>
+                    </m:oMathParaPr>
+                    <m:oMath xmlns:m="http://schemas.openxmlformats.org/officeDocument/2006/math">
+                      <m:r>
+                        <a:rPr lang="en-US" b="0" i="1" smtClean="0">
+                          <a:latin typeface="Cambria Math" panose="02040503050406030204" pitchFamily="18" charset="0"/>
+                        </a:rPr>
+                        <m:t>𝑥</m:t>
+                      </m:r>
+                    </m:oMath>
+                  </m:oMathPara>
+                </a14:m>
+                <a:endParaRPr lang="en-US" b="0" dirty="0"/>
+              </a:p>
+            </p:txBody>
+          </p:sp>
+        </mc:Choice>
+        <mc:Fallback>
+          <p:sp>
+            <p:nvSpPr>
+              <p:cNvPr id="73" name="TextBox 72">
+                <a:extLst>
+                  <a:ext uri="{FF2B5EF4-FFF2-40B4-BE49-F238E27FC236}">
+                    <a16:creationId xmlns:a16="http://schemas.microsoft.com/office/drawing/2014/main" id="{0DD6A803-447C-6623-BA35-616914385B10}"/>
+                  </a:ext>
+                </a:extLst>
+              </p:cNvPr>
+              <p:cNvSpPr txBox="1">
+                <a:spLocks noRot="1" noChangeAspect="1" noMove="1" noResize="1" noEditPoints="1" noAdjustHandles="1" noChangeArrowheads="1" noChangeShapeType="1" noTextEdit="1"/>
+              </p:cNvSpPr>
+              <p:nvPr/>
+            </p:nvSpPr>
+            <p:spPr>
+              <a:xfrm>
+                <a:off x="9207947" y="2107135"/>
+                <a:ext cx="603062" cy="369332"/>
+              </a:xfrm>
+              <a:prstGeom prst="rect">
+                <a:avLst/>
+              </a:prstGeom>
+              <a:blipFill>
+                <a:blip r:embed="rId8"/>
+                <a:stretch>
+                  <a:fillRect/>
+                </a:stretch>
+              </a:blipFill>
+            </p:spPr>
+            <p:txBody>
+              <a:bodyPr/>
+              <a:lstStyle/>
+              <a:p>
+                <a:r>
+                  <a:rPr lang="en-US">
+                    <a:noFill/>
+                  </a:rPr>
+                  <a:t> </a:t>
+                </a:r>
+              </a:p>
+            </p:txBody>
+          </p:sp>
+        </mc:Fallback>
+      </mc:AlternateContent>
+      <p:cxnSp>
+        <p:nvCxnSpPr>
+          <p:cNvPr id="74" name="Straight Arrow Connector 73">
+            <a:extLst>
+              <a:ext uri="{FF2B5EF4-FFF2-40B4-BE49-F238E27FC236}">
+                <a16:creationId xmlns:a16="http://schemas.microsoft.com/office/drawing/2014/main" id="{4D2B25A0-6ED1-A83C-FCDD-0556F8643D2D}"/>
+              </a:ext>
+            </a:extLst>
+          </p:cNvPr>
+          <p:cNvCxnSpPr>
+            <a:cxnSpLocks/>
+          </p:cNvCxnSpPr>
+          <p:nvPr/>
+        </p:nvCxnSpPr>
+        <p:spPr>
+          <a:xfrm rot="5400000" flipV="1">
+            <a:off x="9491545" y="1413220"/>
+            <a:ext cx="1" cy="990585"/>
+          </a:xfrm>
+          <a:prstGeom prst="straightConnector1">
+            <a:avLst/>
+          </a:prstGeom>
+          <a:ln w="25400">
+            <a:solidFill>
+              <a:schemeClr val="tx1"/>
+            </a:solidFill>
+            <a:headEnd type="arrow"/>
+            <a:tailEnd type="arrow"/>
+          </a:ln>
+        </p:spPr>
+        <p:style>
+          <a:lnRef idx="1">
+            <a:schemeClr val="accent1"/>
+          </a:lnRef>
+          <a:fillRef idx="0">
+            <a:schemeClr val="accent1"/>
+          </a:fillRef>
+          <a:effectRef idx="0">
+            <a:schemeClr val="accent1"/>
+          </a:effectRef>
+          <a:fontRef idx="minor">
+            <a:schemeClr val="tx1"/>
+          </a:fontRef>
+        </p:style>
+      </p:cxnSp>
+      <mc:AlternateContent xmlns:mc="http://schemas.openxmlformats.org/markup-compatibility/2006">
+        <mc:Choice xmlns:a14="http://schemas.microsoft.com/office/drawing/2010/main" Requires="a14">
+          <p:sp>
+            <p:nvSpPr>
+              <p:cNvPr id="75" name="TextBox 74">
+                <a:extLst>
+                  <a:ext uri="{FF2B5EF4-FFF2-40B4-BE49-F238E27FC236}">
+                    <a16:creationId xmlns:a16="http://schemas.microsoft.com/office/drawing/2014/main" id="{B34A7DBD-761E-BB66-A5C2-D80351E59314}"/>
+                  </a:ext>
+                </a:extLst>
+              </p:cNvPr>
+              <p:cNvSpPr txBox="1"/>
+              <p:nvPr/>
+            </p:nvSpPr>
+            <p:spPr>
+              <a:xfrm>
+                <a:off x="9701006" y="1506499"/>
+                <a:ext cx="603062" cy="369332"/>
+              </a:xfrm>
+              <a:prstGeom prst="rect">
+                <a:avLst/>
+              </a:prstGeom>
+              <a:noFill/>
+            </p:spPr>
+            <p:txBody>
+              <a:bodyPr wrap="square" rtlCol="0">
+                <a:spAutoFit/>
+              </a:bodyPr>
+              <a:lstStyle/>
+              <a:p>
+                <a14:m>
+                  <m:oMathPara xmlns:m="http://schemas.openxmlformats.org/officeDocument/2006/math">
+                    <m:oMathParaPr>
+                      <m:jc m:val="centerGroup"/>
+                    </m:oMathParaPr>
+                    <m:oMath xmlns:m="http://schemas.openxmlformats.org/officeDocument/2006/math">
+                      <m:r>
+                        <a:rPr lang="en-US" b="0" i="1" smtClean="0">
+                          <a:latin typeface="Cambria Math" panose="02040503050406030204" pitchFamily="18" charset="0"/>
+                        </a:rPr>
+                        <m:t>𝐿</m:t>
+                      </m:r>
+                    </m:oMath>
+                  </m:oMathPara>
+                </a14:m>
+                <a:endParaRPr lang="en-US" b="0" dirty="0"/>
+              </a:p>
+            </p:txBody>
+          </p:sp>
+        </mc:Choice>
+        <mc:Fallback>
+          <p:sp>
+            <p:nvSpPr>
+              <p:cNvPr id="75" name="TextBox 74">
+                <a:extLst>
+                  <a:ext uri="{FF2B5EF4-FFF2-40B4-BE49-F238E27FC236}">
+                    <a16:creationId xmlns:a16="http://schemas.microsoft.com/office/drawing/2014/main" id="{B34A7DBD-761E-BB66-A5C2-D80351E59314}"/>
+                  </a:ext>
+                </a:extLst>
+              </p:cNvPr>
+              <p:cNvSpPr txBox="1">
+                <a:spLocks noRot="1" noChangeAspect="1" noMove="1" noResize="1" noEditPoints="1" noAdjustHandles="1" noChangeArrowheads="1" noChangeShapeType="1" noTextEdit="1"/>
+              </p:cNvSpPr>
+              <p:nvPr/>
+            </p:nvSpPr>
+            <p:spPr>
+              <a:xfrm>
+                <a:off x="9701006" y="1506499"/>
+                <a:ext cx="603062" cy="369332"/>
+              </a:xfrm>
+              <a:prstGeom prst="rect">
+                <a:avLst/>
+              </a:prstGeom>
+              <a:blipFill>
+                <a:blip r:embed="rId9"/>
+                <a:stretch>
+                  <a:fillRect/>
+                </a:stretch>
+              </a:blipFill>
+            </p:spPr>
+            <p:txBody>
+              <a:bodyPr/>
+              <a:lstStyle/>
+              <a:p>
+                <a:r>
+                  <a:rPr lang="en-US">
+                    <a:noFill/>
+                  </a:rPr>
+                  <a:t> </a:t>
+                </a:r>
+              </a:p>
+            </p:txBody>
+          </p:sp>
+        </mc:Fallback>
+      </mc:AlternateContent>
+      <mc:AlternateContent xmlns:mc="http://schemas.openxmlformats.org/markup-compatibility/2006">
+        <mc:Choice xmlns:a14="http://schemas.microsoft.com/office/drawing/2010/main" Requires="a14">
+          <p:sp>
+            <p:nvSpPr>
+              <p:cNvPr id="76" name="TextBox 75">
+                <a:extLst>
+                  <a:ext uri="{FF2B5EF4-FFF2-40B4-BE49-F238E27FC236}">
+                    <a16:creationId xmlns:a16="http://schemas.microsoft.com/office/drawing/2014/main" id="{FBB1C0EB-DB56-7C22-7455-E21B795F161A}"/>
+                  </a:ext>
+                </a:extLst>
+              </p:cNvPr>
+              <p:cNvSpPr txBox="1"/>
+              <p:nvPr/>
+            </p:nvSpPr>
+            <p:spPr>
+              <a:xfrm>
+                <a:off x="8759713" y="1515463"/>
+                <a:ext cx="603062" cy="369332"/>
+              </a:xfrm>
+              <a:prstGeom prst="rect">
+                <a:avLst/>
+              </a:prstGeom>
+              <a:noFill/>
+            </p:spPr>
+            <p:txBody>
+              <a:bodyPr wrap="square" rtlCol="0">
+                <a:spAutoFit/>
+              </a:bodyPr>
+              <a:lstStyle/>
+              <a:p>
+                <a14:m>
+                  <m:oMathPara xmlns:m="http://schemas.openxmlformats.org/officeDocument/2006/math">
+                    <m:oMathParaPr>
+                      <m:jc m:val="centerGroup"/>
+                    </m:oMathParaPr>
+                    <m:oMath xmlns:m="http://schemas.openxmlformats.org/officeDocument/2006/math">
+                      <m:r>
+                        <a:rPr lang="en-US" b="0" i="1" smtClean="0">
+                          <a:latin typeface="Cambria Math" panose="02040503050406030204" pitchFamily="18" charset="0"/>
+                        </a:rPr>
+                        <m:t>−</m:t>
+                      </m:r>
+                      <m:r>
+                        <a:rPr lang="en-US" b="0" i="1" smtClean="0">
+                          <a:latin typeface="Cambria Math" panose="02040503050406030204" pitchFamily="18" charset="0"/>
+                        </a:rPr>
+                        <m:t>𝐿</m:t>
+                      </m:r>
+                    </m:oMath>
+                  </m:oMathPara>
+                </a14:m>
+                <a:endParaRPr lang="en-US" b="0" dirty="0"/>
+              </a:p>
+            </p:txBody>
+          </p:sp>
+        </mc:Choice>
+        <mc:Fallback>
+          <p:sp>
+            <p:nvSpPr>
+              <p:cNvPr id="76" name="TextBox 75">
+                <a:extLst>
+                  <a:ext uri="{FF2B5EF4-FFF2-40B4-BE49-F238E27FC236}">
+                    <a16:creationId xmlns:a16="http://schemas.microsoft.com/office/drawing/2014/main" id="{FBB1C0EB-DB56-7C22-7455-E21B795F161A}"/>
+                  </a:ext>
+                </a:extLst>
+              </p:cNvPr>
+              <p:cNvSpPr txBox="1">
+                <a:spLocks noRot="1" noChangeAspect="1" noMove="1" noResize="1" noEditPoints="1" noAdjustHandles="1" noChangeArrowheads="1" noChangeShapeType="1" noTextEdit="1"/>
+              </p:cNvSpPr>
+              <p:nvPr/>
+            </p:nvSpPr>
+            <p:spPr>
+              <a:xfrm>
+                <a:off x="8759713" y="1515463"/>
+                <a:ext cx="603062" cy="369332"/>
+              </a:xfrm>
+              <a:prstGeom prst="rect">
+                <a:avLst/>
+              </a:prstGeom>
+              <a:blipFill>
+                <a:blip r:embed="rId10"/>
+                <a:stretch>
+                  <a:fillRect/>
+                </a:stretch>
+              </a:blipFill>
+            </p:spPr>
+            <p:txBody>
+              <a:bodyPr/>
+              <a:lstStyle/>
+              <a:p>
+                <a:r>
+                  <a:rPr lang="en-US">
+                    <a:noFill/>
+                  </a:rPr>
+                  <a:t> </a:t>
+                </a:r>
+              </a:p>
+            </p:txBody>
+          </p:sp>
+        </mc:Fallback>
+      </mc:AlternateContent>
+    </p:spTree>
+    <p:extLst>
+      <p:ext uri="{BB962C8B-B14F-4D97-AF65-F5344CB8AC3E}">
+        <p14:creationId xmlns:p14="http://schemas.microsoft.com/office/powerpoint/2010/main" val="1491010850"/>
+      </p:ext>
+    </p:extLst>
+  </p:cSld>
+  <p:clrMapOvr>
+    <a:masterClrMapping/>
+  </p:clrMapOvr>
+</p:sld>
+</file>
+
+<file path=ppt/slides/slide18.xml><?xml version="1.0" encoding="utf-8"?>
+<p:sld xmlns:a="http://schemas.openxmlformats.org/drawingml/2006/main" xmlns:r="http://schemas.openxmlformats.org/officeDocument/2006/relationships" xmlns:p="http://schemas.openxmlformats.org/presentationml/2006/main">
+  <p:cSld>
+    <p:spTree>
+      <p:nvGrpSpPr>
+        <p:cNvPr id="1" name=""/>
+        <p:cNvGrpSpPr/>
+        <p:nvPr/>
+      </p:nvGrpSpPr>
+      <p:grpSpPr>
+        <a:xfrm>
+          <a:off x="0" y="0"/>
+          <a:ext cx="0" cy="0"/>
+          <a:chOff x="0" y="0"/>
+          <a:chExt cx="0" cy="0"/>
+        </a:xfrm>
+      </p:grpSpPr>
+      <p:grpSp>
+        <p:nvGrpSpPr>
+          <p:cNvPr id="56" name="Group 55">
+            <a:extLst>
+              <a:ext uri="{FF2B5EF4-FFF2-40B4-BE49-F238E27FC236}">
+                <a16:creationId xmlns:a16="http://schemas.microsoft.com/office/drawing/2014/main" id="{BD491910-F5A3-2520-AEC1-AC4879B9EE58}"/>
+              </a:ext>
+            </a:extLst>
+          </p:cNvPr>
+          <p:cNvGrpSpPr/>
+          <p:nvPr/>
+        </p:nvGrpSpPr>
+        <p:grpSpPr>
+          <a:xfrm>
+            <a:off x="859423" y="823834"/>
+            <a:ext cx="3553155" cy="3816884"/>
+            <a:chOff x="3436368" y="823834"/>
+            <a:chExt cx="3553155" cy="3816884"/>
+          </a:xfrm>
+        </p:grpSpPr>
+        <p:cxnSp>
+          <p:nvCxnSpPr>
+            <p:cNvPr id="53" name="Straight Connector 52">
+              <a:extLst>
+                <a:ext uri="{FF2B5EF4-FFF2-40B4-BE49-F238E27FC236}">
+                  <a16:creationId xmlns:a16="http://schemas.microsoft.com/office/drawing/2014/main" id="{E1ECE12B-EF47-F1E3-65CB-BC44F4512FE1}"/>
+                </a:ext>
+              </a:extLst>
+            </p:cNvPr>
+            <p:cNvCxnSpPr>
+              <a:cxnSpLocks/>
+            </p:cNvCxnSpPr>
+            <p:nvPr/>
+          </p:nvCxnSpPr>
+          <p:spPr>
+            <a:xfrm>
+              <a:off x="3683788" y="3989476"/>
+              <a:ext cx="0" cy="254000"/>
+            </a:xfrm>
+            <a:prstGeom prst="line">
+              <a:avLst/>
+            </a:prstGeom>
+            <a:ln w="33020">
+              <a:solidFill>
+                <a:schemeClr val="tx1"/>
+              </a:solidFill>
+            </a:ln>
+          </p:spPr>
+          <p:style>
+            <a:lnRef idx="1">
+              <a:schemeClr val="accent1"/>
+            </a:lnRef>
+            <a:fillRef idx="0">
+              <a:schemeClr val="accent1"/>
+            </a:fillRef>
+            <a:effectRef idx="0">
+              <a:schemeClr val="accent1"/>
+            </a:effectRef>
+            <a:fontRef idx="minor">
+              <a:schemeClr val="tx1"/>
+            </a:fontRef>
+          </p:style>
+        </p:cxnSp>
+        <p:cxnSp>
+          <p:nvCxnSpPr>
+            <p:cNvPr id="45" name="Straight Connector 44">
+              <a:extLst>
+                <a:ext uri="{FF2B5EF4-FFF2-40B4-BE49-F238E27FC236}">
+                  <a16:creationId xmlns:a16="http://schemas.microsoft.com/office/drawing/2014/main" id="{EBD05261-F0B1-D37C-2A63-B945D8C91C8A}"/>
+                </a:ext>
+              </a:extLst>
+            </p:cNvPr>
+            <p:cNvCxnSpPr>
+              <a:cxnSpLocks/>
+            </p:cNvCxnSpPr>
+            <p:nvPr/>
+          </p:nvCxnSpPr>
+          <p:spPr>
+            <a:xfrm>
+              <a:off x="6797626" y="4016375"/>
+              <a:ext cx="0" cy="254000"/>
+            </a:xfrm>
+            <a:prstGeom prst="line">
+              <a:avLst/>
+            </a:prstGeom>
+            <a:ln w="33020">
+              <a:solidFill>
+                <a:schemeClr val="tx1"/>
+              </a:solidFill>
+            </a:ln>
+          </p:spPr>
+          <p:style>
+            <a:lnRef idx="1">
+              <a:schemeClr val="accent1"/>
+            </a:lnRef>
+            <a:fillRef idx="0">
+              <a:schemeClr val="accent1"/>
+            </a:fillRef>
+            <a:effectRef idx="0">
+              <a:schemeClr val="accent1"/>
+            </a:effectRef>
+            <a:fontRef idx="minor">
+              <a:schemeClr val="tx1"/>
+            </a:fontRef>
+          </p:style>
+        </p:cxnSp>
+        <p:grpSp>
+          <p:nvGrpSpPr>
+            <p:cNvPr id="40" name="Group 39">
+              <a:extLst>
+                <a:ext uri="{FF2B5EF4-FFF2-40B4-BE49-F238E27FC236}">
+                  <a16:creationId xmlns:a16="http://schemas.microsoft.com/office/drawing/2014/main" id="{B5B50761-B458-EAE8-45DE-4CC9D4FFE3C6}"/>
+                </a:ext>
+              </a:extLst>
+            </p:cNvPr>
+            <p:cNvGrpSpPr>
+              <a:grpSpLocks noChangeAspect="1"/>
+            </p:cNvGrpSpPr>
+            <p:nvPr/>
+          </p:nvGrpSpPr>
+          <p:grpSpPr>
+            <a:xfrm>
+              <a:off x="3490834" y="823834"/>
+              <a:ext cx="3498689" cy="3498689"/>
+              <a:chOff x="3490834" y="823834"/>
+              <a:chExt cx="5210332" cy="5210332"/>
+            </a:xfrm>
+          </p:grpSpPr>
+          <p:grpSp>
+            <p:nvGrpSpPr>
+              <p:cNvPr id="16" name="Group 15">
+                <a:extLst>
+                  <a:ext uri="{FF2B5EF4-FFF2-40B4-BE49-F238E27FC236}">
+                    <a16:creationId xmlns:a16="http://schemas.microsoft.com/office/drawing/2014/main" id="{6F71A4E3-8C5A-1E2D-C2CE-6C88434D45A5}"/>
+                  </a:ext>
+                </a:extLst>
+              </p:cNvPr>
+              <p:cNvGrpSpPr>
+                <a:grpSpLocks noChangeAspect="1"/>
+              </p:cNvGrpSpPr>
+              <p:nvPr/>
+            </p:nvGrpSpPr>
+            <p:grpSpPr>
+              <a:xfrm>
+                <a:off x="3490834" y="823834"/>
+                <a:ext cx="5210332" cy="5210332"/>
+                <a:chOff x="4470116" y="1858464"/>
+                <a:chExt cx="2068590" cy="2068590"/>
+              </a:xfrm>
+            </p:grpSpPr>
+            <p:sp>
+              <p:nvSpPr>
+                <p:cNvPr id="13" name="Donut 12">
+                  <a:extLst>
+                    <a:ext uri="{FF2B5EF4-FFF2-40B4-BE49-F238E27FC236}">
+                      <a16:creationId xmlns:a16="http://schemas.microsoft.com/office/drawing/2014/main" id="{0522F6CE-C951-18A0-8686-F8AFF89290F1}"/>
+                    </a:ext>
+                  </a:extLst>
+                </p:cNvPr>
+                <p:cNvSpPr>
+                  <a:spLocks noChangeAspect="1"/>
+                </p:cNvSpPr>
+                <p:nvPr/>
+              </p:nvSpPr>
+              <p:spPr>
+                <a:xfrm>
+                  <a:off x="4470116" y="1858464"/>
+                  <a:ext cx="2068590" cy="2068590"/>
+                </a:xfrm>
+                <a:prstGeom prst="donut">
+                  <a:avLst>
+                    <a:gd name="adj" fmla="val 969"/>
+                  </a:avLst>
+                </a:prstGeom>
+                <a:solidFill>
+                  <a:schemeClr val="bg2">
+                    <a:lumMod val="50000"/>
+                  </a:schemeClr>
+                </a:solidFill>
+                <a:ln>
+                  <a:noFill/>
+                </a:ln>
+              </p:spPr>
+              <p:style>
+                <a:lnRef idx="2">
+                  <a:schemeClr val="accent1">
+                    <a:shade val="15000"/>
+                  </a:schemeClr>
+                </a:lnRef>
+                <a:fillRef idx="1">
+                  <a:schemeClr val="accent1"/>
+                </a:fillRef>
+                <a:effectRef idx="0">
+                  <a:schemeClr val="accent1"/>
+                </a:effectRef>
+                <a:fontRef idx="minor">
+                  <a:schemeClr val="lt1"/>
+                </a:fontRef>
+              </p:style>
+              <p:txBody>
+                <a:bodyPr rtlCol="0" anchor="ctr"/>
+                <a:lstStyle/>
+                <a:p>
+                  <a:pPr algn="ctr"/>
+                  <a:endParaRPr lang="en-US">
+                    <a:solidFill>
+                      <a:schemeClr val="tx1"/>
+                    </a:solidFill>
+                  </a:endParaRPr>
+                </a:p>
+              </p:txBody>
+            </p:sp>
+            <p:sp>
+              <p:nvSpPr>
+                <p:cNvPr id="15" name="Frame 14">
+                  <a:extLst>
+                    <a:ext uri="{FF2B5EF4-FFF2-40B4-BE49-F238E27FC236}">
+                      <a16:creationId xmlns:a16="http://schemas.microsoft.com/office/drawing/2014/main" id="{A77FF8B1-A656-69EC-8A27-A8B672067DDB}"/>
+                    </a:ext>
+                  </a:extLst>
+                </p:cNvPr>
+                <p:cNvSpPr>
+                  <a:spLocks noChangeAspect="1"/>
+                </p:cNvSpPr>
+                <p:nvPr/>
+              </p:nvSpPr>
+              <p:spPr>
+                <a:xfrm>
+                  <a:off x="4573422" y="1961770"/>
+                  <a:ext cx="1861978" cy="1861978"/>
+                </a:xfrm>
+                <a:prstGeom prst="frame">
+                  <a:avLst>
+                    <a:gd name="adj1" fmla="val 1183"/>
+                  </a:avLst>
+                </a:prstGeom>
+                <a:solidFill>
+                  <a:schemeClr val="accent1"/>
+                </a:solidFill>
+                <a:ln w="38100">
+                  <a:noFill/>
+                </a:ln>
+              </p:spPr>
+              <p:style>
+                <a:lnRef idx="2">
+                  <a:schemeClr val="accent1">
+                    <a:shade val="15000"/>
+                  </a:schemeClr>
+                </a:lnRef>
+                <a:fillRef idx="1">
+                  <a:schemeClr val="accent1"/>
+                </a:fillRef>
+                <a:effectRef idx="0">
+                  <a:schemeClr val="accent1"/>
+                </a:effectRef>
+                <a:fontRef idx="minor">
+                  <a:schemeClr val="lt1"/>
+                </a:fontRef>
+              </p:style>
+              <p:txBody>
+                <a:bodyPr rtlCol="0" anchor="ctr"/>
+                <a:lstStyle/>
+                <a:p>
+                  <a:pPr algn="ctr"/>
+                  <a:endParaRPr lang="en-US" dirty="0">
+                    <a:solidFill>
+                      <a:sysClr val="windowText" lastClr="000000"/>
+                    </a:solidFill>
+                  </a:endParaRPr>
+                </a:p>
+              </p:txBody>
+            </p:sp>
+          </p:grpSp>
+          <p:sp>
+            <p:nvSpPr>
+              <p:cNvPr id="19" name="Donut 18">
+                <a:extLst>
+                  <a:ext uri="{FF2B5EF4-FFF2-40B4-BE49-F238E27FC236}">
+                    <a16:creationId xmlns:a16="http://schemas.microsoft.com/office/drawing/2014/main" id="{4DBE21A2-4145-8263-7A75-D7CD4B539A7B}"/>
+                  </a:ext>
+                </a:extLst>
+              </p:cNvPr>
+              <p:cNvSpPr>
+                <a:spLocks noChangeAspect="1"/>
+              </p:cNvSpPr>
+              <p:nvPr/>
+            </p:nvSpPr>
+            <p:spPr>
+              <a:xfrm>
+                <a:off x="5921829" y="3283821"/>
+                <a:ext cx="375724" cy="371810"/>
+              </a:xfrm>
+              <a:prstGeom prst="donut">
+                <a:avLst>
+                  <a:gd name="adj" fmla="val 49580"/>
+                </a:avLst>
+              </a:prstGeom>
+              <a:solidFill>
+                <a:schemeClr val="tx1"/>
+              </a:solidFill>
+            </p:spPr>
+            <p:style>
+              <a:lnRef idx="2">
+                <a:schemeClr val="accent1">
+                  <a:shade val="15000"/>
+                </a:schemeClr>
+              </a:lnRef>
+              <a:fillRef idx="1">
+                <a:schemeClr val="accent1"/>
+              </a:fillRef>
+              <a:effectRef idx="0">
+                <a:schemeClr val="accent1"/>
+              </a:effectRef>
+              <a:fontRef idx="minor">
+                <a:schemeClr val="lt1"/>
+              </a:fontRef>
+            </p:style>
+            <p:txBody>
+              <a:bodyPr rtlCol="0" anchor="ctr"/>
+              <a:lstStyle/>
+              <a:p>
+                <a:pPr algn="ctr"/>
+                <a:endParaRPr lang="en-US">
+                  <a:solidFill>
+                    <a:schemeClr val="tx1"/>
+                  </a:solidFill>
+                </a:endParaRPr>
+              </a:p>
+            </p:txBody>
+          </p:sp>
+          <p:grpSp>
+            <p:nvGrpSpPr>
+              <p:cNvPr id="21" name="Group 20">
+                <a:extLst>
+                  <a:ext uri="{FF2B5EF4-FFF2-40B4-BE49-F238E27FC236}">
+                    <a16:creationId xmlns:a16="http://schemas.microsoft.com/office/drawing/2014/main" id="{78DFDF96-5D4E-AC71-E95C-A676EBDAAD66}"/>
+                  </a:ext>
+                </a:extLst>
+              </p:cNvPr>
+              <p:cNvGrpSpPr/>
+              <p:nvPr/>
+            </p:nvGrpSpPr>
+            <p:grpSpPr>
+              <a:xfrm>
+                <a:off x="5584941" y="1105684"/>
+                <a:ext cx="496634" cy="2244376"/>
+                <a:chOff x="5584941" y="1105684"/>
+                <a:chExt cx="496634" cy="2244376"/>
+              </a:xfrm>
+            </p:grpSpPr>
+            <p:cxnSp>
+              <p:nvCxnSpPr>
+                <p:cNvPr id="18" name="Straight Arrow Connector 17">
+                  <a:extLst>
+                    <a:ext uri="{FF2B5EF4-FFF2-40B4-BE49-F238E27FC236}">
+                      <a16:creationId xmlns:a16="http://schemas.microsoft.com/office/drawing/2014/main" id="{C9444B5A-26F4-904F-1C76-FBC3C5DA167E}"/>
+                    </a:ext>
+                  </a:extLst>
+                </p:cNvPr>
+                <p:cNvCxnSpPr>
+                  <a:cxnSpLocks/>
+                </p:cNvCxnSpPr>
+                <p:nvPr/>
+              </p:nvCxnSpPr>
+              <p:spPr>
+                <a:xfrm flipV="1">
+                  <a:off x="6081574" y="1105684"/>
+                  <a:ext cx="1" cy="2244376"/>
+                </a:xfrm>
+                <a:prstGeom prst="straightConnector1">
+                  <a:avLst/>
+                </a:prstGeom>
+                <a:ln w="50800">
+                  <a:solidFill>
+                    <a:schemeClr val="tx1"/>
+                  </a:solidFill>
+                  <a:tailEnd type="triangle"/>
+                </a:ln>
+              </p:spPr>
+              <p:style>
+                <a:lnRef idx="1">
+                  <a:schemeClr val="accent1"/>
+                </a:lnRef>
+                <a:fillRef idx="0">
+                  <a:schemeClr val="accent1"/>
+                </a:fillRef>
+                <a:effectRef idx="0">
+                  <a:schemeClr val="accent1"/>
+                </a:effectRef>
+                <a:fontRef idx="minor">
+                  <a:schemeClr val="tx1"/>
+                </a:fontRef>
+              </p:style>
+            </p:cxnSp>
+            <p:sp>
+              <p:nvSpPr>
+                <p:cNvPr id="20" name="TextBox 19">
+                  <a:extLst>
+                    <a:ext uri="{FF2B5EF4-FFF2-40B4-BE49-F238E27FC236}">
+                      <a16:creationId xmlns:a16="http://schemas.microsoft.com/office/drawing/2014/main" id="{04927305-BDFF-E794-47E4-4DCB1392C201}"/>
+                    </a:ext>
+                  </a:extLst>
+                </p:cNvPr>
+                <p:cNvSpPr txBox="1"/>
+                <p:nvPr/>
+              </p:nvSpPr>
+              <p:spPr>
+                <a:xfrm>
+                  <a:off x="5584941" y="1594653"/>
+                  <a:ext cx="375724" cy="461666"/>
+                </a:xfrm>
+                <a:prstGeom prst="rect">
+                  <a:avLst/>
+                </a:prstGeom>
+                <a:noFill/>
+              </p:spPr>
+              <p:txBody>
+                <a:bodyPr wrap="square" rtlCol="0">
+                  <a:spAutoFit/>
+                </a:bodyPr>
+                <a:lstStyle/>
+                <a:p>
+                  <a:pPr algn="ctr"/>
+                  <a:r>
+                    <a:rPr lang="en-US" sz="2400" i="1" dirty="0"/>
+                    <a:t>L</a:t>
+                  </a:r>
+                </a:p>
+              </p:txBody>
+            </p:sp>
+          </p:grpSp>
+          <p:grpSp>
+            <p:nvGrpSpPr>
+              <p:cNvPr id="28" name="Group 27">
+                <a:extLst>
+                  <a:ext uri="{FF2B5EF4-FFF2-40B4-BE49-F238E27FC236}">
+                    <a16:creationId xmlns:a16="http://schemas.microsoft.com/office/drawing/2014/main" id="{31C835B7-2B6E-6B7F-369E-EDBB607A0D46}"/>
+                  </a:ext>
+                </a:extLst>
+              </p:cNvPr>
+              <p:cNvGrpSpPr/>
+              <p:nvPr/>
+            </p:nvGrpSpPr>
+            <p:grpSpPr>
+              <a:xfrm>
+                <a:off x="5926286" y="857240"/>
+                <a:ext cx="1605598" cy="2493818"/>
+                <a:chOff x="5863977" y="1363783"/>
+                <a:chExt cx="1605598" cy="2493818"/>
+              </a:xfrm>
+            </p:grpSpPr>
+            <p:cxnSp>
+              <p:nvCxnSpPr>
+                <p:cNvPr id="29" name="Straight Arrow Connector 28">
+                  <a:extLst>
+                    <a:ext uri="{FF2B5EF4-FFF2-40B4-BE49-F238E27FC236}">
+                      <a16:creationId xmlns:a16="http://schemas.microsoft.com/office/drawing/2014/main" id="{1AF9D47B-177B-7F17-40C9-08CEADD321D3}"/>
+                    </a:ext>
+                  </a:extLst>
+                </p:cNvPr>
+                <p:cNvCxnSpPr>
+                  <a:cxnSpLocks/>
+                </p:cNvCxnSpPr>
+                <p:nvPr/>
+              </p:nvCxnSpPr>
+              <p:spPr>
+                <a:xfrm flipV="1">
+                  <a:off x="6108158" y="1363783"/>
+                  <a:ext cx="0" cy="2493818"/>
+                </a:xfrm>
+                <a:prstGeom prst="straightConnector1">
+                  <a:avLst/>
+                </a:prstGeom>
+                <a:ln w="50800">
+                  <a:solidFill>
+                    <a:schemeClr val="tx1"/>
+                  </a:solidFill>
+                  <a:tailEnd type="triangle"/>
+                </a:ln>
+              </p:spPr>
+              <p:style>
+                <a:lnRef idx="1">
+                  <a:schemeClr val="accent1"/>
+                </a:lnRef>
+                <a:fillRef idx="0">
+                  <a:schemeClr val="accent1"/>
+                </a:fillRef>
+                <a:effectRef idx="0">
+                  <a:schemeClr val="accent1"/>
+                </a:effectRef>
+                <a:fontRef idx="minor">
+                  <a:schemeClr val="tx1"/>
+                </a:fontRef>
+              </p:style>
+            </p:cxnSp>
+            <p:sp>
+              <p:nvSpPr>
+                <p:cNvPr id="30" name="TextBox 29">
+                  <a:extLst>
+                    <a:ext uri="{FF2B5EF4-FFF2-40B4-BE49-F238E27FC236}">
+                      <a16:creationId xmlns:a16="http://schemas.microsoft.com/office/drawing/2014/main" id="{BBAEC926-A15A-1A8D-6FBB-F70FC39CF7AA}"/>
+                    </a:ext>
+                  </a:extLst>
+                </p:cNvPr>
+                <p:cNvSpPr txBox="1"/>
+                <p:nvPr/>
+              </p:nvSpPr>
+              <p:spPr>
+                <a:xfrm>
+                  <a:off x="5863977" y="2101674"/>
+                  <a:ext cx="1605598" cy="687523"/>
+                </a:xfrm>
+                <a:prstGeom prst="rect">
+                  <a:avLst/>
+                </a:prstGeom>
+                <a:noFill/>
+              </p:spPr>
+              <p:txBody>
+                <a:bodyPr wrap="square" rtlCol="0">
+                  <a:spAutoFit/>
+                </a:bodyPr>
+                <a:lstStyle/>
+                <a:p>
+                  <a:pPr algn="ctr"/>
+                  <a:r>
+                    <a:rPr lang="en-US" sz="2400" i="1" dirty="0" err="1"/>
+                    <a:t>L</a:t>
+                  </a:r>
+                  <a:r>
+                    <a:rPr lang="en-US" sz="2400" i="1" baseline="-25000" dirty="0" err="1"/>
+                    <a:t>equiv</a:t>
+                  </a:r>
+                  <a:endParaRPr lang="en-US" sz="2400" i="1" dirty="0"/>
+                </a:p>
+              </p:txBody>
+            </p:sp>
+          </p:grpSp>
+          <p:grpSp>
+            <p:nvGrpSpPr>
+              <p:cNvPr id="31" name="Group 30">
+                <a:extLst>
+                  <a:ext uri="{FF2B5EF4-FFF2-40B4-BE49-F238E27FC236}">
+                    <a16:creationId xmlns:a16="http://schemas.microsoft.com/office/drawing/2014/main" id="{B4A84AF9-6C3F-F766-2351-D7BDA0768996}"/>
+                  </a:ext>
+                </a:extLst>
+              </p:cNvPr>
+              <p:cNvGrpSpPr/>
+              <p:nvPr/>
+            </p:nvGrpSpPr>
+            <p:grpSpPr>
+              <a:xfrm>
+                <a:off x="6242529" y="1157879"/>
+                <a:ext cx="2169579" cy="2180392"/>
+                <a:chOff x="3183826" y="1439899"/>
+                <a:chExt cx="2169579" cy="2180392"/>
+              </a:xfrm>
+            </p:grpSpPr>
+            <p:cxnSp>
+              <p:nvCxnSpPr>
+                <p:cNvPr id="32" name="Straight Arrow Connector 31">
+                  <a:extLst>
+                    <a:ext uri="{FF2B5EF4-FFF2-40B4-BE49-F238E27FC236}">
+                      <a16:creationId xmlns:a16="http://schemas.microsoft.com/office/drawing/2014/main" id="{3AA72BB3-161F-B558-984E-A3E114A2A5ED}"/>
+                    </a:ext>
+                  </a:extLst>
+                </p:cNvPr>
+                <p:cNvCxnSpPr>
+                  <a:cxnSpLocks/>
+                  <a:stCxn id="19" idx="7"/>
+                </p:cNvCxnSpPr>
+                <p:nvPr/>
+              </p:nvCxnSpPr>
+              <p:spPr>
+                <a:xfrm flipV="1">
+                  <a:off x="3183826" y="1439899"/>
+                  <a:ext cx="2127748" cy="2180392"/>
+                </a:xfrm>
+                <a:prstGeom prst="straightConnector1">
+                  <a:avLst/>
+                </a:prstGeom>
+                <a:ln w="50800">
+                  <a:solidFill>
+                    <a:schemeClr val="tx1"/>
+                  </a:solidFill>
+                  <a:tailEnd type="triangle"/>
+                </a:ln>
+              </p:spPr>
+              <p:style>
+                <a:lnRef idx="1">
+                  <a:schemeClr val="accent1"/>
+                </a:lnRef>
+                <a:fillRef idx="0">
+                  <a:schemeClr val="accent1"/>
+                </a:fillRef>
+                <a:effectRef idx="0">
+                  <a:schemeClr val="accent1"/>
+                </a:effectRef>
+                <a:fontRef idx="minor">
+                  <a:schemeClr val="tx1"/>
+                </a:fontRef>
+              </p:style>
+            </p:cxnSp>
+            <p:sp>
+              <p:nvSpPr>
+                <p:cNvPr id="33" name="TextBox 32">
+                  <a:extLst>
+                    <a:ext uri="{FF2B5EF4-FFF2-40B4-BE49-F238E27FC236}">
+                      <a16:creationId xmlns:a16="http://schemas.microsoft.com/office/drawing/2014/main" id="{4AC4326D-FD71-8CCA-A2D8-8D2551DA5DAF}"/>
+                    </a:ext>
+                  </a:extLst>
+                </p:cNvPr>
+                <p:cNvSpPr txBox="1"/>
+                <p:nvPr/>
+              </p:nvSpPr>
+              <p:spPr>
+                <a:xfrm>
+                  <a:off x="3697510" y="2841525"/>
+                  <a:ext cx="1655895" cy="687523"/>
+                </a:xfrm>
+                <a:prstGeom prst="rect">
+                  <a:avLst/>
+                </a:prstGeom>
+                <a:noFill/>
+              </p:spPr>
+              <p:txBody>
+                <a:bodyPr wrap="square" rtlCol="0">
+                  <a:spAutoFit/>
+                </a:bodyPr>
+                <a:lstStyle/>
+                <a:p>
+                  <a:pPr algn="ctr"/>
+                  <a:r>
+                    <a:rPr lang="en-US" sz="2400" i="1" dirty="0" err="1"/>
+                    <a:t>L</a:t>
+                  </a:r>
+                  <a:r>
+                    <a:rPr lang="en-US" sz="2400" i="1" baseline="-25000" dirty="0" err="1"/>
+                    <a:t>corner</a:t>
+                  </a:r>
+                  <a:endParaRPr lang="en-US" sz="2400" i="1" dirty="0"/>
+                </a:p>
+              </p:txBody>
+            </p:sp>
+          </p:grpSp>
+        </p:grpSp>
+        <p:sp>
+          <p:nvSpPr>
+            <p:cNvPr id="41" name="TextBox 40">
+              <a:extLst>
+                <a:ext uri="{FF2B5EF4-FFF2-40B4-BE49-F238E27FC236}">
+                  <a16:creationId xmlns:a16="http://schemas.microsoft.com/office/drawing/2014/main" id="{D9AE47BB-C3A8-70DA-4083-030F8AFFC68F}"/>
+                </a:ext>
+              </a:extLst>
+            </p:cNvPr>
+            <p:cNvSpPr txBox="1"/>
+            <p:nvPr/>
+          </p:nvSpPr>
+          <p:spPr>
+            <a:xfrm>
+              <a:off x="5066172" y="4154469"/>
+              <a:ext cx="328637" cy="461665"/>
+            </a:xfrm>
+            <a:prstGeom prst="rect">
+              <a:avLst/>
+            </a:prstGeom>
+            <a:noFill/>
+          </p:spPr>
+          <p:txBody>
+            <a:bodyPr wrap="square" rtlCol="0">
+              <a:spAutoFit/>
+            </a:bodyPr>
+            <a:lstStyle/>
+            <a:p>
+              <a:r>
+                <a:rPr lang="en-US" sz="2400" i="1" dirty="0"/>
+                <a:t>x</a:t>
+              </a:r>
+            </a:p>
+          </p:txBody>
+        </p:sp>
+        <p:sp>
+          <p:nvSpPr>
+            <p:cNvPr id="43" name="TextBox 42">
+              <a:extLst>
+                <a:ext uri="{FF2B5EF4-FFF2-40B4-BE49-F238E27FC236}">
+                  <a16:creationId xmlns:a16="http://schemas.microsoft.com/office/drawing/2014/main" id="{B988B2EF-2CD6-15DB-3E6A-664FB4D0B6E6}"/>
+                </a:ext>
+              </a:extLst>
+            </p:cNvPr>
+            <p:cNvSpPr txBox="1"/>
+            <p:nvPr/>
+          </p:nvSpPr>
+          <p:spPr>
+            <a:xfrm>
+              <a:off x="3436368" y="4179053"/>
+              <a:ext cx="494839" cy="461665"/>
+            </a:xfrm>
+            <a:prstGeom prst="rect">
+              <a:avLst/>
+            </a:prstGeom>
+            <a:noFill/>
+          </p:spPr>
+          <p:txBody>
+            <a:bodyPr wrap="square" rtlCol="0">
+              <a:spAutoFit/>
+            </a:bodyPr>
+            <a:lstStyle/>
+            <a:p>
+              <a:r>
+                <a:rPr lang="en-US" sz="2400" i="1" dirty="0"/>
+                <a:t>-L</a:t>
+              </a:r>
+            </a:p>
+          </p:txBody>
+        </p:sp>
+        <p:sp>
+          <p:nvSpPr>
+            <p:cNvPr id="52" name="TextBox 51">
+              <a:extLst>
+                <a:ext uri="{FF2B5EF4-FFF2-40B4-BE49-F238E27FC236}">
+                  <a16:creationId xmlns:a16="http://schemas.microsoft.com/office/drawing/2014/main" id="{A465DBC8-241A-3EFA-786F-448D9F047C81}"/>
+                </a:ext>
+              </a:extLst>
+            </p:cNvPr>
+            <p:cNvSpPr txBox="1"/>
+            <p:nvPr/>
+          </p:nvSpPr>
+          <p:spPr>
+            <a:xfrm>
+              <a:off x="6634867" y="4179053"/>
+              <a:ext cx="328638" cy="461665"/>
+            </a:xfrm>
+            <a:prstGeom prst="rect">
+              <a:avLst/>
+            </a:prstGeom>
+            <a:noFill/>
+          </p:spPr>
+          <p:txBody>
+            <a:bodyPr wrap="square" rtlCol="0">
+              <a:spAutoFit/>
+            </a:bodyPr>
+            <a:lstStyle/>
+            <a:p>
+              <a:r>
+                <a:rPr lang="en-US" sz="2400" i="1" dirty="0"/>
+                <a:t>L</a:t>
+              </a:r>
+            </a:p>
+          </p:txBody>
+        </p:sp>
+        <p:cxnSp>
+          <p:nvCxnSpPr>
+            <p:cNvPr id="54" name="Straight Connector 53">
+              <a:extLst>
+                <a:ext uri="{FF2B5EF4-FFF2-40B4-BE49-F238E27FC236}">
+                  <a16:creationId xmlns:a16="http://schemas.microsoft.com/office/drawing/2014/main" id="{548D9D1E-057B-28E3-87E0-BB634380DD6E}"/>
+                </a:ext>
+              </a:extLst>
+            </p:cNvPr>
+            <p:cNvCxnSpPr>
+              <a:cxnSpLocks/>
+            </p:cNvCxnSpPr>
+            <p:nvPr/>
+          </p:nvCxnSpPr>
+          <p:spPr>
+            <a:xfrm>
+              <a:off x="5225731" y="4143375"/>
+              <a:ext cx="0" cy="81181"/>
+            </a:xfrm>
+            <a:prstGeom prst="line">
+              <a:avLst/>
+            </a:prstGeom>
+            <a:ln w="33020">
+              <a:solidFill>
+                <a:schemeClr val="tx1"/>
+              </a:solidFill>
+            </a:ln>
+          </p:spPr>
+          <p:style>
+            <a:lnRef idx="1">
+              <a:schemeClr val="accent1"/>
+            </a:lnRef>
+            <a:fillRef idx="0">
+              <a:schemeClr val="accent1"/>
+            </a:fillRef>
+            <a:effectRef idx="0">
+              <a:schemeClr val="accent1"/>
+            </a:effectRef>
+            <a:fontRef idx="minor">
+              <a:schemeClr val="tx1"/>
+            </a:fontRef>
+          </p:style>
+        </p:cxnSp>
+      </p:grpSp>
+      <p:pic>
+        <p:nvPicPr>
+          <p:cNvPr id="57" name="Picture 56">
+            <a:extLst>
+              <a:ext uri="{FF2B5EF4-FFF2-40B4-BE49-F238E27FC236}">
+                <a16:creationId xmlns:a16="http://schemas.microsoft.com/office/drawing/2014/main" id="{7CF23626-4F17-98A3-F34E-C3A528F70FFA}"/>
+              </a:ext>
+            </a:extLst>
+          </p:cNvPr>
+          <p:cNvPicPr>
+            <a:picLocks noChangeAspect="1"/>
+          </p:cNvPicPr>
+          <p:nvPr/>
+        </p:nvPicPr>
+        <p:blipFill>
+          <a:blip r:embed="rId3"/>
+          <a:stretch>
+            <a:fillRect/>
+          </a:stretch>
+        </p:blipFill>
+        <p:spPr>
+          <a:xfrm>
+            <a:off x="6163326" y="1803418"/>
+            <a:ext cx="3537149" cy="3666744"/>
+          </a:xfrm>
+          <a:prstGeom prst="rect">
+            <a:avLst/>
+          </a:prstGeom>
+        </p:spPr>
+      </p:pic>
+    </p:spTree>
+    <p:extLst>
+      <p:ext uri="{BB962C8B-B14F-4D97-AF65-F5344CB8AC3E}">
+        <p14:creationId xmlns:p14="http://schemas.microsoft.com/office/powerpoint/2010/main" val="3218630229"/>
       </p:ext>
     </p:extLst>
   </p:cSld>
@@ -9482,4 +13763,299 @@
     </a:ext>
   </a:extLst>
 </a:theme>
+</file>
+
+<file path=ppt/theme/theme2.xml><?xml version="1.0" encoding="utf-8"?>
+<a:theme xmlns:a="http://schemas.openxmlformats.org/drawingml/2006/main" name="Office Theme">
+  <a:themeElements>
+    <a:clrScheme name="Office">
+      <a:dk1>
+        <a:sysClr val="windowText" lastClr="000000"/>
+      </a:dk1>
+      <a:lt1>
+        <a:sysClr val="window" lastClr="FFFFFF"/>
+      </a:lt1>
+      <a:dk2>
+        <a:srgbClr val="44546A"/>
+      </a:dk2>
+      <a:lt2>
+        <a:srgbClr val="E7E6E6"/>
+      </a:lt2>
+      <a:accent1>
+        <a:srgbClr val="4472C4"/>
+      </a:accent1>
+      <a:accent2>
+        <a:srgbClr val="ED7D31"/>
+      </a:accent2>
+      <a:accent3>
+        <a:srgbClr val="A5A5A5"/>
+      </a:accent3>
+      <a:accent4>
+        <a:srgbClr val="FFC000"/>
+      </a:accent4>
+      <a:accent5>
+        <a:srgbClr val="5B9BD5"/>
+      </a:accent5>
+      <a:accent6>
+        <a:srgbClr val="70AD47"/>
+      </a:accent6>
+      <a:hlink>
+        <a:srgbClr val="0563C1"/>
+      </a:hlink>
+      <a:folHlink>
+        <a:srgbClr val="954F72"/>
+      </a:folHlink>
+    </a:clrScheme>
+    <a:fontScheme name="Office">
+      <a:majorFont>
+        <a:latin typeface="Calibri Light" panose="020F0302020204030204"/>
+        <a:ea typeface=""/>
+        <a:cs typeface=""/>
+        <a:font script="Jpan" typeface="游ゴシック Light"/>
+        <a:font script="Hang" typeface="맑은 고딕"/>
+        <a:font script="Hans" typeface="等线 Light"/>
+        <a:font script="Hant" typeface="新細明體"/>
+        <a:font script="Arab" typeface="Times New Roman"/>
+        <a:font script="Hebr" typeface="Times New Roman"/>
+        <a:font script="Thai" typeface="Angsana New"/>
+        <a:font script="Ethi" typeface="Nyala"/>
+        <a:font script="Beng" typeface="Vrinda"/>
+        <a:font script="Gujr" typeface="Shruti"/>
+        <a:font script="Khmr" typeface="MoolBoran"/>
+        <a:font script="Knda" typeface="Tunga"/>
+        <a:font script="Guru" typeface="Raavi"/>
+        <a:font script="Cans" typeface="Euphemia"/>
+        <a:font script="Cher" typeface="Plantagenet Cherokee"/>
+        <a:font script="Yiii" typeface="Microsoft Yi Baiti"/>
+        <a:font script="Tibt" typeface="Microsoft Himalaya"/>
+        <a:font script="Thaa" typeface="MV Boli"/>
+        <a:font script="Deva" typeface="Mangal"/>
+        <a:font script="Telu" typeface="Gautami"/>
+        <a:font script="Taml" typeface="Latha"/>
+        <a:font script="Syrc" typeface="Estrangelo Edessa"/>
+        <a:font script="Orya" typeface="Kalinga"/>
+        <a:font script="Mlym" typeface="Kartika"/>
+        <a:font script="Laoo" typeface="DokChampa"/>
+        <a:font script="Sinh" typeface="Iskoola Pota"/>
+        <a:font script="Mong" typeface="Mongolian Baiti"/>
+        <a:font script="Viet" typeface="Times New Roman"/>
+        <a:font script="Uigh" typeface="Microsoft Uighur"/>
+        <a:font script="Geor" typeface="Sylfaen"/>
+        <a:font script="Armn" typeface="Arial"/>
+        <a:font script="Bugi" typeface="Leelawadee UI"/>
+        <a:font script="Bopo" typeface="Microsoft JhengHei"/>
+        <a:font script="Java" typeface="Javanese Text"/>
+        <a:font script="Lisu" typeface="Segoe UI"/>
+        <a:font script="Mymr" typeface="Myanmar Text"/>
+        <a:font script="Nkoo" typeface="Ebrima"/>
+        <a:font script="Olck" typeface="Nirmala UI"/>
+        <a:font script="Osma" typeface="Ebrima"/>
+        <a:font script="Phag" typeface="Phagspa"/>
+        <a:font script="Syrn" typeface="Estrangelo Edessa"/>
+        <a:font script="Syrj" typeface="Estrangelo Edessa"/>
+        <a:font script="Syre" typeface="Estrangelo Edessa"/>
+        <a:font script="Sora" typeface="Nirmala UI"/>
+        <a:font script="Tale" typeface="Microsoft Tai Le"/>
+        <a:font script="Talu" typeface="Microsoft New Tai Lue"/>
+        <a:font script="Tfng" typeface="Ebrima"/>
+      </a:majorFont>
+      <a:minorFont>
+        <a:latin typeface="Calibri" panose="020F0502020204030204"/>
+        <a:ea typeface=""/>
+        <a:cs typeface=""/>
+        <a:font script="Jpan" typeface="游ゴシック"/>
+        <a:font script="Hang" typeface="맑은 고딕"/>
+        <a:font script="Hans" typeface="等线"/>
+        <a:font script="Hant" typeface="新細明體"/>
+        <a:font script="Arab" typeface="Arial"/>
+        <a:font script="Hebr" typeface="Arial"/>
+        <a:font script="Thai" typeface="Cordia New"/>
+        <a:font script="Ethi" typeface="Nyala"/>
+        <a:font script="Beng" typeface="Vrinda"/>
+        <a:font script="Gujr" typeface="Shruti"/>
+        <a:font script="Khmr" typeface="DaunPenh"/>
+        <a:font script="Knda" typeface="Tunga"/>
+        <a:font script="Guru" typeface="Raavi"/>
+        <a:font script="Cans" typeface="Euphemia"/>
+        <a:font script="Cher" typeface="Plantagenet Cherokee"/>
+        <a:font script="Yiii" typeface="Microsoft Yi Baiti"/>
+        <a:font script="Tibt" typeface="Microsoft Himalaya"/>
+        <a:font script="Thaa" typeface="MV Boli"/>
+        <a:font script="Deva" typeface="Mangal"/>
+        <a:font script="Telu" typeface="Gautami"/>
+        <a:font script="Taml" typeface="Latha"/>
+        <a:font script="Syrc" typeface="Estrangelo Edessa"/>
+        <a:font script="Orya" typeface="Kalinga"/>
+        <a:font script="Mlym" typeface="Kartika"/>
+        <a:font script="Laoo" typeface="DokChampa"/>
+        <a:font script="Sinh" typeface="Iskoola Pota"/>
+        <a:font script="Mong" typeface="Mongolian Baiti"/>
+        <a:font script="Viet" typeface="Arial"/>
+        <a:font script="Uigh" typeface="Microsoft Uighur"/>
+        <a:font script="Geor" typeface="Sylfaen"/>
+        <a:font script="Armn" typeface="Arial"/>
+        <a:font script="Bugi" typeface="Leelawadee UI"/>
+        <a:font script="Bopo" typeface="Microsoft JhengHei"/>
+        <a:font script="Java" typeface="Javanese Text"/>
+        <a:font script="Lisu" typeface="Segoe UI"/>
+        <a:font script="Mymr" typeface="Myanmar Text"/>
+        <a:font script="Nkoo" typeface="Ebrima"/>
+        <a:font script="Olck" typeface="Nirmala UI"/>
+        <a:font script="Osma" typeface="Ebrima"/>
+        <a:font script="Phag" typeface="Phagspa"/>
+        <a:font script="Syrn" typeface="Estrangelo Edessa"/>
+        <a:font script="Syrj" typeface="Estrangelo Edessa"/>
+        <a:font script="Syre" typeface="Estrangelo Edessa"/>
+        <a:font script="Sora" typeface="Nirmala UI"/>
+        <a:font script="Tale" typeface="Microsoft Tai Le"/>
+        <a:font script="Talu" typeface="Microsoft New Tai Lue"/>
+        <a:font script="Tfng" typeface="Ebrima"/>
+      </a:minorFont>
+    </a:fontScheme>
+    <a:fmtScheme name="Office">
+      <a:fillStyleLst>
+        <a:solidFill>
+          <a:schemeClr val="phClr"/>
+        </a:solidFill>
+        <a:gradFill rotWithShape="1">
+          <a:gsLst>
+            <a:gs pos="0">
+              <a:schemeClr val="phClr">
+                <a:lumMod val="110000"/>
+                <a:satMod val="105000"/>
+                <a:tint val="67000"/>
+              </a:schemeClr>
+            </a:gs>
+            <a:gs pos="50000">
+              <a:schemeClr val="phClr">
+                <a:lumMod val="105000"/>
+                <a:satMod val="103000"/>
+                <a:tint val="73000"/>
+              </a:schemeClr>
+            </a:gs>
+            <a:gs pos="100000">
+              <a:schemeClr val="phClr">
+                <a:lumMod val="105000"/>
+                <a:satMod val="109000"/>
+                <a:tint val="81000"/>
+              </a:schemeClr>
+            </a:gs>
+          </a:gsLst>
+          <a:lin ang="5400000" scaled="0"/>
+        </a:gradFill>
+        <a:gradFill rotWithShape="1">
+          <a:gsLst>
+            <a:gs pos="0">
+              <a:schemeClr val="phClr">
+                <a:satMod val="103000"/>
+                <a:lumMod val="102000"/>
+                <a:tint val="94000"/>
+              </a:schemeClr>
+            </a:gs>
+            <a:gs pos="50000">
+              <a:schemeClr val="phClr">
+                <a:satMod val="110000"/>
+                <a:lumMod val="100000"/>
+                <a:shade val="100000"/>
+              </a:schemeClr>
+            </a:gs>
+            <a:gs pos="100000">
+              <a:schemeClr val="phClr">
+                <a:lumMod val="99000"/>
+                <a:satMod val="120000"/>
+                <a:shade val="78000"/>
+              </a:schemeClr>
+            </a:gs>
+          </a:gsLst>
+          <a:lin ang="5400000" scaled="0"/>
+        </a:gradFill>
+      </a:fillStyleLst>
+      <a:lnStyleLst>
+        <a:ln w="6350" cap="flat" cmpd="sng" algn="ctr">
+          <a:solidFill>
+            <a:schemeClr val="phClr"/>
+          </a:solidFill>
+          <a:prstDash val="solid"/>
+          <a:miter lim="800000"/>
+        </a:ln>
+        <a:ln w="12700" cap="flat" cmpd="sng" algn="ctr">
+          <a:solidFill>
+            <a:schemeClr val="phClr"/>
+          </a:solidFill>
+          <a:prstDash val="solid"/>
+          <a:miter lim="800000"/>
+        </a:ln>
+        <a:ln w="19050" cap="flat" cmpd="sng" algn="ctr">
+          <a:solidFill>
+            <a:schemeClr val="phClr"/>
+          </a:solidFill>
+          <a:prstDash val="solid"/>
+          <a:miter lim="800000"/>
+        </a:ln>
+      </a:lnStyleLst>
+      <a:effectStyleLst>
+        <a:effectStyle>
+          <a:effectLst/>
+        </a:effectStyle>
+        <a:effectStyle>
+          <a:effectLst/>
+        </a:effectStyle>
+        <a:effectStyle>
+          <a:effectLst>
+            <a:outerShdw blurRad="57150" dist="19050" dir="5400000" algn="ctr" rotWithShape="0">
+              <a:srgbClr val="000000">
+                <a:alpha val="63000"/>
+              </a:srgbClr>
+            </a:outerShdw>
+          </a:effectLst>
+        </a:effectStyle>
+      </a:effectStyleLst>
+      <a:bgFillStyleLst>
+        <a:solidFill>
+          <a:schemeClr val="phClr"/>
+        </a:solidFill>
+        <a:solidFill>
+          <a:schemeClr val="phClr">
+            <a:tint val="95000"/>
+            <a:satMod val="170000"/>
+          </a:schemeClr>
+        </a:solidFill>
+        <a:gradFill rotWithShape="1">
+          <a:gsLst>
+            <a:gs pos="0">
+              <a:schemeClr val="phClr">
+                <a:tint val="93000"/>
+                <a:satMod val="150000"/>
+                <a:shade val="98000"/>
+                <a:lumMod val="102000"/>
+              </a:schemeClr>
+            </a:gs>
+            <a:gs pos="50000">
+              <a:schemeClr val="phClr">
+                <a:tint val="98000"/>
+                <a:satMod val="130000"/>
+                <a:shade val="90000"/>
+                <a:lumMod val="103000"/>
+              </a:schemeClr>
+            </a:gs>
+            <a:gs pos="100000">
+              <a:schemeClr val="phClr">
+                <a:shade val="63000"/>
+                <a:satMod val="120000"/>
+              </a:schemeClr>
+            </a:gs>
+          </a:gsLst>
+          <a:lin ang="5400000" scaled="0"/>
+        </a:gradFill>
+      </a:bgFillStyleLst>
+    </a:fmtScheme>
+  </a:themeElements>
+  <a:objectDefaults/>
+  <a:extraClrSchemeLst/>
+  <a:extLst>
+    <a:ext uri="{05A4C25C-085E-4340-85A3-A5531E510DB2}">
+      <thm15:themeFamily xmlns:thm15="http://schemas.microsoft.com/office/thememl/2012/main" name="Office Theme" id="{62F939B6-93AF-4DB8-9C6B-D6C7DFDC589F}" vid="{4A3C46E8-61CC-4603-A589-7422A47A8E4A}"/>
+    </a:ext>
+  </a:extLst>
+</a:theme>
 </file>
</xml_diff>